<commit_message>
list to test document and added indented ols and uls
</commit_message>
<xml_diff>
--- a/PowerPointParser/PowerPointParserTests/TestData/TestDeckParagraph.pptx
+++ b/PowerPointParser/PowerPointParserTests/TestData/TestDeckParagraph.pptx
@@ -5,7 +5,7 @@
     <p:sldMasterId id="2147483712" r:id="rId4"/>
   </p:sldMasterIdLst>
   <p:notesMasterIdLst>
-    <p:notesMasterId r:id="rId10"/>
+    <p:notesMasterId r:id="rId13"/>
   </p:notesMasterIdLst>
   <p:sldIdLst>
     <p:sldId id="257" r:id="rId5"/>
@@ -13,6 +13,9 @@
     <p:sldId id="259" r:id="rId7"/>
     <p:sldId id="261" r:id="rId8"/>
     <p:sldId id="260" r:id="rId9"/>
+    <p:sldId id="262" r:id="rId10"/>
+    <p:sldId id="263" r:id="rId11"/>
+    <p:sldId id="264" r:id="rId12"/>
   </p:sldIdLst>
   <p:sldSz cx="12192000" cy="6858000"/>
   <p:notesSz cx="6858000" cy="9144000"/>
@@ -1870,6 +1873,881 @@
 </file>
 
 <file path=ppt/diagrams/colors3.xml><?xml version="1.0" encoding="utf-8"?>
+<dgm:colorsDef xmlns:dgm="http://schemas.openxmlformats.org/drawingml/2006/diagram" xmlns:a="http://schemas.openxmlformats.org/drawingml/2006/main" uniqueId="urn:microsoft.com/office/officeart/2005/8/colors/accent1_3">
+  <dgm:title val=""/>
+  <dgm:desc val=""/>
+  <dgm:catLst>
+    <dgm:cat type="accent1" pri="11300"/>
+  </dgm:catLst>
+  <dgm:styleLbl name="node0">
+    <dgm:fillClrLst meth="repeat">
+      <a:schemeClr val="accent1">
+        <a:shade val="80000"/>
+      </a:schemeClr>
+    </dgm:fillClrLst>
+    <dgm:linClrLst meth="repeat">
+      <a:schemeClr val="lt1"/>
+    </dgm:linClrLst>
+    <dgm:effectClrLst/>
+    <dgm:txLinClrLst/>
+    <dgm:txFillClrLst/>
+    <dgm:txEffectClrLst/>
+  </dgm:styleLbl>
+  <dgm:styleLbl name="alignNode1">
+    <dgm:fillClrLst>
+      <a:schemeClr val="accent1">
+        <a:shade val="80000"/>
+      </a:schemeClr>
+      <a:schemeClr val="accent1">
+        <a:tint val="70000"/>
+      </a:schemeClr>
+    </dgm:fillClrLst>
+    <dgm:linClrLst>
+      <a:schemeClr val="accent1">
+        <a:shade val="80000"/>
+      </a:schemeClr>
+      <a:schemeClr val="accent1">
+        <a:tint val="70000"/>
+      </a:schemeClr>
+    </dgm:linClrLst>
+    <dgm:effectClrLst/>
+    <dgm:txLinClrLst/>
+    <dgm:txFillClrLst/>
+    <dgm:txEffectClrLst/>
+  </dgm:styleLbl>
+  <dgm:styleLbl name="node1">
+    <dgm:fillClrLst>
+      <a:schemeClr val="accent1">
+        <a:shade val="80000"/>
+      </a:schemeClr>
+      <a:schemeClr val="accent1">
+        <a:tint val="70000"/>
+      </a:schemeClr>
+    </dgm:fillClrLst>
+    <dgm:linClrLst meth="repeat">
+      <a:schemeClr val="lt1"/>
+    </dgm:linClrLst>
+    <dgm:effectClrLst/>
+    <dgm:txLinClrLst/>
+    <dgm:txFillClrLst/>
+    <dgm:txEffectClrLst/>
+  </dgm:styleLbl>
+  <dgm:styleLbl name="lnNode1">
+    <dgm:fillClrLst>
+      <a:schemeClr val="accent1">
+        <a:shade val="80000"/>
+      </a:schemeClr>
+      <a:schemeClr val="accent1">
+        <a:tint val="70000"/>
+      </a:schemeClr>
+    </dgm:fillClrLst>
+    <dgm:linClrLst meth="repeat">
+      <a:schemeClr val="lt1"/>
+    </dgm:linClrLst>
+    <dgm:effectClrLst/>
+    <dgm:txLinClrLst/>
+    <dgm:txFillClrLst/>
+    <dgm:txEffectClrLst/>
+  </dgm:styleLbl>
+  <dgm:styleLbl name="vennNode1">
+    <dgm:fillClrLst>
+      <a:schemeClr val="accent1">
+        <a:shade val="80000"/>
+        <a:alpha val="50000"/>
+      </a:schemeClr>
+      <a:schemeClr val="accent1">
+        <a:tint val="70000"/>
+        <a:alpha val="50000"/>
+      </a:schemeClr>
+    </dgm:fillClrLst>
+    <dgm:linClrLst meth="repeat">
+      <a:schemeClr val="lt1"/>
+    </dgm:linClrLst>
+    <dgm:effectClrLst/>
+    <dgm:txLinClrLst/>
+    <dgm:txFillClrLst/>
+    <dgm:txEffectClrLst/>
+  </dgm:styleLbl>
+  <dgm:styleLbl name="node2">
+    <dgm:fillClrLst>
+      <a:schemeClr val="accent1">
+        <a:tint val="99000"/>
+      </a:schemeClr>
+    </dgm:fillClrLst>
+    <dgm:linClrLst meth="repeat">
+      <a:schemeClr val="lt1"/>
+    </dgm:linClrLst>
+    <dgm:effectClrLst/>
+    <dgm:txLinClrLst/>
+    <dgm:txFillClrLst/>
+    <dgm:txEffectClrLst/>
+  </dgm:styleLbl>
+  <dgm:styleLbl name="node3">
+    <dgm:fillClrLst>
+      <a:schemeClr val="accent1">
+        <a:tint val="80000"/>
+      </a:schemeClr>
+    </dgm:fillClrLst>
+    <dgm:linClrLst meth="repeat">
+      <a:schemeClr val="lt1"/>
+    </dgm:linClrLst>
+    <dgm:effectClrLst/>
+    <dgm:txLinClrLst/>
+    <dgm:txFillClrLst/>
+    <dgm:txEffectClrLst/>
+  </dgm:styleLbl>
+  <dgm:styleLbl name="node4">
+    <dgm:fillClrLst>
+      <a:schemeClr val="accent1">
+        <a:tint val="70000"/>
+      </a:schemeClr>
+    </dgm:fillClrLst>
+    <dgm:linClrLst meth="repeat">
+      <a:schemeClr val="lt1"/>
+    </dgm:linClrLst>
+    <dgm:effectClrLst/>
+    <dgm:txLinClrLst/>
+    <dgm:txFillClrLst/>
+    <dgm:txEffectClrLst/>
+  </dgm:styleLbl>
+  <dgm:styleLbl name="fgImgPlace1">
+    <dgm:fillClrLst>
+      <a:schemeClr val="accent1">
+        <a:tint val="50000"/>
+      </a:schemeClr>
+      <a:schemeClr val="accent1">
+        <a:tint val="20000"/>
+      </a:schemeClr>
+    </dgm:fillClrLst>
+    <dgm:linClrLst meth="repeat">
+      <a:schemeClr val="lt1"/>
+    </dgm:linClrLst>
+    <dgm:effectClrLst/>
+    <dgm:txLinClrLst/>
+    <dgm:txFillClrLst meth="repeat">
+      <a:schemeClr val="lt1"/>
+    </dgm:txFillClrLst>
+    <dgm:txEffectClrLst/>
+  </dgm:styleLbl>
+  <dgm:styleLbl name="alignImgPlace1">
+    <dgm:fillClrLst>
+      <a:schemeClr val="accent1">
+        <a:tint val="50000"/>
+      </a:schemeClr>
+      <a:schemeClr val="accent1">
+        <a:tint val="20000"/>
+      </a:schemeClr>
+    </dgm:fillClrLst>
+    <dgm:linClrLst meth="repeat">
+      <a:schemeClr val="lt1"/>
+    </dgm:linClrLst>
+    <dgm:effectClrLst/>
+    <dgm:txLinClrLst/>
+    <dgm:txFillClrLst meth="repeat">
+      <a:schemeClr val="lt1"/>
+    </dgm:txFillClrLst>
+    <dgm:txEffectClrLst/>
+  </dgm:styleLbl>
+  <dgm:styleLbl name="bgImgPlace1">
+    <dgm:fillClrLst>
+      <a:schemeClr val="accent1">
+        <a:tint val="50000"/>
+      </a:schemeClr>
+      <a:schemeClr val="accent1">
+        <a:tint val="20000"/>
+      </a:schemeClr>
+    </dgm:fillClrLst>
+    <dgm:linClrLst meth="repeat">
+      <a:schemeClr val="lt1"/>
+    </dgm:linClrLst>
+    <dgm:effectClrLst/>
+    <dgm:txLinClrLst/>
+    <dgm:txFillClrLst meth="repeat">
+      <a:schemeClr val="lt1"/>
+    </dgm:txFillClrLst>
+    <dgm:txEffectClrLst/>
+  </dgm:styleLbl>
+  <dgm:styleLbl name="sibTrans2D1">
+    <dgm:fillClrLst>
+      <a:schemeClr val="accent1">
+        <a:shade val="90000"/>
+      </a:schemeClr>
+      <a:schemeClr val="accent1">
+        <a:tint val="70000"/>
+      </a:schemeClr>
+    </dgm:fillClrLst>
+    <dgm:linClrLst>
+      <a:schemeClr val="accent1">
+        <a:shade val="90000"/>
+      </a:schemeClr>
+      <a:schemeClr val="accent1">
+        <a:tint val="70000"/>
+      </a:schemeClr>
+    </dgm:linClrLst>
+    <dgm:effectClrLst/>
+    <dgm:txLinClrLst/>
+    <dgm:txFillClrLst/>
+    <dgm:txEffectClrLst/>
+  </dgm:styleLbl>
+  <dgm:styleLbl name="fgSibTrans2D1">
+    <dgm:fillClrLst>
+      <a:schemeClr val="accent1">
+        <a:shade val="90000"/>
+      </a:schemeClr>
+      <a:schemeClr val="accent1">
+        <a:tint val="70000"/>
+      </a:schemeClr>
+    </dgm:fillClrLst>
+    <dgm:linClrLst>
+      <a:schemeClr val="accent1">
+        <a:shade val="90000"/>
+      </a:schemeClr>
+      <a:schemeClr val="accent1">
+        <a:tint val="70000"/>
+      </a:schemeClr>
+    </dgm:linClrLst>
+    <dgm:effectClrLst/>
+    <dgm:txLinClrLst/>
+    <dgm:txFillClrLst meth="repeat">
+      <a:schemeClr val="lt1"/>
+    </dgm:txFillClrLst>
+    <dgm:txEffectClrLst/>
+  </dgm:styleLbl>
+  <dgm:styleLbl name="bgSibTrans2D1">
+    <dgm:fillClrLst>
+      <a:schemeClr val="accent1">
+        <a:shade val="90000"/>
+      </a:schemeClr>
+      <a:schemeClr val="accent1">
+        <a:tint val="70000"/>
+      </a:schemeClr>
+    </dgm:fillClrLst>
+    <dgm:linClrLst>
+      <a:schemeClr val="accent1">
+        <a:shade val="90000"/>
+      </a:schemeClr>
+      <a:schemeClr val="accent1">
+        <a:tint val="70000"/>
+      </a:schemeClr>
+    </dgm:linClrLst>
+    <dgm:effectClrLst/>
+    <dgm:txLinClrLst/>
+    <dgm:txFillClrLst meth="repeat">
+      <a:schemeClr val="lt1"/>
+    </dgm:txFillClrLst>
+    <dgm:txEffectClrLst/>
+  </dgm:styleLbl>
+  <dgm:styleLbl name="sibTrans1D1">
+    <dgm:fillClrLst>
+      <a:schemeClr val="accent1">
+        <a:shade val="90000"/>
+      </a:schemeClr>
+      <a:schemeClr val="accent1">
+        <a:tint val="70000"/>
+      </a:schemeClr>
+    </dgm:fillClrLst>
+    <dgm:linClrLst>
+      <a:schemeClr val="accent1">
+        <a:shade val="90000"/>
+      </a:schemeClr>
+      <a:schemeClr val="accent1">
+        <a:tint val="70000"/>
+      </a:schemeClr>
+    </dgm:linClrLst>
+    <dgm:effectClrLst/>
+    <dgm:txLinClrLst/>
+    <dgm:txFillClrLst meth="repeat">
+      <a:schemeClr val="tx1"/>
+    </dgm:txFillClrLst>
+    <dgm:txEffectClrLst/>
+  </dgm:styleLbl>
+  <dgm:styleLbl name="callout">
+    <dgm:fillClrLst meth="repeat">
+      <a:schemeClr val="accent1"/>
+    </dgm:fillClrLst>
+    <dgm:linClrLst meth="repeat">
+      <a:schemeClr val="accent1"/>
+    </dgm:linClrLst>
+    <dgm:effectClrLst/>
+    <dgm:txLinClrLst/>
+    <dgm:txFillClrLst meth="repeat">
+      <a:schemeClr val="tx1"/>
+    </dgm:txFillClrLst>
+    <dgm:txEffectClrLst/>
+  </dgm:styleLbl>
+  <dgm:styleLbl name="asst0">
+    <dgm:fillClrLst meth="repeat">
+      <a:schemeClr val="accent1">
+        <a:shade val="80000"/>
+      </a:schemeClr>
+    </dgm:fillClrLst>
+    <dgm:linClrLst meth="repeat">
+      <a:schemeClr val="lt1"/>
+    </dgm:linClrLst>
+    <dgm:effectClrLst/>
+    <dgm:txLinClrLst/>
+    <dgm:txFillClrLst/>
+    <dgm:txEffectClrLst/>
+  </dgm:styleLbl>
+  <dgm:styleLbl name="asst1">
+    <dgm:fillClrLst meth="repeat">
+      <a:schemeClr val="accent1">
+        <a:shade val="80000"/>
+      </a:schemeClr>
+    </dgm:fillClrLst>
+    <dgm:linClrLst meth="repeat">
+      <a:schemeClr val="lt1"/>
+    </dgm:linClrLst>
+    <dgm:effectClrLst/>
+    <dgm:txLinClrLst/>
+    <dgm:txFillClrLst/>
+    <dgm:txEffectClrLst/>
+  </dgm:styleLbl>
+  <dgm:styleLbl name="asst2">
+    <dgm:fillClrLst>
+      <a:schemeClr val="accent1">
+        <a:tint val="99000"/>
+      </a:schemeClr>
+    </dgm:fillClrLst>
+    <dgm:linClrLst meth="repeat">
+      <a:schemeClr val="lt1"/>
+    </dgm:linClrLst>
+    <dgm:effectClrLst/>
+    <dgm:txLinClrLst/>
+    <dgm:txFillClrLst/>
+    <dgm:txEffectClrLst/>
+  </dgm:styleLbl>
+  <dgm:styleLbl name="asst3">
+    <dgm:fillClrLst>
+      <a:schemeClr val="accent1">
+        <a:tint val="80000"/>
+      </a:schemeClr>
+    </dgm:fillClrLst>
+    <dgm:linClrLst meth="repeat">
+      <a:schemeClr val="lt1"/>
+    </dgm:linClrLst>
+    <dgm:effectClrLst/>
+    <dgm:txLinClrLst/>
+    <dgm:txFillClrLst/>
+    <dgm:txEffectClrLst/>
+  </dgm:styleLbl>
+  <dgm:styleLbl name="asst4">
+    <dgm:fillClrLst>
+      <a:schemeClr val="accent1">
+        <a:tint val="70000"/>
+      </a:schemeClr>
+    </dgm:fillClrLst>
+    <dgm:linClrLst meth="repeat">
+      <a:schemeClr val="lt1"/>
+    </dgm:linClrLst>
+    <dgm:effectClrLst/>
+    <dgm:txLinClrLst/>
+    <dgm:txFillClrLst/>
+    <dgm:txEffectClrLst/>
+  </dgm:styleLbl>
+  <dgm:styleLbl name="parChTrans2D1">
+    <dgm:fillClrLst meth="repeat">
+      <a:schemeClr val="accent1">
+        <a:tint val="60000"/>
+      </a:schemeClr>
+    </dgm:fillClrLst>
+    <dgm:linClrLst meth="repeat">
+      <a:schemeClr val="accent1">
+        <a:tint val="60000"/>
+      </a:schemeClr>
+    </dgm:linClrLst>
+    <dgm:effectClrLst/>
+    <dgm:txLinClrLst/>
+    <dgm:txFillClrLst meth="repeat">
+      <a:schemeClr val="lt1"/>
+    </dgm:txFillClrLst>
+    <dgm:txEffectClrLst/>
+  </dgm:styleLbl>
+  <dgm:styleLbl name="parChTrans2D2">
+    <dgm:fillClrLst meth="repeat">
+      <a:schemeClr val="accent1">
+        <a:tint val="90000"/>
+      </a:schemeClr>
+    </dgm:fillClrLst>
+    <dgm:linClrLst meth="repeat">
+      <a:schemeClr val="accent1">
+        <a:tint val="90000"/>
+      </a:schemeClr>
+    </dgm:linClrLst>
+    <dgm:effectClrLst/>
+    <dgm:txLinClrLst/>
+    <dgm:txFillClrLst/>
+    <dgm:txEffectClrLst/>
+  </dgm:styleLbl>
+  <dgm:styleLbl name="parChTrans2D3">
+    <dgm:fillClrLst meth="repeat">
+      <a:schemeClr val="accent1">
+        <a:tint val="70000"/>
+      </a:schemeClr>
+    </dgm:fillClrLst>
+    <dgm:linClrLst meth="repeat">
+      <a:schemeClr val="accent1">
+        <a:tint val="70000"/>
+      </a:schemeClr>
+    </dgm:linClrLst>
+    <dgm:effectClrLst/>
+    <dgm:txLinClrLst/>
+    <dgm:txFillClrLst/>
+    <dgm:txEffectClrLst/>
+  </dgm:styleLbl>
+  <dgm:styleLbl name="parChTrans2D4">
+    <dgm:fillClrLst meth="repeat">
+      <a:schemeClr val="accent1">
+        <a:tint val="50000"/>
+      </a:schemeClr>
+    </dgm:fillClrLst>
+    <dgm:linClrLst meth="repeat">
+      <a:schemeClr val="accent1">
+        <a:tint val="50000"/>
+      </a:schemeClr>
+    </dgm:linClrLst>
+    <dgm:effectClrLst/>
+    <dgm:txLinClrLst/>
+    <dgm:txFillClrLst meth="repeat">
+      <a:schemeClr val="lt1"/>
+    </dgm:txFillClrLst>
+    <dgm:txEffectClrLst/>
+  </dgm:styleLbl>
+  <dgm:styleLbl name="parChTrans1D1">
+    <dgm:fillClrLst meth="repeat">
+      <a:schemeClr val="accent1">
+        <a:shade val="80000"/>
+      </a:schemeClr>
+    </dgm:fillClrLst>
+    <dgm:linClrLst meth="repeat">
+      <a:schemeClr val="accent1">
+        <a:shade val="80000"/>
+      </a:schemeClr>
+    </dgm:linClrLst>
+    <dgm:effectClrLst/>
+    <dgm:txLinClrLst/>
+    <dgm:txFillClrLst meth="repeat">
+      <a:schemeClr val="tx1"/>
+    </dgm:txFillClrLst>
+    <dgm:txEffectClrLst/>
+  </dgm:styleLbl>
+  <dgm:styleLbl name="parChTrans1D2">
+    <dgm:fillClrLst meth="repeat">
+      <a:schemeClr val="accent1">
+        <a:tint val="99000"/>
+      </a:schemeClr>
+    </dgm:fillClrLst>
+    <dgm:linClrLst meth="repeat">
+      <a:schemeClr val="accent1">
+        <a:tint val="99000"/>
+      </a:schemeClr>
+    </dgm:linClrLst>
+    <dgm:effectClrLst/>
+    <dgm:txLinClrLst/>
+    <dgm:txFillClrLst meth="repeat">
+      <a:schemeClr val="tx1"/>
+    </dgm:txFillClrLst>
+    <dgm:txEffectClrLst/>
+  </dgm:styleLbl>
+  <dgm:styleLbl name="parChTrans1D3">
+    <dgm:fillClrLst meth="repeat">
+      <a:schemeClr val="accent1">
+        <a:tint val="80000"/>
+      </a:schemeClr>
+    </dgm:fillClrLst>
+    <dgm:linClrLst meth="repeat">
+      <a:schemeClr val="accent1">
+        <a:tint val="80000"/>
+      </a:schemeClr>
+    </dgm:linClrLst>
+    <dgm:effectClrLst/>
+    <dgm:txLinClrLst/>
+    <dgm:txFillClrLst meth="repeat">
+      <a:schemeClr val="tx1"/>
+    </dgm:txFillClrLst>
+    <dgm:txEffectClrLst/>
+  </dgm:styleLbl>
+  <dgm:styleLbl name="parChTrans1D4">
+    <dgm:fillClrLst meth="repeat">
+      <a:schemeClr val="accent1">
+        <a:tint val="70000"/>
+      </a:schemeClr>
+    </dgm:fillClrLst>
+    <dgm:linClrLst meth="repeat">
+      <a:schemeClr val="accent1">
+        <a:tint val="70000"/>
+      </a:schemeClr>
+    </dgm:linClrLst>
+    <dgm:effectClrLst/>
+    <dgm:txLinClrLst/>
+    <dgm:txFillClrLst meth="repeat">
+      <a:schemeClr val="tx1"/>
+    </dgm:txFillClrLst>
+    <dgm:txEffectClrLst/>
+  </dgm:styleLbl>
+  <dgm:styleLbl name="fgAcc1">
+    <dgm:fillClrLst meth="repeat">
+      <a:schemeClr val="lt1">
+        <a:alpha val="90000"/>
+      </a:schemeClr>
+    </dgm:fillClrLst>
+    <dgm:linClrLst>
+      <a:schemeClr val="accent1">
+        <a:shade val="80000"/>
+      </a:schemeClr>
+      <a:schemeClr val="accent1">
+        <a:tint val="70000"/>
+      </a:schemeClr>
+    </dgm:linClrLst>
+    <dgm:effectClrLst/>
+    <dgm:txLinClrLst/>
+    <dgm:txFillClrLst meth="repeat">
+      <a:schemeClr val="dk1"/>
+    </dgm:txFillClrLst>
+    <dgm:txEffectClrLst/>
+  </dgm:styleLbl>
+  <dgm:styleLbl name="conFgAcc1">
+    <dgm:fillClrLst meth="repeat">
+      <a:schemeClr val="lt1">
+        <a:alpha val="90000"/>
+      </a:schemeClr>
+    </dgm:fillClrLst>
+    <dgm:linClrLst>
+      <a:schemeClr val="accent1">
+        <a:shade val="80000"/>
+      </a:schemeClr>
+      <a:schemeClr val="accent1">
+        <a:tint val="70000"/>
+      </a:schemeClr>
+    </dgm:linClrLst>
+    <dgm:effectClrLst/>
+    <dgm:txLinClrLst/>
+    <dgm:txFillClrLst meth="repeat">
+      <a:schemeClr val="dk1"/>
+    </dgm:txFillClrLst>
+    <dgm:txEffectClrLst/>
+  </dgm:styleLbl>
+  <dgm:styleLbl name="alignAcc1">
+    <dgm:fillClrLst meth="repeat">
+      <a:schemeClr val="lt1">
+        <a:alpha val="90000"/>
+      </a:schemeClr>
+    </dgm:fillClrLst>
+    <dgm:linClrLst>
+      <a:schemeClr val="accent1">
+        <a:shade val="80000"/>
+      </a:schemeClr>
+      <a:schemeClr val="accent1">
+        <a:tint val="70000"/>
+      </a:schemeClr>
+    </dgm:linClrLst>
+    <dgm:effectClrLst/>
+    <dgm:txLinClrLst/>
+    <dgm:txFillClrLst meth="repeat">
+      <a:schemeClr val="dk1"/>
+    </dgm:txFillClrLst>
+    <dgm:txEffectClrLst/>
+  </dgm:styleLbl>
+  <dgm:styleLbl name="trAlignAcc1">
+    <dgm:fillClrLst meth="repeat">
+      <a:schemeClr val="lt1">
+        <a:alpha val="40000"/>
+      </a:schemeClr>
+    </dgm:fillClrLst>
+    <dgm:linClrLst meth="repeat">
+      <a:schemeClr val="accent1"/>
+    </dgm:linClrLst>
+    <dgm:effectClrLst/>
+    <dgm:txLinClrLst/>
+    <dgm:txFillClrLst meth="repeat">
+      <a:schemeClr val="dk1"/>
+    </dgm:txFillClrLst>
+    <dgm:txEffectClrLst/>
+  </dgm:styleLbl>
+  <dgm:styleLbl name="bgAcc1">
+    <dgm:fillClrLst meth="repeat">
+      <a:schemeClr val="lt1">
+        <a:alpha val="90000"/>
+      </a:schemeClr>
+    </dgm:fillClrLst>
+    <dgm:linClrLst>
+      <a:schemeClr val="accent1">
+        <a:shade val="80000"/>
+      </a:schemeClr>
+      <a:schemeClr val="accent1">
+        <a:tint val="70000"/>
+      </a:schemeClr>
+    </dgm:linClrLst>
+    <dgm:effectClrLst/>
+    <dgm:txLinClrLst/>
+    <dgm:txFillClrLst meth="repeat">
+      <a:schemeClr val="dk1"/>
+    </dgm:txFillClrLst>
+    <dgm:txEffectClrLst/>
+  </dgm:styleLbl>
+  <dgm:styleLbl name="solidFgAcc1">
+    <dgm:fillClrLst meth="repeat">
+      <a:schemeClr val="lt1"/>
+    </dgm:fillClrLst>
+    <dgm:linClrLst>
+      <a:schemeClr val="accent1">
+        <a:shade val="80000"/>
+      </a:schemeClr>
+      <a:schemeClr val="accent1">
+        <a:tint val="70000"/>
+      </a:schemeClr>
+    </dgm:linClrLst>
+    <dgm:effectClrLst/>
+    <dgm:txLinClrLst/>
+    <dgm:txFillClrLst meth="repeat">
+      <a:schemeClr val="dk1"/>
+    </dgm:txFillClrLst>
+    <dgm:txEffectClrLst/>
+  </dgm:styleLbl>
+  <dgm:styleLbl name="solidAlignAcc1">
+    <dgm:fillClrLst meth="repeat">
+      <a:schemeClr val="lt1"/>
+    </dgm:fillClrLst>
+    <dgm:linClrLst meth="repeat">
+      <a:schemeClr val="accent1"/>
+    </dgm:linClrLst>
+    <dgm:effectClrLst/>
+    <dgm:txLinClrLst/>
+    <dgm:txFillClrLst meth="repeat">
+      <a:schemeClr val="dk1"/>
+    </dgm:txFillClrLst>
+    <dgm:txEffectClrLst/>
+  </dgm:styleLbl>
+  <dgm:styleLbl name="solidBgAcc1">
+    <dgm:fillClrLst meth="repeat">
+      <a:schemeClr val="lt1"/>
+    </dgm:fillClrLst>
+    <dgm:linClrLst meth="repeat">
+      <a:schemeClr val="accent1"/>
+    </dgm:linClrLst>
+    <dgm:effectClrLst/>
+    <dgm:txLinClrLst/>
+    <dgm:txFillClrLst meth="repeat">
+      <a:schemeClr val="dk1"/>
+    </dgm:txFillClrLst>
+    <dgm:txEffectClrLst/>
+  </dgm:styleLbl>
+  <dgm:styleLbl name="fgAccFollowNode1">
+    <dgm:fillClrLst meth="repeat">
+      <a:schemeClr val="accent1">
+        <a:alpha val="90000"/>
+        <a:tint val="40000"/>
+      </a:schemeClr>
+    </dgm:fillClrLst>
+    <dgm:linClrLst meth="repeat">
+      <a:schemeClr val="accent1">
+        <a:alpha val="90000"/>
+        <a:tint val="40000"/>
+      </a:schemeClr>
+    </dgm:linClrLst>
+    <dgm:effectClrLst/>
+    <dgm:txLinClrLst/>
+    <dgm:txFillClrLst meth="repeat">
+      <a:schemeClr val="dk1"/>
+    </dgm:txFillClrLst>
+    <dgm:txEffectClrLst/>
+  </dgm:styleLbl>
+  <dgm:styleLbl name="alignAccFollowNode1">
+    <dgm:fillClrLst meth="repeat">
+      <a:schemeClr val="accent1">
+        <a:alpha val="90000"/>
+        <a:tint val="40000"/>
+      </a:schemeClr>
+    </dgm:fillClrLst>
+    <dgm:linClrLst meth="repeat">
+      <a:schemeClr val="accent1">
+        <a:alpha val="90000"/>
+        <a:tint val="40000"/>
+      </a:schemeClr>
+    </dgm:linClrLst>
+    <dgm:effectClrLst/>
+    <dgm:txLinClrLst/>
+    <dgm:txFillClrLst meth="repeat">
+      <a:schemeClr val="dk1"/>
+    </dgm:txFillClrLst>
+    <dgm:txEffectClrLst/>
+  </dgm:styleLbl>
+  <dgm:styleLbl name="bgAccFollowNode1">
+    <dgm:fillClrLst meth="repeat">
+      <a:schemeClr val="accent1">
+        <a:alpha val="90000"/>
+        <a:tint val="40000"/>
+      </a:schemeClr>
+    </dgm:fillClrLst>
+    <dgm:linClrLst meth="repeat">
+      <a:schemeClr val="lt1"/>
+    </dgm:linClrLst>
+    <dgm:effectClrLst/>
+    <dgm:txLinClrLst/>
+    <dgm:txFillClrLst meth="repeat">
+      <a:schemeClr val="dk1"/>
+    </dgm:txFillClrLst>
+    <dgm:txEffectClrLst/>
+  </dgm:styleLbl>
+  <dgm:styleLbl name="fgAcc0">
+    <dgm:fillClrLst meth="repeat">
+      <a:schemeClr val="lt1">
+        <a:alpha val="90000"/>
+      </a:schemeClr>
+    </dgm:fillClrLst>
+    <dgm:linClrLst meth="repeat">
+      <a:schemeClr val="accent1">
+        <a:shade val="80000"/>
+      </a:schemeClr>
+    </dgm:linClrLst>
+    <dgm:effectClrLst/>
+    <dgm:txLinClrLst/>
+    <dgm:txFillClrLst meth="repeat">
+      <a:schemeClr val="dk1"/>
+    </dgm:txFillClrLst>
+    <dgm:txEffectClrLst/>
+  </dgm:styleLbl>
+  <dgm:styleLbl name="fgAcc2">
+    <dgm:fillClrLst meth="repeat">
+      <a:schemeClr val="lt1">
+        <a:alpha val="90000"/>
+      </a:schemeClr>
+    </dgm:fillClrLst>
+    <dgm:linClrLst meth="repeat">
+      <a:schemeClr val="accent1">
+        <a:tint val="99000"/>
+      </a:schemeClr>
+    </dgm:linClrLst>
+    <dgm:effectClrLst/>
+    <dgm:txLinClrLst/>
+    <dgm:txFillClrLst meth="repeat">
+      <a:schemeClr val="dk1"/>
+    </dgm:txFillClrLst>
+    <dgm:txEffectClrLst/>
+  </dgm:styleLbl>
+  <dgm:styleLbl name="fgAcc3">
+    <dgm:fillClrLst meth="repeat">
+      <a:schemeClr val="lt1">
+        <a:alpha val="90000"/>
+      </a:schemeClr>
+    </dgm:fillClrLst>
+    <dgm:linClrLst meth="repeat">
+      <a:schemeClr val="accent1">
+        <a:tint val="80000"/>
+      </a:schemeClr>
+    </dgm:linClrLst>
+    <dgm:effectClrLst/>
+    <dgm:txLinClrLst/>
+    <dgm:txFillClrLst meth="repeat">
+      <a:schemeClr val="dk1"/>
+    </dgm:txFillClrLst>
+    <dgm:txEffectClrLst/>
+  </dgm:styleLbl>
+  <dgm:styleLbl name="fgAcc4">
+    <dgm:fillClrLst meth="repeat">
+      <a:schemeClr val="lt1">
+        <a:alpha val="90000"/>
+      </a:schemeClr>
+    </dgm:fillClrLst>
+    <dgm:linClrLst meth="repeat">
+      <a:schemeClr val="accent1">
+        <a:tint val="70000"/>
+      </a:schemeClr>
+    </dgm:linClrLst>
+    <dgm:effectClrLst/>
+    <dgm:txLinClrLst/>
+    <dgm:txFillClrLst meth="repeat">
+      <a:schemeClr val="dk1"/>
+    </dgm:txFillClrLst>
+    <dgm:txEffectClrLst/>
+  </dgm:styleLbl>
+  <dgm:styleLbl name="bgShp">
+    <dgm:fillClrLst meth="repeat">
+      <a:schemeClr val="accent1">
+        <a:tint val="40000"/>
+      </a:schemeClr>
+    </dgm:fillClrLst>
+    <dgm:linClrLst meth="repeat">
+      <a:schemeClr val="dk1"/>
+    </dgm:linClrLst>
+    <dgm:effectClrLst/>
+    <dgm:txLinClrLst/>
+    <dgm:txFillClrLst meth="repeat">
+      <a:schemeClr val="dk1"/>
+    </dgm:txFillClrLst>
+    <dgm:txEffectClrLst/>
+  </dgm:styleLbl>
+  <dgm:styleLbl name="dkBgShp">
+    <dgm:fillClrLst meth="repeat">
+      <a:schemeClr val="accent1">
+        <a:shade val="90000"/>
+      </a:schemeClr>
+    </dgm:fillClrLst>
+    <dgm:linClrLst meth="repeat">
+      <a:schemeClr val="dk1"/>
+    </dgm:linClrLst>
+    <dgm:effectClrLst/>
+    <dgm:txLinClrLst/>
+    <dgm:txFillClrLst meth="repeat">
+      <a:schemeClr val="lt1"/>
+    </dgm:txFillClrLst>
+    <dgm:txEffectClrLst/>
+  </dgm:styleLbl>
+  <dgm:styleLbl name="trBgShp">
+    <dgm:fillClrLst meth="repeat">
+      <a:schemeClr val="accent1">
+        <a:tint val="50000"/>
+        <a:alpha val="40000"/>
+      </a:schemeClr>
+    </dgm:fillClrLst>
+    <dgm:linClrLst meth="repeat">
+      <a:schemeClr val="accent1"/>
+    </dgm:linClrLst>
+    <dgm:effectClrLst/>
+    <dgm:txLinClrLst/>
+    <dgm:txFillClrLst meth="repeat">
+      <a:schemeClr val="lt1"/>
+    </dgm:txFillClrLst>
+    <dgm:txEffectClrLst/>
+  </dgm:styleLbl>
+  <dgm:styleLbl name="fgShp">
+    <dgm:fillClrLst meth="repeat">
+      <a:schemeClr val="accent1">
+        <a:tint val="40000"/>
+      </a:schemeClr>
+    </dgm:fillClrLst>
+    <dgm:linClrLst meth="repeat">
+      <a:schemeClr val="lt1"/>
+    </dgm:linClrLst>
+    <dgm:effectClrLst/>
+    <dgm:txLinClrLst/>
+    <dgm:txFillClrLst meth="repeat">
+      <a:schemeClr val="dk1"/>
+    </dgm:txFillClrLst>
+    <dgm:txEffectClrLst/>
+  </dgm:styleLbl>
+  <dgm:styleLbl name="revTx">
+    <dgm:fillClrLst meth="repeat">
+      <a:schemeClr val="lt1">
+        <a:alpha val="0"/>
+      </a:schemeClr>
+    </dgm:fillClrLst>
+    <dgm:linClrLst meth="repeat">
+      <a:schemeClr val="dk1">
+        <a:alpha val="0"/>
+      </a:schemeClr>
+    </dgm:linClrLst>
+    <dgm:effectClrLst/>
+    <dgm:txLinClrLst/>
+    <dgm:txFillClrLst meth="repeat">
+      <a:schemeClr val="tx1"/>
+    </dgm:txFillClrLst>
+    <dgm:txEffectClrLst/>
+  </dgm:styleLbl>
+</dgm:colorsDef>
+</file>
+
+<file path=ppt/diagrams/colors4.xml><?xml version="1.0" encoding="utf-8"?>
 <dgm:colorsDef xmlns:dgm="http://schemas.openxmlformats.org/drawingml/2006/diagram" xmlns:a="http://schemas.openxmlformats.org/drawingml/2006/main" uniqueId="urn:microsoft.com/office/officeart/2005/8/colors/accent1_3">
   <dgm:title val=""/>
   <dgm:desc val=""/>
@@ -3627,6 +4505,447 @@
 </file>
 
 <file path=ppt/diagrams/data3.xml><?xml version="1.0" encoding="utf-8"?>
+<dgm:dataModel xmlns:dgm="http://schemas.openxmlformats.org/drawingml/2006/diagram" xmlns:a="http://schemas.openxmlformats.org/drawingml/2006/main">
+  <dgm:ptLst>
+    <dgm:pt modelId="{6A70FD8F-0050-42E3-8B3A-6ED7CFB9852E}" type="doc">
+      <dgm:prSet loTypeId="urn:microsoft.com/office/officeart/2016/7/layout/RoundedRectangleTimeline" loCatId="process" qsTypeId="urn:microsoft.com/office/officeart/2005/8/quickstyle/simple1" qsCatId="simple" csTypeId="urn:microsoft.com/office/officeart/2005/8/colors/accent1_3" csCatId="accent1" phldr="1"/>
+      <dgm:spPr/>
+      <dgm:t>
+        <a:bodyPr/>
+        <a:lstStyle/>
+        <a:p>
+          <a:endParaRPr lang="en-US"/>
+        </a:p>
+      </dgm:t>
+    </dgm:pt>
+    <dgm:pt modelId="{8DB5D7D5-6A1C-4ABC-8850-759A9D876047}">
+      <dgm:prSet/>
+      <dgm:spPr/>
+      <dgm:t>
+        <a:bodyPr/>
+        <a:lstStyle/>
+        <a:p>
+          <a:r>
+            <a:rPr lang="en-US" dirty="0"/>
+            <a:t>2017</a:t>
+          </a:r>
+        </a:p>
+      </dgm:t>
+    </dgm:pt>
+    <dgm:pt modelId="{D8874F40-D7B0-41DE-BB6F-A6014FEAB2D7}" type="parTrans" cxnId="{C5202EE1-10E9-4076-9D55-9E0CF8B152AF}">
+      <dgm:prSet/>
+      <dgm:spPr/>
+      <dgm:t>
+        <a:bodyPr/>
+        <a:lstStyle/>
+        <a:p>
+          <a:endParaRPr lang="en-US"/>
+        </a:p>
+      </dgm:t>
+    </dgm:pt>
+    <dgm:pt modelId="{BD6E0A2E-99C8-4F5A-971A-CD211D1099FF}" type="sibTrans" cxnId="{C5202EE1-10E9-4076-9D55-9E0CF8B152AF}">
+      <dgm:prSet/>
+      <dgm:spPr/>
+      <dgm:t>
+        <a:bodyPr/>
+        <a:lstStyle/>
+        <a:p>
+          <a:endParaRPr lang="en-US"/>
+        </a:p>
+      </dgm:t>
+    </dgm:pt>
+    <dgm:pt modelId="{96262926-A67D-4E4E-9515-5EBC67F0B634}">
+      <dgm:prSet/>
+      <dgm:spPr/>
+      <dgm:t>
+        <a:bodyPr/>
+        <a:lstStyle/>
+        <a:p>
+          <a:r>
+            <a:rPr lang="en-US" dirty="0"/>
+            <a:t>Lorem ipsum dolor sit amet</a:t>
+          </a:r>
+        </a:p>
+      </dgm:t>
+    </dgm:pt>
+    <dgm:pt modelId="{EC74E552-C501-4B0E-9400-E8B410F53D50}" type="parTrans" cxnId="{8C5B110A-FBC3-4CBF-BED2-413E87D4DAD5}">
+      <dgm:prSet/>
+      <dgm:spPr/>
+      <dgm:t>
+        <a:bodyPr/>
+        <a:lstStyle/>
+        <a:p>
+          <a:endParaRPr lang="en-US"/>
+        </a:p>
+      </dgm:t>
+    </dgm:pt>
+    <dgm:pt modelId="{1DA7ACEB-F642-43C1-BCB5-F580B9B985B9}" type="sibTrans" cxnId="{8C5B110A-FBC3-4CBF-BED2-413E87D4DAD5}">
+      <dgm:prSet/>
+      <dgm:spPr/>
+      <dgm:t>
+        <a:bodyPr/>
+        <a:lstStyle/>
+        <a:p>
+          <a:endParaRPr lang="en-US"/>
+        </a:p>
+      </dgm:t>
+    </dgm:pt>
+    <dgm:pt modelId="{C5146535-FD3D-4589-98A3-623B8DA4B8DB}">
+      <dgm:prSet/>
+      <dgm:spPr/>
+      <dgm:t>
+        <a:bodyPr/>
+        <a:lstStyle/>
+        <a:p>
+          <a:r>
+            <a:rPr lang="en-US" dirty="0"/>
+            <a:t>2018</a:t>
+          </a:r>
+        </a:p>
+      </dgm:t>
+    </dgm:pt>
+    <dgm:pt modelId="{20848F78-EC70-4162-96CE-CC68006930F0}" type="parTrans" cxnId="{8EBF857E-7408-4941-91E4-293B0F59EEF7}">
+      <dgm:prSet/>
+      <dgm:spPr/>
+      <dgm:t>
+        <a:bodyPr/>
+        <a:lstStyle/>
+        <a:p>
+          <a:endParaRPr lang="en-US"/>
+        </a:p>
+      </dgm:t>
+    </dgm:pt>
+    <dgm:pt modelId="{7A3CCAF8-AC3A-401E-AEDD-44BBC1AA9C31}" type="sibTrans" cxnId="{8EBF857E-7408-4941-91E4-293B0F59EEF7}">
+      <dgm:prSet/>
+      <dgm:spPr/>
+      <dgm:t>
+        <a:bodyPr/>
+        <a:lstStyle/>
+        <a:p>
+          <a:endParaRPr lang="en-US"/>
+        </a:p>
+      </dgm:t>
+    </dgm:pt>
+    <dgm:pt modelId="{E80CA270-6C90-4E17-ACEA-46B56AD54DD1}">
+      <dgm:prSet/>
+      <dgm:spPr/>
+      <dgm:t>
+        <a:bodyPr/>
+        <a:lstStyle/>
+        <a:p>
+          <a:r>
+            <a:rPr lang="en-US" dirty="0"/>
+            <a:t>Lorem ipsum dolor sit amet</a:t>
+          </a:r>
+        </a:p>
+      </dgm:t>
+    </dgm:pt>
+    <dgm:pt modelId="{7EEC8067-96EF-4BE0-8BE3-BA59ED78A31F}" type="parTrans" cxnId="{2DC28DF8-5C1B-4F53-A4C1-D5B63FB54BAF}">
+      <dgm:prSet/>
+      <dgm:spPr/>
+      <dgm:t>
+        <a:bodyPr/>
+        <a:lstStyle/>
+        <a:p>
+          <a:endParaRPr lang="en-US"/>
+        </a:p>
+      </dgm:t>
+    </dgm:pt>
+    <dgm:pt modelId="{1AFE46E5-6B07-4894-8ECB-21BD7E7B8AF1}" type="sibTrans" cxnId="{2DC28DF8-5C1B-4F53-A4C1-D5B63FB54BAF}">
+      <dgm:prSet/>
+      <dgm:spPr/>
+      <dgm:t>
+        <a:bodyPr/>
+        <a:lstStyle/>
+        <a:p>
+          <a:endParaRPr lang="en-US"/>
+        </a:p>
+      </dgm:t>
+    </dgm:pt>
+    <dgm:pt modelId="{09C152DA-7620-4852-8162-A77EC3609F3F}">
+      <dgm:prSet/>
+      <dgm:spPr/>
+      <dgm:t>
+        <a:bodyPr/>
+        <a:lstStyle/>
+        <a:p>
+          <a:r>
+            <a:rPr lang="en-US" dirty="0"/>
+            <a:t>2019</a:t>
+          </a:r>
+        </a:p>
+      </dgm:t>
+    </dgm:pt>
+    <dgm:pt modelId="{9F6D14C0-6C82-4CBD-8D6D-B0E117B6F2ED}" type="parTrans" cxnId="{23ECAC8B-17A4-4883-AA0E-06D66B7E788A}">
+      <dgm:prSet/>
+      <dgm:spPr/>
+      <dgm:t>
+        <a:bodyPr/>
+        <a:lstStyle/>
+        <a:p>
+          <a:endParaRPr lang="en-US"/>
+        </a:p>
+      </dgm:t>
+    </dgm:pt>
+    <dgm:pt modelId="{0AE8D36D-0F0F-4206-AE39-0A2D73987B68}" type="sibTrans" cxnId="{23ECAC8B-17A4-4883-AA0E-06D66B7E788A}">
+      <dgm:prSet/>
+      <dgm:spPr/>
+      <dgm:t>
+        <a:bodyPr/>
+        <a:lstStyle/>
+        <a:p>
+          <a:endParaRPr lang="en-US"/>
+        </a:p>
+      </dgm:t>
+    </dgm:pt>
+    <dgm:pt modelId="{6C8937BE-93F8-4DED-8538-1C601DAEBA66}">
+      <dgm:prSet/>
+      <dgm:spPr/>
+      <dgm:t>
+        <a:bodyPr/>
+        <a:lstStyle/>
+        <a:p>
+          <a:r>
+            <a:rPr lang="en-US" dirty="0"/>
+            <a:t>Lorem ipsum dolor sit amet</a:t>
+          </a:r>
+        </a:p>
+      </dgm:t>
+    </dgm:pt>
+    <dgm:pt modelId="{77D169C6-D77F-456D-B18B-D7BE016AD87A}" type="parTrans" cxnId="{FAA8D3DD-12E8-457D-9144-B037C5678347}">
+      <dgm:prSet/>
+      <dgm:spPr/>
+      <dgm:t>
+        <a:bodyPr/>
+        <a:lstStyle/>
+        <a:p>
+          <a:endParaRPr lang="en-US"/>
+        </a:p>
+      </dgm:t>
+    </dgm:pt>
+    <dgm:pt modelId="{A97BE953-FA9D-4BA6-A92C-494DB1F3BA59}" type="sibTrans" cxnId="{FAA8D3DD-12E8-457D-9144-B037C5678347}">
+      <dgm:prSet/>
+      <dgm:spPr/>
+      <dgm:t>
+        <a:bodyPr/>
+        <a:lstStyle/>
+        <a:p>
+          <a:endParaRPr lang="en-US"/>
+        </a:p>
+      </dgm:t>
+    </dgm:pt>
+    <dgm:pt modelId="{AB52B3CC-6563-466D-BFC3-9B6B5AFA0881}" type="pres">
+      <dgm:prSet presAssocID="{6A70FD8F-0050-42E3-8B3A-6ED7CFB9852E}" presName="Name0" presStyleCnt="0">
+        <dgm:presLayoutVars>
+          <dgm:chMax/>
+          <dgm:chPref/>
+          <dgm:animLvl val="lvl"/>
+        </dgm:presLayoutVars>
+      </dgm:prSet>
+      <dgm:spPr/>
+    </dgm:pt>
+    <dgm:pt modelId="{815EDF7B-AC93-4A61-87AA-CAA5D85C31A8}" type="pres">
+      <dgm:prSet presAssocID="{8DB5D7D5-6A1C-4ABC-8850-759A9D876047}" presName="composite1" presStyleCnt="0"/>
+      <dgm:spPr/>
+    </dgm:pt>
+    <dgm:pt modelId="{954381E7-0584-46DD-8108-E9BF4F2B5005}" type="pres">
+      <dgm:prSet presAssocID="{8DB5D7D5-6A1C-4ABC-8850-759A9D876047}" presName="parent1" presStyleLbl="alignNode1" presStyleIdx="0" presStyleCnt="3">
+        <dgm:presLayoutVars>
+          <dgm:chMax val="1"/>
+          <dgm:chPref val="1"/>
+          <dgm:bulletEnabled val="1"/>
+        </dgm:presLayoutVars>
+      </dgm:prSet>
+      <dgm:spPr/>
+    </dgm:pt>
+    <dgm:pt modelId="{5A1B764B-0DC5-47CD-BDEA-9E67799496EC}" type="pres">
+      <dgm:prSet presAssocID="{8DB5D7D5-6A1C-4ABC-8850-759A9D876047}" presName="Childtext1" presStyleLbl="revTx" presStyleIdx="0" presStyleCnt="3">
+        <dgm:presLayoutVars>
+          <dgm:bulletEnabled val="1"/>
+        </dgm:presLayoutVars>
+      </dgm:prSet>
+      <dgm:spPr/>
+    </dgm:pt>
+    <dgm:pt modelId="{122B38A3-0442-4747-820C-1F37877E2B0E}" type="pres">
+      <dgm:prSet presAssocID="{8DB5D7D5-6A1C-4ABC-8850-759A9D876047}" presName="ConnectLine1" presStyleLbl="sibTrans1D1" presStyleIdx="0" presStyleCnt="3"/>
+      <dgm:spPr>
+        <a:noFill/>
+        <a:ln w="12700" cap="rnd" cmpd="sng" algn="ctr">
+          <a:solidFill>
+            <a:schemeClr val="accent1">
+              <a:shade val="90000"/>
+              <a:hueOff val="93466"/>
+              <a:satOff val="1924"/>
+              <a:lumOff val="8231"/>
+              <a:alphaOff val="0"/>
+            </a:schemeClr>
+          </a:solidFill>
+          <a:prstDash val="dash"/>
+        </a:ln>
+        <a:effectLst/>
+      </dgm:spPr>
+    </dgm:pt>
+    <dgm:pt modelId="{A73181F6-69BB-4A47-8277-4671A45AC8C8}" type="pres">
+      <dgm:prSet presAssocID="{8DB5D7D5-6A1C-4ABC-8850-759A9D876047}" presName="ConnectLineEnd1" presStyleLbl="lnNode1" presStyleIdx="0" presStyleCnt="3"/>
+      <dgm:spPr/>
+    </dgm:pt>
+    <dgm:pt modelId="{6E76EADA-5F61-4A59-B2F8-FA10112079FC}" type="pres">
+      <dgm:prSet presAssocID="{8DB5D7D5-6A1C-4ABC-8850-759A9D876047}" presName="EmptyPane1" presStyleCnt="0"/>
+      <dgm:spPr/>
+    </dgm:pt>
+    <dgm:pt modelId="{A8189248-0785-43F1-844C-4DE92841F254}" type="pres">
+      <dgm:prSet presAssocID="{BD6E0A2E-99C8-4F5A-971A-CD211D1099FF}" presName="spaceBetweenRectangles1" presStyleCnt="0"/>
+      <dgm:spPr/>
+    </dgm:pt>
+    <dgm:pt modelId="{218D9CD7-D48D-464C-9A1C-0F322EC540B3}" type="pres">
+      <dgm:prSet presAssocID="{C5146535-FD3D-4589-98A3-623B8DA4B8DB}" presName="composite1" presStyleCnt="0"/>
+      <dgm:spPr/>
+    </dgm:pt>
+    <dgm:pt modelId="{30804A27-188E-4A17-8FFE-97BCCA0597B8}" type="pres">
+      <dgm:prSet presAssocID="{C5146535-FD3D-4589-98A3-623B8DA4B8DB}" presName="parent1" presStyleLbl="alignNode1" presStyleIdx="1" presStyleCnt="3">
+        <dgm:presLayoutVars>
+          <dgm:chMax val="1"/>
+          <dgm:chPref val="1"/>
+          <dgm:bulletEnabled val="1"/>
+        </dgm:presLayoutVars>
+      </dgm:prSet>
+      <dgm:spPr/>
+    </dgm:pt>
+    <dgm:pt modelId="{DF65791B-462E-4589-B98D-F60587330CA8}" type="pres">
+      <dgm:prSet presAssocID="{C5146535-FD3D-4589-98A3-623B8DA4B8DB}" presName="Childtext1" presStyleLbl="revTx" presStyleIdx="1" presStyleCnt="3">
+        <dgm:presLayoutVars>
+          <dgm:bulletEnabled val="1"/>
+        </dgm:presLayoutVars>
+      </dgm:prSet>
+      <dgm:spPr/>
+    </dgm:pt>
+    <dgm:pt modelId="{DBA410EB-5F61-4F46-92D9-C5B0AA59EE15}" type="pres">
+      <dgm:prSet presAssocID="{C5146535-FD3D-4589-98A3-623B8DA4B8DB}" presName="ConnectLine1" presStyleLbl="sibTrans1D1" presStyleIdx="1" presStyleCnt="3"/>
+      <dgm:spPr>
+        <a:noFill/>
+        <a:ln w="12700" cap="rnd" cmpd="sng" algn="ctr">
+          <a:solidFill>
+            <a:schemeClr val="accent1">
+              <a:shade val="90000"/>
+              <a:hueOff val="140199"/>
+              <a:satOff val="2886"/>
+              <a:lumOff val="12346"/>
+              <a:alphaOff val="0"/>
+            </a:schemeClr>
+          </a:solidFill>
+          <a:prstDash val="dash"/>
+        </a:ln>
+        <a:effectLst/>
+      </dgm:spPr>
+    </dgm:pt>
+    <dgm:pt modelId="{E1220EDB-B75C-43A5-B862-97E4C09130A7}" type="pres">
+      <dgm:prSet presAssocID="{C5146535-FD3D-4589-98A3-623B8DA4B8DB}" presName="ConnectLineEnd1" presStyleLbl="lnNode1" presStyleIdx="1" presStyleCnt="3"/>
+      <dgm:spPr/>
+    </dgm:pt>
+    <dgm:pt modelId="{D8849157-215F-4E70-9735-315E97B5AC5C}" type="pres">
+      <dgm:prSet presAssocID="{C5146535-FD3D-4589-98A3-623B8DA4B8DB}" presName="EmptyPane1" presStyleCnt="0"/>
+      <dgm:spPr/>
+    </dgm:pt>
+    <dgm:pt modelId="{7C467054-22FE-4C18-9934-29D7168DFF63}" type="pres">
+      <dgm:prSet presAssocID="{7A3CCAF8-AC3A-401E-AEDD-44BBC1AA9C31}" presName="spaceBetweenRectangles1" presStyleCnt="0"/>
+      <dgm:spPr/>
+    </dgm:pt>
+    <dgm:pt modelId="{3E3E944D-A6EC-4962-9AC1-C585A4F97BDA}" type="pres">
+      <dgm:prSet presAssocID="{09C152DA-7620-4852-8162-A77EC3609F3F}" presName="composite1" presStyleCnt="0"/>
+      <dgm:spPr/>
+    </dgm:pt>
+    <dgm:pt modelId="{566B79CB-1A41-4F5C-BF91-58D94BF93913}" type="pres">
+      <dgm:prSet presAssocID="{09C152DA-7620-4852-8162-A77EC3609F3F}" presName="parent1" presStyleLbl="alignNode1" presStyleIdx="2" presStyleCnt="3">
+        <dgm:presLayoutVars>
+          <dgm:chMax val="1"/>
+          <dgm:chPref val="1"/>
+          <dgm:bulletEnabled val="1"/>
+        </dgm:presLayoutVars>
+      </dgm:prSet>
+      <dgm:spPr/>
+    </dgm:pt>
+    <dgm:pt modelId="{B4723E2A-4FF1-452A-BD25-8EC364F15A6F}" type="pres">
+      <dgm:prSet presAssocID="{09C152DA-7620-4852-8162-A77EC3609F3F}" presName="Childtext1" presStyleLbl="revTx" presStyleIdx="2" presStyleCnt="3">
+        <dgm:presLayoutVars>
+          <dgm:bulletEnabled val="1"/>
+        </dgm:presLayoutVars>
+      </dgm:prSet>
+      <dgm:spPr/>
+    </dgm:pt>
+    <dgm:pt modelId="{440E9361-37D2-4157-AF38-7B49AD23708B}" type="pres">
+      <dgm:prSet presAssocID="{09C152DA-7620-4852-8162-A77EC3609F3F}" presName="ConnectLine1" presStyleLbl="sibTrans1D1" presStyleIdx="2" presStyleCnt="3"/>
+      <dgm:spPr>
+        <a:noFill/>
+        <a:ln w="12700" cap="rnd" cmpd="sng" algn="ctr">
+          <a:solidFill>
+            <a:schemeClr val="accent1">
+              <a:shade val="90000"/>
+              <a:hueOff val="186931"/>
+              <a:satOff val="3848"/>
+              <a:lumOff val="16461"/>
+              <a:alphaOff val="0"/>
+            </a:schemeClr>
+          </a:solidFill>
+          <a:prstDash val="dash"/>
+        </a:ln>
+        <a:effectLst/>
+      </dgm:spPr>
+    </dgm:pt>
+    <dgm:pt modelId="{C45E7B63-1C71-483E-A3A8-705CE86D4D8E}" type="pres">
+      <dgm:prSet presAssocID="{09C152DA-7620-4852-8162-A77EC3609F3F}" presName="ConnectLineEnd1" presStyleLbl="lnNode1" presStyleIdx="2" presStyleCnt="3"/>
+      <dgm:spPr/>
+    </dgm:pt>
+    <dgm:pt modelId="{4174F691-D9D3-451C-9893-D177DC3AED58}" type="pres">
+      <dgm:prSet presAssocID="{09C152DA-7620-4852-8162-A77EC3609F3F}" presName="EmptyPane1" presStyleCnt="0"/>
+      <dgm:spPr/>
+    </dgm:pt>
+  </dgm:ptLst>
+  <dgm:cxnLst>
+    <dgm:cxn modelId="{5C25BB02-FA66-40A4-9DA6-9E1CAE3A8D4E}" type="presOf" srcId="{C5146535-FD3D-4589-98A3-623B8DA4B8DB}" destId="{30804A27-188E-4A17-8FFE-97BCCA0597B8}" srcOrd="0" destOrd="0" presId="urn:microsoft.com/office/officeart/2016/7/layout/RoundedRectangleTimeline"/>
+    <dgm:cxn modelId="{8C5B110A-FBC3-4CBF-BED2-413E87D4DAD5}" srcId="{8DB5D7D5-6A1C-4ABC-8850-759A9D876047}" destId="{96262926-A67D-4E4E-9515-5EBC67F0B634}" srcOrd="0" destOrd="0" parTransId="{EC74E552-C501-4B0E-9400-E8B410F53D50}" sibTransId="{1DA7ACEB-F642-43C1-BCB5-F580B9B985B9}"/>
+    <dgm:cxn modelId="{84C67813-55CE-4EBC-9032-03BD847DC17E}" type="presOf" srcId="{6A70FD8F-0050-42E3-8B3A-6ED7CFB9852E}" destId="{AB52B3CC-6563-466D-BFC3-9B6B5AFA0881}" srcOrd="0" destOrd="0" presId="urn:microsoft.com/office/officeart/2016/7/layout/RoundedRectangleTimeline"/>
+    <dgm:cxn modelId="{22ECA226-C4EA-44F1-BCB5-77F78841DA6F}" type="presOf" srcId="{09C152DA-7620-4852-8162-A77EC3609F3F}" destId="{566B79CB-1A41-4F5C-BF91-58D94BF93913}" srcOrd="0" destOrd="0" presId="urn:microsoft.com/office/officeart/2016/7/layout/RoundedRectangleTimeline"/>
+    <dgm:cxn modelId="{E2BBA750-A5E4-4F50-BE16-016934379F81}" type="presOf" srcId="{6C8937BE-93F8-4DED-8538-1C601DAEBA66}" destId="{B4723E2A-4FF1-452A-BD25-8EC364F15A6F}" srcOrd="0" destOrd="0" presId="urn:microsoft.com/office/officeart/2016/7/layout/RoundedRectangleTimeline"/>
+    <dgm:cxn modelId="{F9B2D375-40BE-4E5D-AA88-61805FBFF819}" type="presOf" srcId="{8DB5D7D5-6A1C-4ABC-8850-759A9D876047}" destId="{954381E7-0584-46DD-8108-E9BF4F2B5005}" srcOrd="0" destOrd="0" presId="urn:microsoft.com/office/officeart/2016/7/layout/RoundedRectangleTimeline"/>
+    <dgm:cxn modelId="{8EBF857E-7408-4941-91E4-293B0F59EEF7}" srcId="{6A70FD8F-0050-42E3-8B3A-6ED7CFB9852E}" destId="{C5146535-FD3D-4589-98A3-623B8DA4B8DB}" srcOrd="1" destOrd="0" parTransId="{20848F78-EC70-4162-96CE-CC68006930F0}" sibTransId="{7A3CCAF8-AC3A-401E-AEDD-44BBC1AA9C31}"/>
+    <dgm:cxn modelId="{23ECAC8B-17A4-4883-AA0E-06D66B7E788A}" srcId="{6A70FD8F-0050-42E3-8B3A-6ED7CFB9852E}" destId="{09C152DA-7620-4852-8162-A77EC3609F3F}" srcOrd="2" destOrd="0" parTransId="{9F6D14C0-6C82-4CBD-8D6D-B0E117B6F2ED}" sibTransId="{0AE8D36D-0F0F-4206-AE39-0A2D73987B68}"/>
+    <dgm:cxn modelId="{F9540599-A193-456C-A9A9-8962E3855B0B}" type="presOf" srcId="{96262926-A67D-4E4E-9515-5EBC67F0B634}" destId="{5A1B764B-0DC5-47CD-BDEA-9E67799496EC}" srcOrd="0" destOrd="0" presId="urn:microsoft.com/office/officeart/2016/7/layout/RoundedRectangleTimeline"/>
+    <dgm:cxn modelId="{E13585A2-54F2-486A-B317-F4D6AF7E83B9}" type="presOf" srcId="{E80CA270-6C90-4E17-ACEA-46B56AD54DD1}" destId="{DF65791B-462E-4589-B98D-F60587330CA8}" srcOrd="0" destOrd="0" presId="urn:microsoft.com/office/officeart/2016/7/layout/RoundedRectangleTimeline"/>
+    <dgm:cxn modelId="{FAA8D3DD-12E8-457D-9144-B037C5678347}" srcId="{09C152DA-7620-4852-8162-A77EC3609F3F}" destId="{6C8937BE-93F8-4DED-8538-1C601DAEBA66}" srcOrd="0" destOrd="0" parTransId="{77D169C6-D77F-456D-B18B-D7BE016AD87A}" sibTransId="{A97BE953-FA9D-4BA6-A92C-494DB1F3BA59}"/>
+    <dgm:cxn modelId="{C5202EE1-10E9-4076-9D55-9E0CF8B152AF}" srcId="{6A70FD8F-0050-42E3-8B3A-6ED7CFB9852E}" destId="{8DB5D7D5-6A1C-4ABC-8850-759A9D876047}" srcOrd="0" destOrd="0" parTransId="{D8874F40-D7B0-41DE-BB6F-A6014FEAB2D7}" sibTransId="{BD6E0A2E-99C8-4F5A-971A-CD211D1099FF}"/>
+    <dgm:cxn modelId="{2DC28DF8-5C1B-4F53-A4C1-D5B63FB54BAF}" srcId="{C5146535-FD3D-4589-98A3-623B8DA4B8DB}" destId="{E80CA270-6C90-4E17-ACEA-46B56AD54DD1}" srcOrd="0" destOrd="0" parTransId="{7EEC8067-96EF-4BE0-8BE3-BA59ED78A31F}" sibTransId="{1AFE46E5-6B07-4894-8ECB-21BD7E7B8AF1}"/>
+    <dgm:cxn modelId="{76459B4A-BC95-4631-A3CC-1410E80D5DFD}" type="presParOf" srcId="{AB52B3CC-6563-466D-BFC3-9B6B5AFA0881}" destId="{815EDF7B-AC93-4A61-87AA-CAA5D85C31A8}" srcOrd="0" destOrd="0" presId="urn:microsoft.com/office/officeart/2016/7/layout/RoundedRectangleTimeline"/>
+    <dgm:cxn modelId="{4238FA88-CE43-4680-BFB0-73DED5612698}" type="presParOf" srcId="{815EDF7B-AC93-4A61-87AA-CAA5D85C31A8}" destId="{954381E7-0584-46DD-8108-E9BF4F2B5005}" srcOrd="0" destOrd="0" presId="urn:microsoft.com/office/officeart/2016/7/layout/RoundedRectangleTimeline"/>
+    <dgm:cxn modelId="{6497CE05-0893-4952-B18A-28D71D90B841}" type="presParOf" srcId="{815EDF7B-AC93-4A61-87AA-CAA5D85C31A8}" destId="{5A1B764B-0DC5-47CD-BDEA-9E67799496EC}" srcOrd="1" destOrd="0" presId="urn:microsoft.com/office/officeart/2016/7/layout/RoundedRectangleTimeline"/>
+    <dgm:cxn modelId="{CB8BA570-C0D4-4400-BED8-C9BC961A6553}" type="presParOf" srcId="{815EDF7B-AC93-4A61-87AA-CAA5D85C31A8}" destId="{122B38A3-0442-4747-820C-1F37877E2B0E}" srcOrd="2" destOrd="0" presId="urn:microsoft.com/office/officeart/2016/7/layout/RoundedRectangleTimeline"/>
+    <dgm:cxn modelId="{82FC1E36-99F3-4E1F-8BD1-229D77A82EB1}" type="presParOf" srcId="{815EDF7B-AC93-4A61-87AA-CAA5D85C31A8}" destId="{A73181F6-69BB-4A47-8277-4671A45AC8C8}" srcOrd="3" destOrd="0" presId="urn:microsoft.com/office/officeart/2016/7/layout/RoundedRectangleTimeline"/>
+    <dgm:cxn modelId="{7EAD7967-836C-4AB6-AAA2-ED2EF3F29E78}" type="presParOf" srcId="{815EDF7B-AC93-4A61-87AA-CAA5D85C31A8}" destId="{6E76EADA-5F61-4A59-B2F8-FA10112079FC}" srcOrd="4" destOrd="0" presId="urn:microsoft.com/office/officeart/2016/7/layout/RoundedRectangleTimeline"/>
+    <dgm:cxn modelId="{3783DE09-7B3D-423E-960C-ED9DB81E314E}" type="presParOf" srcId="{AB52B3CC-6563-466D-BFC3-9B6B5AFA0881}" destId="{A8189248-0785-43F1-844C-4DE92841F254}" srcOrd="1" destOrd="0" presId="urn:microsoft.com/office/officeart/2016/7/layout/RoundedRectangleTimeline"/>
+    <dgm:cxn modelId="{38B07C9C-D21D-4E2B-A78B-C30877B2689A}" type="presParOf" srcId="{AB52B3CC-6563-466D-BFC3-9B6B5AFA0881}" destId="{218D9CD7-D48D-464C-9A1C-0F322EC540B3}" srcOrd="2" destOrd="0" presId="urn:microsoft.com/office/officeart/2016/7/layout/RoundedRectangleTimeline"/>
+    <dgm:cxn modelId="{E6790483-7B9E-44FB-9EAE-A282A4B9AB73}" type="presParOf" srcId="{218D9CD7-D48D-464C-9A1C-0F322EC540B3}" destId="{30804A27-188E-4A17-8FFE-97BCCA0597B8}" srcOrd="0" destOrd="0" presId="urn:microsoft.com/office/officeart/2016/7/layout/RoundedRectangleTimeline"/>
+    <dgm:cxn modelId="{B31BDB48-FB8E-47F4-8F76-B90009D28A96}" type="presParOf" srcId="{218D9CD7-D48D-464C-9A1C-0F322EC540B3}" destId="{DF65791B-462E-4589-B98D-F60587330CA8}" srcOrd="1" destOrd="0" presId="urn:microsoft.com/office/officeart/2016/7/layout/RoundedRectangleTimeline"/>
+    <dgm:cxn modelId="{517AE913-68B2-41AC-BE20-5D4195845D6F}" type="presParOf" srcId="{218D9CD7-D48D-464C-9A1C-0F322EC540B3}" destId="{DBA410EB-5F61-4F46-92D9-C5B0AA59EE15}" srcOrd="2" destOrd="0" presId="urn:microsoft.com/office/officeart/2016/7/layout/RoundedRectangleTimeline"/>
+    <dgm:cxn modelId="{0F089045-7542-47F1-8B17-68354869406A}" type="presParOf" srcId="{218D9CD7-D48D-464C-9A1C-0F322EC540B3}" destId="{E1220EDB-B75C-43A5-B862-97E4C09130A7}" srcOrd="3" destOrd="0" presId="urn:microsoft.com/office/officeart/2016/7/layout/RoundedRectangleTimeline"/>
+    <dgm:cxn modelId="{79B44ECC-99D2-49DD-9DEE-58B1D2AE6C6C}" type="presParOf" srcId="{218D9CD7-D48D-464C-9A1C-0F322EC540B3}" destId="{D8849157-215F-4E70-9735-315E97B5AC5C}" srcOrd="4" destOrd="0" presId="urn:microsoft.com/office/officeart/2016/7/layout/RoundedRectangleTimeline"/>
+    <dgm:cxn modelId="{6930EC12-FB60-44F8-973F-19AC06AA90BB}" type="presParOf" srcId="{AB52B3CC-6563-466D-BFC3-9B6B5AFA0881}" destId="{7C467054-22FE-4C18-9934-29D7168DFF63}" srcOrd="3" destOrd="0" presId="urn:microsoft.com/office/officeart/2016/7/layout/RoundedRectangleTimeline"/>
+    <dgm:cxn modelId="{1F4A4777-E935-453F-A5B9-015C6946FC6A}" type="presParOf" srcId="{AB52B3CC-6563-466D-BFC3-9B6B5AFA0881}" destId="{3E3E944D-A6EC-4962-9AC1-C585A4F97BDA}" srcOrd="4" destOrd="0" presId="urn:microsoft.com/office/officeart/2016/7/layout/RoundedRectangleTimeline"/>
+    <dgm:cxn modelId="{94AC8B5D-A9B9-4EF3-AD1C-6024606B5BF8}" type="presParOf" srcId="{3E3E944D-A6EC-4962-9AC1-C585A4F97BDA}" destId="{566B79CB-1A41-4F5C-BF91-58D94BF93913}" srcOrd="0" destOrd="0" presId="urn:microsoft.com/office/officeart/2016/7/layout/RoundedRectangleTimeline"/>
+    <dgm:cxn modelId="{A151554E-10B3-429A-9E0D-D40262ED6857}" type="presParOf" srcId="{3E3E944D-A6EC-4962-9AC1-C585A4F97BDA}" destId="{B4723E2A-4FF1-452A-BD25-8EC364F15A6F}" srcOrd="1" destOrd="0" presId="urn:microsoft.com/office/officeart/2016/7/layout/RoundedRectangleTimeline"/>
+    <dgm:cxn modelId="{329635D9-081F-4DC9-88AA-E074B7400415}" type="presParOf" srcId="{3E3E944D-A6EC-4962-9AC1-C585A4F97BDA}" destId="{440E9361-37D2-4157-AF38-7B49AD23708B}" srcOrd="2" destOrd="0" presId="urn:microsoft.com/office/officeart/2016/7/layout/RoundedRectangleTimeline"/>
+    <dgm:cxn modelId="{0F0D3AEA-9F0C-400E-A955-6CD1F474B6A4}" type="presParOf" srcId="{3E3E944D-A6EC-4962-9AC1-C585A4F97BDA}" destId="{C45E7B63-1C71-483E-A3A8-705CE86D4D8E}" srcOrd="3" destOrd="0" presId="urn:microsoft.com/office/officeart/2016/7/layout/RoundedRectangleTimeline"/>
+    <dgm:cxn modelId="{91F0BE33-39D4-4457-A5CC-3F1682DB166D}" type="presParOf" srcId="{3E3E944D-A6EC-4962-9AC1-C585A4F97BDA}" destId="{4174F691-D9D3-451C-9893-D177DC3AED58}" srcOrd="4" destOrd="0" presId="urn:microsoft.com/office/officeart/2016/7/layout/RoundedRectangleTimeline"/>
+  </dgm:cxnLst>
+  <dgm:bg/>
+  <dgm:whole/>
+  <dgm:extLst>
+    <a:ext uri="http://schemas.microsoft.com/office/drawing/2008/diagram">
+      <dsp:dataModelExt xmlns:dsp="http://schemas.microsoft.com/office/drawing/2008/diagram" relId="rId7" minVer="http://schemas.openxmlformats.org/drawingml/2006/diagram"/>
+    </a:ext>
+  </dgm:extLst>
+</dgm:dataModel>
+</file>
+
+<file path=ppt/diagrams/data4.xml><?xml version="1.0" encoding="utf-8"?>
 <dgm:dataModel xmlns:dgm="http://schemas.openxmlformats.org/drawingml/2006/diagram" xmlns:a="http://schemas.openxmlformats.org/drawingml/2006/main">
   <dgm:ptLst>
     <dgm:pt modelId="{6A70FD8F-0050-42E3-8B3A-6ED7CFB9852E}" type="doc">
@@ -6173,6 +7492,708 @@
 </dsp:drawing>
 </file>
 
+<file path=ppt/diagrams/drawing4.xml><?xml version="1.0" encoding="utf-8"?>
+<dsp:drawing xmlns:dgm="http://schemas.openxmlformats.org/drawingml/2006/diagram" xmlns:dsp="http://schemas.microsoft.com/office/drawing/2008/diagram" xmlns:a="http://schemas.openxmlformats.org/drawingml/2006/main">
+  <dsp:spTree>
+    <dsp:nvGrpSpPr>
+      <dsp:cNvPr id="0" name=""/>
+      <dsp:cNvGrpSpPr/>
+    </dsp:nvGrpSpPr>
+    <dsp:grpSpPr/>
+    <dsp:sp modelId="{954381E7-0584-46DD-8108-E9BF4F2B5005}">
+      <dsp:nvSpPr>
+        <dsp:cNvPr id="0" name=""/>
+        <dsp:cNvSpPr/>
+      </dsp:nvSpPr>
+      <dsp:spPr>
+        <a:xfrm rot="16200000">
+          <a:off x="2328055" y="314278"/>
+          <a:ext cx="363378" cy="3005230"/>
+        </a:xfrm>
+        <a:prstGeom prst="round2SameRect">
+          <a:avLst/>
+        </a:prstGeom>
+        <a:solidFill>
+          <a:schemeClr val="accent1">
+            <a:shade val="80000"/>
+            <a:hueOff val="0"/>
+            <a:satOff val="0"/>
+            <a:lumOff val="0"/>
+            <a:alphaOff val="0"/>
+          </a:schemeClr>
+        </a:solidFill>
+        <a:ln w="22225" cap="rnd" cmpd="sng" algn="ctr">
+          <a:solidFill>
+            <a:schemeClr val="accent1">
+              <a:shade val="80000"/>
+              <a:hueOff val="0"/>
+              <a:satOff val="0"/>
+              <a:lumOff val="0"/>
+              <a:alphaOff val="0"/>
+            </a:schemeClr>
+          </a:solidFill>
+          <a:prstDash val="solid"/>
+        </a:ln>
+        <a:effectLst/>
+      </dsp:spPr>
+      <dsp:style>
+        <a:lnRef idx="2">
+          <a:scrgbClr r="0" g="0" b="0"/>
+        </a:lnRef>
+        <a:fillRef idx="1">
+          <a:scrgbClr r="0" g="0" b="0"/>
+        </a:fillRef>
+        <a:effectRef idx="0">
+          <a:scrgbClr r="0" g="0" b="0"/>
+        </a:effectRef>
+        <a:fontRef idx="minor">
+          <a:schemeClr val="lt1"/>
+        </a:fontRef>
+      </dsp:style>
+      <dsp:txBody>
+        <a:bodyPr spcFirstLastPara="0" vert="horz" wrap="square" lIns="83820" tIns="83820" rIns="83820" bIns="83820" numCol="1" spcCol="1270" anchor="ctr" anchorCtr="1">
+          <a:noAutofit/>
+        </a:bodyPr>
+        <a:lstStyle/>
+        <a:p>
+          <a:pPr marL="0" lvl="0" indent="0" algn="ctr" defTabSz="488950">
+            <a:lnSpc>
+              <a:spcPct val="90000"/>
+            </a:lnSpc>
+            <a:spcBef>
+              <a:spcPct val="0"/>
+            </a:spcBef>
+            <a:spcAft>
+              <a:spcPct val="35000"/>
+            </a:spcAft>
+            <a:buNone/>
+          </a:pPr>
+          <a:r>
+            <a:rPr lang="en-US" sz="1100" kern="1200" dirty="0"/>
+            <a:t>2017</a:t>
+          </a:r>
+        </a:p>
+      </dsp:txBody>
+      <dsp:txXfrm rot="5400000">
+        <a:off x="1024869" y="1652943"/>
+        <a:ext cx="2987491" cy="327900"/>
+      </dsp:txXfrm>
+    </dsp:sp>
+    <dsp:sp modelId="{5A1B764B-0DC5-47CD-BDEA-9E67799496EC}">
+      <dsp:nvSpPr>
+        <dsp:cNvPr id="0" name=""/>
+        <dsp:cNvSpPr/>
+      </dsp:nvSpPr>
+      <dsp:spPr>
+        <a:xfrm>
+          <a:off x="5385" y="0"/>
+          <a:ext cx="5008717" cy="1271825"/>
+        </a:xfrm>
+        <a:prstGeom prst="rect">
+          <a:avLst/>
+        </a:prstGeom>
+        <a:noFill/>
+        <a:ln>
+          <a:noFill/>
+        </a:ln>
+        <a:effectLst/>
+      </dsp:spPr>
+      <dsp:style>
+        <a:lnRef idx="0">
+          <a:scrgbClr r="0" g="0" b="0"/>
+        </a:lnRef>
+        <a:fillRef idx="0">
+          <a:scrgbClr r="0" g="0" b="0"/>
+        </a:fillRef>
+        <a:effectRef idx="0">
+          <a:scrgbClr r="0" g="0" b="0"/>
+        </a:effectRef>
+        <a:fontRef idx="minor"/>
+      </dsp:style>
+      <dsp:txBody>
+        <a:bodyPr spcFirstLastPara="0" vert="horz" wrap="square" lIns="0" tIns="0" rIns="0" bIns="83820" numCol="1" spcCol="1270" anchor="b" anchorCtr="1">
+          <a:noAutofit/>
+        </a:bodyPr>
+        <a:lstStyle/>
+        <a:p>
+          <a:pPr marL="0" lvl="0" indent="0" algn="ctr" defTabSz="488950">
+            <a:lnSpc>
+              <a:spcPct val="90000"/>
+            </a:lnSpc>
+            <a:spcBef>
+              <a:spcPct val="0"/>
+            </a:spcBef>
+            <a:spcAft>
+              <a:spcPct val="35000"/>
+            </a:spcAft>
+            <a:buNone/>
+          </a:pPr>
+          <a:r>
+            <a:rPr lang="en-US" sz="1100" kern="1200" dirty="0"/>
+            <a:t>Lorem ipsum dolor sit amet</a:t>
+          </a:r>
+        </a:p>
+      </dsp:txBody>
+      <dsp:txXfrm>
+        <a:off x="5385" y="0"/>
+        <a:ext cx="5008717" cy="1271825"/>
+      </dsp:txXfrm>
+    </dsp:sp>
+    <dsp:sp modelId="{122B38A3-0442-4747-820C-1F37877E2B0E}">
+      <dsp:nvSpPr>
+        <dsp:cNvPr id="0" name=""/>
+        <dsp:cNvSpPr/>
+      </dsp:nvSpPr>
+      <dsp:spPr>
+        <a:xfrm>
+          <a:off x="2509744" y="1344501"/>
+          <a:ext cx="0" cy="290702"/>
+        </a:xfrm>
+        <a:prstGeom prst="line">
+          <a:avLst/>
+        </a:prstGeom>
+        <a:noFill/>
+        <a:ln w="12700" cap="rnd" cmpd="sng" algn="ctr">
+          <a:solidFill>
+            <a:schemeClr val="accent1">
+              <a:shade val="90000"/>
+              <a:hueOff val="93466"/>
+              <a:satOff val="1924"/>
+              <a:lumOff val="8231"/>
+              <a:alphaOff val="0"/>
+            </a:schemeClr>
+          </a:solidFill>
+          <a:prstDash val="dash"/>
+        </a:ln>
+        <a:effectLst/>
+      </dsp:spPr>
+      <dsp:style>
+        <a:lnRef idx="1">
+          <a:scrgbClr r="0" g="0" b="0"/>
+        </a:lnRef>
+        <a:fillRef idx="0">
+          <a:scrgbClr r="0" g="0" b="0"/>
+        </a:fillRef>
+        <a:effectRef idx="0">
+          <a:scrgbClr r="0" g="0" b="0"/>
+        </a:effectRef>
+        <a:fontRef idx="minor"/>
+      </dsp:style>
+    </dsp:sp>
+    <dsp:sp modelId="{A73181F6-69BB-4A47-8277-4671A45AC8C8}">
+      <dsp:nvSpPr>
+        <dsp:cNvPr id="0" name=""/>
+        <dsp:cNvSpPr/>
+      </dsp:nvSpPr>
+      <dsp:spPr>
+        <a:xfrm>
+          <a:off x="2473406" y="1271825"/>
+          <a:ext cx="72675" cy="72675"/>
+        </a:xfrm>
+        <a:prstGeom prst="ellipse">
+          <a:avLst/>
+        </a:prstGeom>
+        <a:solidFill>
+          <a:schemeClr val="accent1">
+            <a:shade val="80000"/>
+            <a:hueOff val="0"/>
+            <a:satOff val="0"/>
+            <a:lumOff val="0"/>
+            <a:alphaOff val="0"/>
+          </a:schemeClr>
+        </a:solidFill>
+        <a:ln w="22225" cap="rnd" cmpd="sng" algn="ctr">
+          <a:solidFill>
+            <a:schemeClr val="lt1">
+              <a:hueOff val="0"/>
+              <a:satOff val="0"/>
+              <a:lumOff val="0"/>
+              <a:alphaOff val="0"/>
+            </a:schemeClr>
+          </a:solidFill>
+          <a:prstDash val="solid"/>
+        </a:ln>
+        <a:effectLst/>
+      </dsp:spPr>
+      <dsp:style>
+        <a:lnRef idx="2">
+          <a:scrgbClr r="0" g="0" b="0"/>
+        </a:lnRef>
+        <a:fillRef idx="1">
+          <a:scrgbClr r="0" g="0" b="0"/>
+        </a:fillRef>
+        <a:effectRef idx="0">
+          <a:scrgbClr r="0" g="0" b="0"/>
+        </a:effectRef>
+        <a:fontRef idx="minor">
+          <a:schemeClr val="lt1"/>
+        </a:fontRef>
+      </dsp:style>
+    </dsp:sp>
+    <dsp:sp modelId="{30804A27-188E-4A17-8FFE-97BCCA0597B8}">
+      <dsp:nvSpPr>
+        <dsp:cNvPr id="0" name=""/>
+        <dsp:cNvSpPr/>
+      </dsp:nvSpPr>
+      <dsp:spPr>
+        <a:xfrm>
+          <a:off x="4012359" y="1635204"/>
+          <a:ext cx="3005230" cy="363378"/>
+        </a:xfrm>
+        <a:prstGeom prst="rect">
+          <a:avLst/>
+        </a:prstGeom>
+        <a:solidFill>
+          <a:schemeClr val="accent1">
+            <a:shade val="80000"/>
+            <a:hueOff val="223096"/>
+            <a:satOff val="-4529"/>
+            <a:lumOff val="15339"/>
+            <a:alphaOff val="0"/>
+          </a:schemeClr>
+        </a:solidFill>
+        <a:ln w="22225" cap="rnd" cmpd="sng" algn="ctr">
+          <a:solidFill>
+            <a:schemeClr val="accent1">
+              <a:shade val="80000"/>
+              <a:hueOff val="223096"/>
+              <a:satOff val="-4529"/>
+              <a:lumOff val="15339"/>
+              <a:alphaOff val="0"/>
+            </a:schemeClr>
+          </a:solidFill>
+          <a:prstDash val="solid"/>
+        </a:ln>
+        <a:effectLst/>
+      </dsp:spPr>
+      <dsp:style>
+        <a:lnRef idx="2">
+          <a:scrgbClr r="0" g="0" b="0"/>
+        </a:lnRef>
+        <a:fillRef idx="1">
+          <a:scrgbClr r="0" g="0" b="0"/>
+        </a:fillRef>
+        <a:effectRef idx="0">
+          <a:scrgbClr r="0" g="0" b="0"/>
+        </a:effectRef>
+        <a:fontRef idx="minor">
+          <a:schemeClr val="lt1"/>
+        </a:fontRef>
+      </dsp:style>
+      <dsp:txBody>
+        <a:bodyPr spcFirstLastPara="0" vert="horz" wrap="square" lIns="83820" tIns="83820" rIns="83820" bIns="83820" numCol="1" spcCol="1270" anchor="ctr" anchorCtr="1">
+          <a:noAutofit/>
+        </a:bodyPr>
+        <a:lstStyle/>
+        <a:p>
+          <a:pPr marL="0" lvl="0" indent="0" algn="ctr" defTabSz="488950">
+            <a:lnSpc>
+              <a:spcPct val="90000"/>
+            </a:lnSpc>
+            <a:spcBef>
+              <a:spcPct val="0"/>
+            </a:spcBef>
+            <a:spcAft>
+              <a:spcPct val="35000"/>
+            </a:spcAft>
+            <a:buNone/>
+          </a:pPr>
+          <a:r>
+            <a:rPr lang="en-US" sz="1100" kern="1200" dirty="0"/>
+            <a:t>2018</a:t>
+          </a:r>
+        </a:p>
+      </dsp:txBody>
+      <dsp:txXfrm>
+        <a:off x="4012359" y="1635204"/>
+        <a:ext cx="3005230" cy="363378"/>
+      </dsp:txXfrm>
+    </dsp:sp>
+    <dsp:sp modelId="{DF65791B-462E-4589-B98D-F60587330CA8}">
+      <dsp:nvSpPr>
+        <dsp:cNvPr id="0" name=""/>
+        <dsp:cNvSpPr/>
+      </dsp:nvSpPr>
+      <dsp:spPr>
+        <a:xfrm>
+          <a:off x="3010616" y="2361961"/>
+          <a:ext cx="5008717" cy="1271825"/>
+        </a:xfrm>
+        <a:prstGeom prst="rect">
+          <a:avLst/>
+        </a:prstGeom>
+        <a:noFill/>
+        <a:ln>
+          <a:noFill/>
+        </a:ln>
+        <a:effectLst/>
+      </dsp:spPr>
+      <dsp:style>
+        <a:lnRef idx="0">
+          <a:scrgbClr r="0" g="0" b="0"/>
+        </a:lnRef>
+        <a:fillRef idx="0">
+          <a:scrgbClr r="0" g="0" b="0"/>
+        </a:fillRef>
+        <a:effectRef idx="0">
+          <a:scrgbClr r="0" g="0" b="0"/>
+        </a:effectRef>
+        <a:fontRef idx="minor"/>
+      </dsp:style>
+      <dsp:txBody>
+        <a:bodyPr spcFirstLastPara="0" vert="horz" wrap="square" lIns="0" tIns="83820" rIns="0" bIns="0" numCol="1" spcCol="1270" anchor="t" anchorCtr="1">
+          <a:noAutofit/>
+        </a:bodyPr>
+        <a:lstStyle/>
+        <a:p>
+          <a:pPr marL="0" lvl="0" indent="0" algn="ctr" defTabSz="488950">
+            <a:lnSpc>
+              <a:spcPct val="90000"/>
+            </a:lnSpc>
+            <a:spcBef>
+              <a:spcPct val="0"/>
+            </a:spcBef>
+            <a:spcAft>
+              <a:spcPct val="35000"/>
+            </a:spcAft>
+            <a:buNone/>
+          </a:pPr>
+          <a:r>
+            <a:rPr lang="en-US" sz="1100" kern="1200" dirty="0"/>
+            <a:t>Lorem ipsum dolor sit amet</a:t>
+          </a:r>
+        </a:p>
+      </dsp:txBody>
+      <dsp:txXfrm>
+        <a:off x="3010616" y="2361961"/>
+        <a:ext cx="5008717" cy="1271825"/>
+      </dsp:txXfrm>
+    </dsp:sp>
+    <dsp:sp modelId="{DBA410EB-5F61-4F46-92D9-C5B0AA59EE15}">
+      <dsp:nvSpPr>
+        <dsp:cNvPr id="0" name=""/>
+        <dsp:cNvSpPr/>
+      </dsp:nvSpPr>
+      <dsp:spPr>
+        <a:xfrm>
+          <a:off x="5514975" y="1998582"/>
+          <a:ext cx="0" cy="290702"/>
+        </a:xfrm>
+        <a:prstGeom prst="line">
+          <a:avLst/>
+        </a:prstGeom>
+        <a:noFill/>
+        <a:ln w="12700" cap="rnd" cmpd="sng" algn="ctr">
+          <a:solidFill>
+            <a:schemeClr val="accent1">
+              <a:shade val="90000"/>
+              <a:hueOff val="140199"/>
+              <a:satOff val="2886"/>
+              <a:lumOff val="12346"/>
+              <a:alphaOff val="0"/>
+            </a:schemeClr>
+          </a:solidFill>
+          <a:prstDash val="dash"/>
+        </a:ln>
+        <a:effectLst/>
+      </dsp:spPr>
+      <dsp:style>
+        <a:lnRef idx="1">
+          <a:scrgbClr r="0" g="0" b="0"/>
+        </a:lnRef>
+        <a:fillRef idx="0">
+          <a:scrgbClr r="0" g="0" b="0"/>
+        </a:fillRef>
+        <a:effectRef idx="0">
+          <a:scrgbClr r="0" g="0" b="0"/>
+        </a:effectRef>
+        <a:fontRef idx="minor"/>
+      </dsp:style>
+    </dsp:sp>
+    <dsp:sp modelId="{E1220EDB-B75C-43A5-B862-97E4C09130A7}">
+      <dsp:nvSpPr>
+        <dsp:cNvPr id="0" name=""/>
+        <dsp:cNvSpPr/>
+      </dsp:nvSpPr>
+      <dsp:spPr>
+        <a:xfrm>
+          <a:off x="5478637" y="2289285"/>
+          <a:ext cx="72675" cy="72675"/>
+        </a:xfrm>
+        <a:prstGeom prst="ellipse">
+          <a:avLst/>
+        </a:prstGeom>
+        <a:solidFill>
+          <a:schemeClr val="accent1">
+            <a:shade val="80000"/>
+            <a:hueOff val="223096"/>
+            <a:satOff val="-4529"/>
+            <a:lumOff val="15339"/>
+            <a:alphaOff val="0"/>
+          </a:schemeClr>
+        </a:solidFill>
+        <a:ln w="22225" cap="rnd" cmpd="sng" algn="ctr">
+          <a:solidFill>
+            <a:schemeClr val="lt1">
+              <a:hueOff val="0"/>
+              <a:satOff val="0"/>
+              <a:lumOff val="0"/>
+              <a:alphaOff val="0"/>
+            </a:schemeClr>
+          </a:solidFill>
+          <a:prstDash val="solid"/>
+        </a:ln>
+        <a:effectLst/>
+      </dsp:spPr>
+      <dsp:style>
+        <a:lnRef idx="2">
+          <a:scrgbClr r="0" g="0" b="0"/>
+        </a:lnRef>
+        <a:fillRef idx="1">
+          <a:scrgbClr r="0" g="0" b="0"/>
+        </a:fillRef>
+        <a:effectRef idx="0">
+          <a:scrgbClr r="0" g="0" b="0"/>
+        </a:effectRef>
+        <a:fontRef idx="minor">
+          <a:schemeClr val="lt1"/>
+        </a:fontRef>
+      </dsp:style>
+    </dsp:sp>
+    <dsp:sp modelId="{566B79CB-1A41-4F5C-BF91-58D94BF93913}">
+      <dsp:nvSpPr>
+        <dsp:cNvPr id="0" name=""/>
+        <dsp:cNvSpPr/>
+      </dsp:nvSpPr>
+      <dsp:spPr>
+        <a:xfrm rot="5400000">
+          <a:off x="8338516" y="314278"/>
+          <a:ext cx="363378" cy="3005230"/>
+        </a:xfrm>
+        <a:prstGeom prst="round2SameRect">
+          <a:avLst/>
+        </a:prstGeom>
+        <a:solidFill>
+          <a:schemeClr val="accent1">
+            <a:shade val="80000"/>
+            <a:hueOff val="446191"/>
+            <a:satOff val="-9058"/>
+            <a:lumOff val="30677"/>
+            <a:alphaOff val="0"/>
+          </a:schemeClr>
+        </a:solidFill>
+        <a:ln w="22225" cap="rnd" cmpd="sng" algn="ctr">
+          <a:solidFill>
+            <a:schemeClr val="accent1">
+              <a:shade val="80000"/>
+              <a:hueOff val="446191"/>
+              <a:satOff val="-9058"/>
+              <a:lumOff val="30677"/>
+              <a:alphaOff val="0"/>
+            </a:schemeClr>
+          </a:solidFill>
+          <a:prstDash val="solid"/>
+        </a:ln>
+        <a:effectLst/>
+      </dsp:spPr>
+      <dsp:style>
+        <a:lnRef idx="2">
+          <a:scrgbClr r="0" g="0" b="0"/>
+        </a:lnRef>
+        <a:fillRef idx="1">
+          <a:scrgbClr r="0" g="0" b="0"/>
+        </a:fillRef>
+        <a:effectRef idx="0">
+          <a:scrgbClr r="0" g="0" b="0"/>
+        </a:effectRef>
+        <a:fontRef idx="minor">
+          <a:schemeClr val="lt1"/>
+        </a:fontRef>
+      </dsp:style>
+      <dsp:txBody>
+        <a:bodyPr spcFirstLastPara="0" vert="horz" wrap="square" lIns="83820" tIns="83820" rIns="83820" bIns="83820" numCol="1" spcCol="1270" anchor="ctr" anchorCtr="1">
+          <a:noAutofit/>
+        </a:bodyPr>
+        <a:lstStyle/>
+        <a:p>
+          <a:pPr marL="0" lvl="0" indent="0" algn="ctr" defTabSz="488950">
+            <a:lnSpc>
+              <a:spcPct val="90000"/>
+            </a:lnSpc>
+            <a:spcBef>
+              <a:spcPct val="0"/>
+            </a:spcBef>
+            <a:spcAft>
+              <a:spcPct val="35000"/>
+            </a:spcAft>
+            <a:buNone/>
+          </a:pPr>
+          <a:r>
+            <a:rPr lang="en-US" sz="1100" kern="1200" dirty="0"/>
+            <a:t>2019</a:t>
+          </a:r>
+        </a:p>
+      </dsp:txBody>
+      <dsp:txXfrm rot="-5400000">
+        <a:off x="7017591" y="1652943"/>
+        <a:ext cx="2987491" cy="327900"/>
+      </dsp:txXfrm>
+    </dsp:sp>
+    <dsp:sp modelId="{B4723E2A-4FF1-452A-BD25-8EC364F15A6F}">
+      <dsp:nvSpPr>
+        <dsp:cNvPr id="0" name=""/>
+        <dsp:cNvSpPr/>
+      </dsp:nvSpPr>
+      <dsp:spPr>
+        <a:xfrm>
+          <a:off x="6015846" y="0"/>
+          <a:ext cx="5008717" cy="1271825"/>
+        </a:xfrm>
+        <a:prstGeom prst="rect">
+          <a:avLst/>
+        </a:prstGeom>
+        <a:noFill/>
+        <a:ln>
+          <a:noFill/>
+        </a:ln>
+        <a:effectLst/>
+      </dsp:spPr>
+      <dsp:style>
+        <a:lnRef idx="0">
+          <a:scrgbClr r="0" g="0" b="0"/>
+        </a:lnRef>
+        <a:fillRef idx="0">
+          <a:scrgbClr r="0" g="0" b="0"/>
+        </a:fillRef>
+        <a:effectRef idx="0">
+          <a:scrgbClr r="0" g="0" b="0"/>
+        </a:effectRef>
+        <a:fontRef idx="minor"/>
+      </dsp:style>
+      <dsp:txBody>
+        <a:bodyPr spcFirstLastPara="0" vert="horz" wrap="square" lIns="0" tIns="0" rIns="0" bIns="83820" numCol="1" spcCol="1270" anchor="b" anchorCtr="1">
+          <a:noAutofit/>
+        </a:bodyPr>
+        <a:lstStyle/>
+        <a:p>
+          <a:pPr marL="0" lvl="0" indent="0" algn="ctr" defTabSz="488950">
+            <a:lnSpc>
+              <a:spcPct val="90000"/>
+            </a:lnSpc>
+            <a:spcBef>
+              <a:spcPct val="0"/>
+            </a:spcBef>
+            <a:spcAft>
+              <a:spcPct val="35000"/>
+            </a:spcAft>
+            <a:buNone/>
+          </a:pPr>
+          <a:r>
+            <a:rPr lang="en-US" sz="1100" kern="1200" dirty="0"/>
+            <a:t>Lorem ipsum dolor sit amet</a:t>
+          </a:r>
+        </a:p>
+      </dsp:txBody>
+      <dsp:txXfrm>
+        <a:off x="6015846" y="0"/>
+        <a:ext cx="5008717" cy="1271825"/>
+      </dsp:txXfrm>
+    </dsp:sp>
+    <dsp:sp modelId="{440E9361-37D2-4157-AF38-7B49AD23708B}">
+      <dsp:nvSpPr>
+        <dsp:cNvPr id="0" name=""/>
+        <dsp:cNvSpPr/>
+      </dsp:nvSpPr>
+      <dsp:spPr>
+        <a:xfrm>
+          <a:off x="8520205" y="1344501"/>
+          <a:ext cx="0" cy="290702"/>
+        </a:xfrm>
+        <a:prstGeom prst="line">
+          <a:avLst/>
+        </a:prstGeom>
+        <a:noFill/>
+        <a:ln w="12700" cap="rnd" cmpd="sng" algn="ctr">
+          <a:solidFill>
+            <a:schemeClr val="accent1">
+              <a:shade val="90000"/>
+              <a:hueOff val="186931"/>
+              <a:satOff val="3848"/>
+              <a:lumOff val="16461"/>
+              <a:alphaOff val="0"/>
+            </a:schemeClr>
+          </a:solidFill>
+          <a:prstDash val="dash"/>
+        </a:ln>
+        <a:effectLst/>
+      </dsp:spPr>
+      <dsp:style>
+        <a:lnRef idx="1">
+          <a:scrgbClr r="0" g="0" b="0"/>
+        </a:lnRef>
+        <a:fillRef idx="0">
+          <a:scrgbClr r="0" g="0" b="0"/>
+        </a:fillRef>
+        <a:effectRef idx="0">
+          <a:scrgbClr r="0" g="0" b="0"/>
+        </a:effectRef>
+        <a:fontRef idx="minor"/>
+      </dsp:style>
+    </dsp:sp>
+    <dsp:sp modelId="{C45E7B63-1C71-483E-A3A8-705CE86D4D8E}">
+      <dsp:nvSpPr>
+        <dsp:cNvPr id="0" name=""/>
+        <dsp:cNvSpPr/>
+      </dsp:nvSpPr>
+      <dsp:spPr>
+        <a:xfrm>
+          <a:off x="8483867" y="1271825"/>
+          <a:ext cx="72675" cy="72675"/>
+        </a:xfrm>
+        <a:prstGeom prst="ellipse">
+          <a:avLst/>
+        </a:prstGeom>
+        <a:solidFill>
+          <a:schemeClr val="accent1">
+            <a:shade val="80000"/>
+            <a:hueOff val="446191"/>
+            <a:satOff val="-9058"/>
+            <a:lumOff val="30677"/>
+            <a:alphaOff val="0"/>
+          </a:schemeClr>
+        </a:solidFill>
+        <a:ln w="22225" cap="rnd" cmpd="sng" algn="ctr">
+          <a:solidFill>
+            <a:schemeClr val="lt1">
+              <a:hueOff val="0"/>
+              <a:satOff val="0"/>
+              <a:lumOff val="0"/>
+              <a:alphaOff val="0"/>
+            </a:schemeClr>
+          </a:solidFill>
+          <a:prstDash val="solid"/>
+        </a:ln>
+        <a:effectLst/>
+      </dsp:spPr>
+      <dsp:style>
+        <a:lnRef idx="2">
+          <a:scrgbClr r="0" g="0" b="0"/>
+        </a:lnRef>
+        <a:fillRef idx="1">
+          <a:scrgbClr r="0" g="0" b="0"/>
+        </a:fillRef>
+        <a:effectRef idx="0">
+          <a:scrgbClr r="0" g="0" b="0"/>
+        </a:effectRef>
+        <a:fontRef idx="minor">
+          <a:schemeClr val="lt1"/>
+        </a:fontRef>
+      </dsp:style>
+    </dsp:sp>
+  </dsp:spTree>
+</dsp:drawing>
+</file>
+
 <file path=ppt/diagrams/layout1.xml><?xml version="1.0" encoding="utf-8"?>
 <dgm:layoutDef xmlns:dgm="http://schemas.openxmlformats.org/drawingml/2006/diagram" xmlns:a="http://schemas.openxmlformats.org/drawingml/2006/main" uniqueId="urn:microsoft.com/office/officeart/2016/7/layout/RoundedRectangleTimeline">
   <dgm:title val="Rounded Rectangle Timeline"/>
@@ -7922,6 +9943,589 @@
 </dgm:layoutDef>
 </file>
 
+<file path=ppt/diagrams/layout4.xml><?xml version="1.0" encoding="utf-8"?>
+<dgm:layoutDef xmlns:dgm="http://schemas.openxmlformats.org/drawingml/2006/diagram" xmlns:a="http://schemas.openxmlformats.org/drawingml/2006/main" uniqueId="urn:microsoft.com/office/officeart/2016/7/layout/RoundedRectangleTimeline">
+  <dgm:title val="Rounded Rectangle Timeline"/>
+  <dgm:desc val="Use to show a list of events in chronological order. An invisible box contains the description while the date is shown in rectangles, except for the first and last node where the corners of the rectangle are rounded. It can display large amount of text and long descriptive date format."/>
+  <dgm:catLst>
+    <dgm:cat type="timeline" pri="500"/>
+    <dgm:cat type="process" pri="600"/>
+  </dgm:catLst>
+  <dgm:sampData>
+    <dgm:dataModel>
+      <dgm:ptLst>
+        <dgm:pt modelId="0" type="doc"/>
+        <dgm:pt modelId="10">
+          <dgm:prSet phldr="1"/>
+        </dgm:pt>
+        <dgm:pt modelId="11">
+          <dgm:prSet phldr="1"/>
+        </dgm:pt>
+        <dgm:pt modelId="20">
+          <dgm:prSet phldr="1"/>
+        </dgm:pt>
+        <dgm:pt modelId="21">
+          <dgm:prSet phldr="1"/>
+        </dgm:pt>
+        <dgm:pt modelId="30">
+          <dgm:prSet phldr="1"/>
+        </dgm:pt>
+        <dgm:pt modelId="31">
+          <dgm:prSet phldr="1"/>
+        </dgm:pt>
+      </dgm:ptLst>
+      <dgm:cxnLst>
+        <dgm:cxn modelId="40" srcId="0" destId="10" srcOrd="0" destOrd="0"/>
+        <dgm:cxn modelId="12" srcId="10" destId="11" srcOrd="0" destOrd="0"/>
+        <dgm:cxn modelId="50" srcId="0" destId="20" srcOrd="1" destOrd="0"/>
+        <dgm:cxn modelId="22" srcId="20" destId="21" srcOrd="0" destOrd="0"/>
+        <dgm:cxn modelId="60" srcId="0" destId="30" srcOrd="1" destOrd="0"/>
+        <dgm:cxn modelId="32" srcId="30" destId="31" srcOrd="0" destOrd="0"/>
+      </dgm:cxnLst>
+      <dgm:bg/>
+      <dgm:whole/>
+    </dgm:dataModel>
+  </dgm:sampData>
+  <dgm:styleData>
+    <dgm:dataModel>
+      <dgm:ptLst>
+        <dgm:pt modelId="0" type="doc"/>
+        <dgm:pt modelId="10">
+          <dgm:prSet phldr="1"/>
+        </dgm:pt>
+        <dgm:pt modelId="20">
+          <dgm:prSet phldr="1"/>
+        </dgm:pt>
+      </dgm:ptLst>
+      <dgm:cxnLst>
+        <dgm:cxn modelId="60" srcId="0" destId="10" srcOrd="0" destOrd="0"/>
+        <dgm:cxn modelId="70" srcId="0" destId="20" srcOrd="1" destOrd="0"/>
+      </dgm:cxnLst>
+      <dgm:bg/>
+      <dgm:whole/>
+    </dgm:dataModel>
+  </dgm:styleData>
+  <dgm:clrData>
+    <dgm:dataModel>
+      <dgm:ptLst>
+        <dgm:pt modelId="0" type="doc"/>
+        <dgm:pt modelId="10">
+          <dgm:prSet phldr="1"/>
+        </dgm:pt>
+        <dgm:pt modelId="20">
+          <dgm:prSet phldr="1"/>
+        </dgm:pt>
+        <dgm:pt modelId="30">
+          <dgm:prSet phldr="1"/>
+        </dgm:pt>
+        <dgm:pt modelId="40">
+          <dgm:prSet phldr="1"/>
+        </dgm:pt>
+      </dgm:ptLst>
+      <dgm:cxnLst>
+        <dgm:cxn modelId="60" srcId="0" destId="10" srcOrd="0" destOrd="0"/>
+        <dgm:cxn modelId="70" srcId="0" destId="20" srcOrd="1" destOrd="0"/>
+        <dgm:cxn modelId="80" srcId="0" destId="30" srcOrd="2" destOrd="0"/>
+        <dgm:cxn modelId="90" srcId="0" destId="40" srcOrd="3" destOrd="0"/>
+      </dgm:cxnLst>
+      <dgm:bg/>
+      <dgm:whole/>
+    </dgm:dataModel>
+  </dgm:clrData>
+  <dgm:layoutNode name="Name0">
+    <dgm:varLst>
+      <dgm:chMax/>
+      <dgm:chPref/>
+      <dgm:animLvl val="lvl"/>
+    </dgm:varLst>
+    <dgm:choose name="Name1">
+      <dgm:if name="Name2" func="var" arg="dir" op="equ" val="norm">
+        <dgm:alg type="lin"/>
+      </dgm:if>
+      <dgm:else name="Name3">
+        <dgm:alg type="lin">
+          <dgm:param type="linDir" val="fromR"/>
+        </dgm:alg>
+      </dgm:else>
+    </dgm:choose>
+    <dgm:shape xmlns:r="http://schemas.openxmlformats.org/officeDocument/2006/relationships" r:blip="">
+      <dgm:adjLst/>
+    </dgm:shape>
+    <dgm:constrLst>
+      <dgm:constr type="primFontSz" for="des" forName="parent" val="18"/>
+      <dgm:constr type="primFontSz" for="des" forName="Childtext" val="18"/>
+      <dgm:constr type="primFontSz" for="des" forName="Childtext" refType="primFontSz" refFor="des" refForName="parent" op="lte"/>
+      <dgm:constr type="w" for="ch" forName="composite" refType="w"/>
+      <dgm:constr type="h" for="ch" forName="composite" refType="h"/>
+      <dgm:constr type="w" for="ch" forName="spaceBetweenRectangles" refType="w" refFor="ch" refForName="composite" fact="-0.4"/>
+      <dgm:constr type="w" for="ch" ptType="sibTrans" op="equ"/>
+      <dgm:constr type="primFontSz" for="des" forName="parent" op="equ"/>
+      <dgm:constr type="primFontSz" for="des" forName="Childtext" op="equ"/>
+      <dgm:constr type="primFontSz" for="des" forName="parent1" val="18"/>
+      <dgm:constr type="primFontSz" for="des" forName="Childtext1" val="18"/>
+      <dgm:constr type="primFontSz" for="des" forName="Childtext1" refType="primFontSz" refFor="des" refForName="parent1" op="lte"/>
+      <dgm:constr type="w" for="ch" forName="composite1" refType="w"/>
+      <dgm:constr type="h" for="ch" forName="composite1" refType="h"/>
+      <dgm:constr type="w" for="ch" forName="spaceBetweenRectangles1" refType="w" refFor="ch" refForName="composite1" fact="-0.4"/>
+      <dgm:constr type="primFontSz" for="des" forName="parent1" op="equ"/>
+      <dgm:constr type="primFontSz" for="des" forName="Childtext1" op="equ"/>
+    </dgm:constrLst>
+    <dgm:choose name="layoutByNodeCnt">
+      <dgm:if name="twoOrLessNodes" axis="ch" ptType="node" func="cnt" op="lte" val="2">
+        <dgm:forEach name="nodesForEach" axis="ch" ptType="node">
+          <dgm:layoutNode name="composite">
+            <dgm:alg type="composite"/>
+            <dgm:shape xmlns:r="http://schemas.openxmlformats.org/officeDocument/2006/relationships" r:blip="">
+              <dgm:adjLst/>
+            </dgm:shape>
+            <dgm:choose name="casesForFirstAndLastNode1">
+              <dgm:if name="startNode1" axis="self" ptType="node" func="pos" op="equ" val="1">
+                <dgm:choose name="removeLineWhenOnlyOneNode1">
+                  <dgm:if name="ifOnlyOneNode1" axis="followSib" ptType="node" func="cnt" op="equ" val="0">
+                    <dgm:constrLst>
+                      <dgm:constr type="w" for="ch" forName="parent" refType="w" fact="0.95"/>
+                      <dgm:constr type="l" for="ch" forName="parent" refType="w" fact="0.025"/>
+                      <dgm:constr type="t" for="ch" forName="parent" refType="h" fact="0.45"/>
+                      <dgm:constr type="h" for="ch" forName="parent" refType="h" fact="0.1"/>
+                      <dgm:constr type="l" for="ch" forName="Childtext" refType="w" fact="0.025"/>
+                      <dgm:constr type="w" for="ch" forName="Childtext" refType="w" fact="0.95"/>
+                      <dgm:constr type="h" for="ch" forName="Childtext" refType="h" fact="0.35"/>
+                      <dgm:constr type="w" for="ch" forName="ConnectLine"/>
+                      <dgm:constr type="h" for="ch" forName="ConnectLine" refType="h" fact="0.08"/>
+                      <dgm:constr type="t" for="ch" forName="ConnectLine" refType="h" fact="0.37"/>
+                      <dgm:constr type="ctrX" for="ch" forName="ConnectLine" refType="w" fact="0.5"/>
+                      <dgm:constr type="w" for="ch" forName="ConnectLineEnd" refType="h" fact="0.02"/>
+                      <dgm:constr type="h" for="ch" forName="ConnectLineEnd" refType="h" fact="0.02"/>
+                      <dgm:constr type="t" for="ch" forName="ConnectLineEnd" refType="h" fact="0.35"/>
+                      <dgm:constr type="ctrX" for="ch" forName="ConnectLineEnd" refType="w" fact="0.5"/>
+                      <dgm:constr type="w" for="ch" forName="EmptyPane" refType="w"/>
+                      <dgm:constr type="t" for="ch" forName="EmptyPane" refType="h" fact="0.55"/>
+                      <dgm:constr type="h" for="ch" forName="EmptyPane" refType="h" fact="0.45"/>
+                    </dgm:constrLst>
+                  </dgm:if>
+                  <dgm:else name="ifMoreThanOneNode1">
+                    <dgm:constrLst>
+                      <dgm:constr type="w" for="ch" forName="parent" refType="w" fact="0.6"/>
+                      <dgm:constr type="l" for="ch" forName="parent" refType="w" fact="0.2"/>
+                      <dgm:constr type="t" for="ch" forName="parent" refType="h" fact="0.45"/>
+                      <dgm:constr type="h" for="ch" forName="parent" refType="h" fact="0.1"/>
+                      <dgm:constr type="l" for="ch" forName="Childtext" refType="w" fact="0.2"/>
+                      <dgm:constr type="w" for="ch" forName="Childtext" refType="w" fact="0.6"/>
+                      <dgm:constr type="h" for="ch" forName="Childtext" refType="h" fact="0.35"/>
+                      <dgm:constr type="w" for="ch" forName="ConnectLine"/>
+                      <dgm:constr type="h" for="ch" forName="ConnectLine" refType="h" fact="0.08"/>
+                      <dgm:constr type="t" for="ch" forName="ConnectLine" refType="h" fact="0.37"/>
+                      <dgm:constr type="ctrX" for="ch" forName="ConnectLine" refType="w" fact="0.5"/>
+                      <dgm:constr type="w" for="ch" forName="ConnectLineEnd" refType="h" fact="0.02"/>
+                      <dgm:constr type="h" for="ch" forName="ConnectLineEnd" refType="h" fact="0.02"/>
+                      <dgm:constr type="t" for="ch" forName="ConnectLineEnd" refType="h" fact="0.35"/>
+                      <dgm:constr type="ctrX" for="ch" forName="ConnectLineEnd" refType="w" fact="0.5"/>
+                      <dgm:constr type="w" for="ch" forName="EmptyPane" refType="w"/>
+                      <dgm:constr type="t" for="ch" forName="EmptyPane" refType="h" fact="0.55"/>
+                      <dgm:constr type="h" for="ch" forName="EmptyPane" refType="h" fact="0.45"/>
+                    </dgm:constrLst>
+                  </dgm:else>
+                </dgm:choose>
+              </dgm:if>
+              <dgm:else name="notStartNode1">
+                <dgm:constrLst>
+                  <dgm:constr type="w" for="ch" forName="parent" refType="w" fact="0.6"/>
+                  <dgm:constr type="l" for="ch" forName="parent" refType="w" fact="0.2"/>
+                  <dgm:constr type="t" for="ch" forName="parent" refType="h" fact="0.45"/>
+                  <dgm:constr type="h" for="ch" forName="parent" refType="h" fact="0.1"/>
+                  <dgm:constr type="l" for="ch" forName="Childtext" refType="w" fact="0.2"/>
+                  <dgm:constr type="w" for="ch" forName="Childtext" refType="w" fact="0.6"/>
+                  <dgm:constr type="h" for="ch" forName="Childtext" refType="h" fact="0.35"/>
+                  <dgm:constr type="t" for="ch" forName="Childtext" refType="h" fact="0.65"/>
+                  <dgm:constr type="w" for="ch" forName="ConnectLine"/>
+                  <dgm:constr type="h" for="ch" forName="ConnectLine" refType="h" fact="0.08"/>
+                  <dgm:constr type="t" for="ch" forName="ConnectLine" refType="h" fact="0.55"/>
+                  <dgm:constr type="ctrX" for="ch" forName="ConnectLine" refType="w" fact="0.5"/>
+                  <dgm:constr type="w" for="ch" forName="ConnectLineEnd" refType="h" fact="0.02"/>
+                  <dgm:constr type="h" for="ch" forName="ConnectLineEnd" refType="h" fact="0.02"/>
+                  <dgm:constr type="b" for="ch" forName="ConnectLineEnd" refType="h" fact="0.65"/>
+                  <dgm:constr type="ctrX" for="ch" forName="ConnectLineEnd" refType="w" fact="0.5"/>
+                  <dgm:constr type="w" for="ch" forName="EmptyPane" refType="w"/>
+                  <dgm:constr type="h" for="ch" forName="EmptyPane" refType="h" fact="0.45"/>
+                </dgm:constrLst>
+              </dgm:else>
+            </dgm:choose>
+            <dgm:layoutNode name="parent" styleLbl="alignNode1">
+              <dgm:varLst>
+                <dgm:chMax val="1"/>
+                <dgm:chPref val="1"/>
+                <dgm:bulletEnabled val="1"/>
+              </dgm:varLst>
+              <dgm:alg type="tx">
+                <dgm:param type="txAnchorHorz" val="ctr"/>
+                <dgm:param type="txAnchorVert" val="mid"/>
+                <dgm:param type="parTxLTRAlign" val="ctr"/>
+                <dgm:param type="parTxRTLAlign" val="ctr"/>
+              </dgm:alg>
+              <dgm:choose name="casesForFirstAndLastNode">
+                <dgm:if name="startNode" axis="self" ptType="node" func="pos" op="equ" val="1">
+                  <dgm:choose name="removeLineWhenOnlyOneNode">
+                    <dgm:if name="ifOnlyOneNode" axis="followSib" ptType="node" func="cnt" op="equ" val="0">
+                      <dgm:shape xmlns:r="http://schemas.openxmlformats.org/officeDocument/2006/relationships" type="roundRect" r:blip="">
+                        <dgm:adjLst/>
+                      </dgm:shape>
+                    </dgm:if>
+                    <dgm:else name="ifMoreThanOneNode">
+                      <dgm:choose name="Name18">
+                        <dgm:if name="Name19" func="var" arg="dir" op="equ" val="norm">
+                          <dgm:shape xmlns:r="http://schemas.openxmlformats.org/officeDocument/2006/relationships" rot="-90" type="round2SameRect" r:blip="">
+                            <dgm:adjLst/>
+                          </dgm:shape>
+                        </dgm:if>
+                        <dgm:else name="Name20">
+                          <dgm:shape xmlns:r="http://schemas.openxmlformats.org/officeDocument/2006/relationships" rot="90" type="round2SameRect" r:blip="">
+                            <dgm:adjLst/>
+                          </dgm:shape>
+                        </dgm:else>
+                      </dgm:choose>
+                    </dgm:else>
+                  </dgm:choose>
+                </dgm:if>
+                <dgm:else name="notStartNode">
+                  <dgm:choose name="Name22">
+                    <dgm:if name="Name23" axis="self" ptType="node" func="revPos" op="equ" val="1">
+                      <dgm:choose name="Name24">
+                        <dgm:if name="Name25" func="var" arg="dir" op="equ" val="norm">
+                          <dgm:shape xmlns:r="http://schemas.openxmlformats.org/officeDocument/2006/relationships" rot="90" type="round2SameRect" r:blip="">
+                            <dgm:adjLst/>
+                          </dgm:shape>
+                        </dgm:if>
+                        <dgm:else name="Name26">
+                          <dgm:shape xmlns:r="http://schemas.openxmlformats.org/officeDocument/2006/relationships" rot="-90" type="round2SameRect" r:blip="">
+                            <dgm:adjLst/>
+                          </dgm:shape>
+                        </dgm:else>
+                      </dgm:choose>
+                    </dgm:if>
+                    <dgm:else name="Name27">
+                      <dgm:shape xmlns:r="http://schemas.openxmlformats.org/officeDocument/2006/relationships" type="rect" r:blip="">
+                        <dgm:adjLst/>
+                      </dgm:shape>
+                    </dgm:else>
+                  </dgm:choose>
+                </dgm:else>
+              </dgm:choose>
+              <dgm:presOf axis="self" ptType="node"/>
+              <dgm:constrLst>
+                <dgm:constr type="lMarg" refType="primFontSz" fact="0.6"/>
+                <dgm:constr type="rMarg" refType="primFontSz" fact="0.6"/>
+                <dgm:constr type="tMarg" refType="primFontSz" fact="0.6"/>
+                <dgm:constr type="bMarg" refType="primFontSz" fact="0.6"/>
+              </dgm:constrLst>
+              <dgm:ruleLst>
+                <dgm:rule type="primFontSz" val="11" fact="NaN" max="NaN"/>
+              </dgm:ruleLst>
+            </dgm:layoutNode>
+            <dgm:layoutNode name="Childtext" styleLbl="revTx">
+              <dgm:varLst>
+                <dgm:bulletEnabled val="1"/>
+              </dgm:varLst>
+              <dgm:choose name="casesForTxtDirLogic">
+                <dgm:if name="Name77" axis="self" ptType="node" func="posOdd" op="equ" val="1">
+                  <dgm:alg type="tx">
+                    <dgm:param type="txAnchorVert" val="b"/>
+                    <dgm:param type="txAnchorHorz" val="ctr"/>
+                    <dgm:param type="parTxLTRAlign" val="ctr"/>
+                    <dgm:param type="parTxRTLAlign" val="ctr"/>
+                  </dgm:alg>
+                  <dgm:constrLst>
+                    <dgm:constr type="lMarg"/>
+                    <dgm:constr type="rMarg"/>
+                    <dgm:constr type="tMarg"/>
+                    <dgm:constr type="bMarg" refType="primFontSz" fact="0.6"/>
+                  </dgm:constrLst>
+                </dgm:if>
+                <dgm:else name="Name88">
+                  <dgm:alg type="tx">
+                    <dgm:param type="txAnchorVert" val="t"/>
+                    <dgm:param type="txAnchorHorz" val="ctr"/>
+                    <dgm:param type="parTxLTRAlign" val="ctr"/>
+                    <dgm:param type="parTxRTLAlign" val="ctr"/>
+                  </dgm:alg>
+                  <dgm:constrLst>
+                    <dgm:constr type="lMarg"/>
+                    <dgm:constr type="rMarg"/>
+                    <dgm:constr type="tMarg" refType="primFontSz" fact="0.6"/>
+                    <dgm:constr type="bMarg"/>
+                  </dgm:constrLst>
+                </dgm:else>
+              </dgm:choose>
+              <dgm:shape xmlns:r="http://schemas.openxmlformats.org/officeDocument/2006/relationships" type="rect" r:blip="">
+                <dgm:adjLst/>
+              </dgm:shape>
+              <dgm:presOf axis="ch" ptType="node"/>
+              <dgm:ruleLst>
+                <dgm:rule type="primFontSz" val="11" fact="NaN" max="NaN"/>
+              </dgm:ruleLst>
+            </dgm:layoutNode>
+            <dgm:layoutNode name="ConnectLine" styleLbl="sibTrans1D1">
+              <dgm:alg type="sp"/>
+              <dgm:shape xmlns:r="http://schemas.openxmlformats.org/officeDocument/2006/relationships" type="line" r:blip="">
+                <dgm:adjLst/>
+                <dgm:extLst>
+                  <a:ext uri="{B698B0E9-8C71-41B9-8309-B3DCBF30829C}">
+                    <dgm1612:spPr xmlns:dgm1612="http://schemas.microsoft.com/office/drawing/2016/12/diagram">
+                      <a:ln>
+                        <a:prstDash val="dash"/>
+                      </a:ln>
+                    </dgm1612:spPr>
+                  </a:ext>
+                </dgm:extLst>
+              </dgm:shape>
+              <dgm:presOf/>
+              <dgm:constrLst/>
+            </dgm:layoutNode>
+            <dgm:layoutNode name="ConnectLineEnd" styleLbl="lnNode1">
+              <dgm:alg type="sp"/>
+              <dgm:shape xmlns:r="http://schemas.openxmlformats.org/officeDocument/2006/relationships" type="ellipse" r:blip="">
+                <dgm:adjLst/>
+              </dgm:shape>
+              <dgm:presOf/>
+              <dgm:constrLst/>
+            </dgm:layoutNode>
+            <dgm:layoutNode name="EmptyPane">
+              <dgm:alg type="sp"/>
+              <dgm:shape xmlns:r="http://schemas.openxmlformats.org/officeDocument/2006/relationships" r:blip="">
+                <dgm:adjLst/>
+              </dgm:shape>
+              <dgm:presOf/>
+              <dgm:constrLst/>
+            </dgm:layoutNode>
+          </dgm:layoutNode>
+          <dgm:forEach name="Name28" axis="followSib" ptType="sibTrans" cnt="1">
+            <dgm:layoutNode name="spaceBetweenRectangles">
+              <dgm:alg type="sp"/>
+              <dgm:shape xmlns:r="http://schemas.openxmlformats.org/officeDocument/2006/relationships" r:blip="">
+                <dgm:adjLst/>
+              </dgm:shape>
+              <dgm:presOf/>
+              <dgm:constrLst/>
+              <dgm:ruleLst/>
+            </dgm:layoutNode>
+          </dgm:forEach>
+        </dgm:forEach>
+      </dgm:if>
+      <dgm:else name="moreThanTwoNodes">
+        <dgm:forEach name="nodesForEach1" axis="ch" ptType="node">
+          <dgm:layoutNode name="composite1">
+            <dgm:alg type="composite"/>
+            <dgm:shape xmlns:r="http://schemas.openxmlformats.org/officeDocument/2006/relationships" r:blip="">
+              <dgm:adjLst/>
+            </dgm:shape>
+            <dgm:choose name="casesForSnakingLogic21">
+              <dgm:if name="oddNode21" axis="self" ptType="node" func="posOdd" op="equ" val="1">
+                <dgm:constrLst>
+                  <dgm:constr type="w" for="ch" forName="parent1" refType="w" fact="0.6"/>
+                  <dgm:constr type="l" for="ch" forName="parent1" refType="w" fact="0.2"/>
+                  <dgm:constr type="t" for="ch" forName="parent1" refType="h" fact="0.45"/>
+                  <dgm:constr type="h" for="ch" forName="parent1" refType="h" fact="0.1"/>
+                  <dgm:constr type="w" for="ch" forName="Childtext1" refType="w"/>
+                  <dgm:constr type="h" for="ch" forName="Childtext1" refType="h" fact="0.35"/>
+                  <dgm:constr type="w" for="ch" forName="ConnectLine1"/>
+                  <dgm:constr type="h" for="ch" forName="ConnectLine1" refType="h" fact="0.08"/>
+                  <dgm:constr type="t" for="ch" forName="ConnectLine1" refType="h" fact="0.37"/>
+                  <dgm:constr type="ctrX" for="ch" forName="ConnectLine1" refType="w" fact="0.5"/>
+                  <dgm:constr type="w" for="ch" forName="ConnectLineEnd1" refType="h" fact="0.02"/>
+                  <dgm:constr type="h" for="ch" forName="ConnectLineEnd1" refType="h" fact="0.02"/>
+                  <dgm:constr type="t" for="ch" forName="ConnectLineEnd1" refType="h" fact="0.35"/>
+                  <dgm:constr type="ctrX" for="ch" forName="ConnectLineEnd1" refType="w" fact="0.5"/>
+                  <dgm:constr type="w" for="ch" forName="EmptyPane1" refType="w"/>
+                  <dgm:constr type="t" for="ch" forName="EmptyPane1" refType="h" fact="0.55"/>
+                  <dgm:constr type="h" for="ch" forName="EmptyPane1" refType="h" fact="0.45"/>
+                </dgm:constrLst>
+              </dgm:if>
+              <dgm:else name="evenNode2">
+                <dgm:constrLst>
+                  <dgm:constr type="w" for="ch" forName="parent1" refType="w" fact="0.6"/>
+                  <dgm:constr type="l" for="ch" forName="parent1" refType="w" fact="0.2"/>
+                  <dgm:constr type="t" for="ch" forName="parent1" refType="h" fact="0.45"/>
+                  <dgm:constr type="h" for="ch" forName="parent1" refType="h" fact="0.1"/>
+                  <dgm:constr type="w" for="ch" forName="Childtext1" refType="w"/>
+                  <dgm:constr type="h" for="ch" forName="Childtext1" refType="h" fact="0.35"/>
+                  <dgm:constr type="t" for="ch" forName="Childtext1" refType="h" fact="0.65"/>
+                  <dgm:constr type="w" for="ch" forName="ConnectLine1"/>
+                  <dgm:constr type="h" for="ch" forName="ConnectLine1" refType="h" fact="0.08"/>
+                  <dgm:constr type="t" for="ch" forName="ConnectLine1" refType="h" fact="0.55"/>
+                  <dgm:constr type="ctrX" for="ch" forName="ConnectLine1" refType="w" fact="0.5"/>
+                  <dgm:constr type="w" for="ch" forName="ConnectLineEnd1" refType="h" fact="0.02"/>
+                  <dgm:constr type="h" for="ch" forName="ConnectLineEnd1" refType="h" fact="0.02"/>
+                  <dgm:constr type="b" for="ch" forName="ConnectLineEnd1" refType="h" fact="0.65"/>
+                  <dgm:constr type="ctrX" for="ch" forName="ConnectLineEnd1" refType="w" fact="0.5"/>
+                  <dgm:constr type="w" for="ch" forName="EmptyPane1" refType="w"/>
+                  <dgm:constr type="h" for="ch" forName="EmptyPane1" refType="h" fact="0.45"/>
+                </dgm:constrLst>
+              </dgm:else>
+            </dgm:choose>
+            <dgm:layoutNode name="parent1" styleLbl="alignNode1">
+              <dgm:varLst>
+                <dgm:chMax val="1"/>
+                <dgm:chPref val="1"/>
+                <dgm:bulletEnabled val="1"/>
+              </dgm:varLst>
+              <dgm:alg type="tx">
+                <dgm:param type="txAnchorHorz" val="ctr"/>
+                <dgm:param type="txAnchorVert" val="mid"/>
+                <dgm:param type="parTxLTRAlign" val="ctr"/>
+                <dgm:param type="parTxRTLAlign" val="ctr"/>
+              </dgm:alg>
+              <dgm:choose name="casesForFirstAndLastNode12">
+                <dgm:if name="startNode12" axis="self" ptType="node" func="pos" op="equ" val="1">
+                  <dgm:choose name="removeLineWhenOnlyOneNode12">
+                    <dgm:if name="ifOnlyOneNode12" axis="followSib" ptType="node" func="cnt" op="equ" val="0">
+                      <dgm:shape xmlns:r="http://schemas.openxmlformats.org/officeDocument/2006/relationships" type="roundRect" r:blip="">
+                        <dgm:adjLst/>
+                      </dgm:shape>
+                    </dgm:if>
+                    <dgm:else name="ifMoreThanOneNode12">
+                      <dgm:choose name="Name181">
+                        <dgm:if name="Name191" func="var" arg="dir" op="equ" val="norm">
+                          <dgm:shape xmlns:r="http://schemas.openxmlformats.org/officeDocument/2006/relationships" rot="-90" type="round2SameRect" r:blip="">
+                            <dgm:adjLst/>
+                          </dgm:shape>
+                        </dgm:if>
+                        <dgm:else name="Name201">
+                          <dgm:shape xmlns:r="http://schemas.openxmlformats.org/officeDocument/2006/relationships" rot="90" type="round2SameRect" r:blip="">
+                            <dgm:adjLst/>
+                          </dgm:shape>
+                        </dgm:else>
+                      </dgm:choose>
+                    </dgm:else>
+                  </dgm:choose>
+                </dgm:if>
+                <dgm:else name="notStartNode12">
+                  <dgm:choose name="Name221">
+                    <dgm:if name="Name231" axis="self" ptType="node" func="revPos" op="equ" val="1">
+                      <dgm:choose name="Name241">
+                        <dgm:if name="Name251" func="var" arg="dir" op="equ" val="norm">
+                          <dgm:shape xmlns:r="http://schemas.openxmlformats.org/officeDocument/2006/relationships" rot="90" type="round2SameRect" r:blip="">
+                            <dgm:adjLst/>
+                          </dgm:shape>
+                        </dgm:if>
+                        <dgm:else name="Name261">
+                          <dgm:shape xmlns:r="http://schemas.openxmlformats.org/officeDocument/2006/relationships" rot="-90" type="round2SameRect" r:blip="">
+                            <dgm:adjLst/>
+                          </dgm:shape>
+                        </dgm:else>
+                      </dgm:choose>
+                    </dgm:if>
+                    <dgm:else name="Name271">
+                      <dgm:shape xmlns:r="http://schemas.openxmlformats.org/officeDocument/2006/relationships" type="rect" r:blip="">
+                        <dgm:adjLst/>
+                      </dgm:shape>
+                    </dgm:else>
+                  </dgm:choose>
+                </dgm:else>
+              </dgm:choose>
+              <dgm:presOf axis="self" ptType="node"/>
+              <dgm:constrLst>
+                <dgm:constr type="lMarg" refType="primFontSz" fact="0.6"/>
+                <dgm:constr type="rMarg" refType="primFontSz" fact="0.6"/>
+                <dgm:constr type="tMarg" refType="primFontSz" fact="0.6"/>
+                <dgm:constr type="bMarg" refType="primFontSz" fact="0.6"/>
+              </dgm:constrLst>
+              <dgm:ruleLst>
+                <dgm:rule type="primFontSz" val="11" fact="NaN" max="NaN"/>
+              </dgm:ruleLst>
+            </dgm:layoutNode>
+            <dgm:layoutNode name="Childtext1" styleLbl="revTx">
+              <dgm:varLst>
+                <dgm:bulletEnabled val="1"/>
+              </dgm:varLst>
+              <dgm:choose name="casesForTxtDirLogic1">
+                <dgm:if name="Name771" axis="self" ptType="node" func="posOdd" op="equ" val="1">
+                  <dgm:alg type="tx">
+                    <dgm:param type="txAnchorVert" val="b"/>
+                    <dgm:param type="txAnchorHorz" val="ctr"/>
+                    <dgm:param type="parTxLTRAlign" val="ctr"/>
+                    <dgm:param type="parTxRTLAlign" val="ctr"/>
+                  </dgm:alg>
+                  <dgm:constrLst>
+                    <dgm:constr type="lMarg"/>
+                    <dgm:constr type="rMarg"/>
+                    <dgm:constr type="tMarg"/>
+                    <dgm:constr type="bMarg" refType="primFontSz" fact="0.6"/>
+                  </dgm:constrLst>
+                </dgm:if>
+                <dgm:else name="Name881">
+                  <dgm:alg type="tx">
+                    <dgm:param type="txAnchorVert" val="t"/>
+                    <dgm:param type="txAnchorHorz" val="ctr"/>
+                    <dgm:param type="parTxLTRAlign" val="ctr"/>
+                    <dgm:param type="parTxRTLAlign" val="ctr"/>
+                  </dgm:alg>
+                  <dgm:constrLst>
+                    <dgm:constr type="lMarg"/>
+                    <dgm:constr type="rMarg"/>
+                    <dgm:constr type="tMarg" refType="primFontSz" fact="0.6"/>
+                    <dgm:constr type="bMarg"/>
+                  </dgm:constrLst>
+                </dgm:else>
+              </dgm:choose>
+              <dgm:shape xmlns:r="http://schemas.openxmlformats.org/officeDocument/2006/relationships" type="rect" r:blip="">
+                <dgm:adjLst/>
+              </dgm:shape>
+              <dgm:presOf axis="ch" ptType="node"/>
+              <dgm:ruleLst>
+                <dgm:rule type="primFontSz" val="11" fact="NaN" max="NaN"/>
+              </dgm:ruleLst>
+            </dgm:layoutNode>
+            <dgm:layoutNode name="ConnectLine1" styleLbl="sibTrans1D1">
+              <dgm:alg type="sp"/>
+              <dgm:shape xmlns:r="http://schemas.openxmlformats.org/officeDocument/2006/relationships" type="line" r:blip="">
+                <dgm:adjLst/>
+                <dgm:extLst>
+                  <a:ext uri="{B698B0E9-8C71-41B9-8309-B3DCBF30829C}">
+                    <dgm1612:spPr xmlns:dgm1612="http://schemas.microsoft.com/office/drawing/2016/12/diagram">
+                      <a:ln>
+                        <a:prstDash val="dash"/>
+                      </a:ln>
+                    </dgm1612:spPr>
+                  </a:ext>
+                </dgm:extLst>
+              </dgm:shape>
+              <dgm:presOf/>
+              <dgm:constrLst/>
+            </dgm:layoutNode>
+            <dgm:layoutNode name="ConnectLineEnd1" styleLbl="lnNode1">
+              <dgm:alg type="sp"/>
+              <dgm:shape xmlns:r="http://schemas.openxmlformats.org/officeDocument/2006/relationships" type="ellipse" r:blip="">
+                <dgm:adjLst/>
+              </dgm:shape>
+              <dgm:presOf/>
+              <dgm:constrLst/>
+            </dgm:layoutNode>
+            <dgm:layoutNode name="EmptyPane1">
+              <dgm:alg type="sp"/>
+              <dgm:shape xmlns:r="http://schemas.openxmlformats.org/officeDocument/2006/relationships" r:blip="">
+                <dgm:adjLst/>
+              </dgm:shape>
+              <dgm:presOf/>
+              <dgm:constrLst/>
+            </dgm:layoutNode>
+          </dgm:layoutNode>
+          <dgm:forEach name="Name281" axis="followSib" ptType="sibTrans" cnt="1">
+            <dgm:layoutNode name="spaceBetweenRectangles1">
+              <dgm:alg type="sp"/>
+              <dgm:shape xmlns:r="http://schemas.openxmlformats.org/officeDocument/2006/relationships" r:blip="">
+                <dgm:adjLst/>
+              </dgm:shape>
+              <dgm:presOf/>
+              <dgm:constrLst/>
+              <dgm:ruleLst/>
+            </dgm:layoutNode>
+          </dgm:forEach>
+        </dgm:forEach>
+      </dgm:else>
+    </dgm:choose>
+  </dgm:layoutNode>
+</dgm:layoutDef>
+</file>
+
 <file path=ppt/diagrams/quickStyle1.xml><?xml version="1.0" encoding="utf-8"?>
 <dgm:styleDef xmlns:dgm="http://schemas.openxmlformats.org/drawingml/2006/diagram" xmlns:a="http://schemas.openxmlformats.org/drawingml/2006/main" uniqueId="urn:microsoft.com/office/officeart/2005/8/quickstyle/simple1">
   <dgm:title val=""/>
@@ -9991,6 +12595,1040 @@
 </file>
 
 <file path=ppt/diagrams/quickStyle3.xml><?xml version="1.0" encoding="utf-8"?>
+<dgm:styleDef xmlns:dgm="http://schemas.openxmlformats.org/drawingml/2006/diagram" xmlns:a="http://schemas.openxmlformats.org/drawingml/2006/main" uniqueId="urn:microsoft.com/office/officeart/2005/8/quickstyle/simple1">
+  <dgm:title val=""/>
+  <dgm:desc val=""/>
+  <dgm:catLst>
+    <dgm:cat type="simple" pri="10100"/>
+  </dgm:catLst>
+  <dgm:scene3d>
+    <a:camera prst="orthographicFront"/>
+    <a:lightRig rig="threePt" dir="t"/>
+  </dgm:scene3d>
+  <dgm:styleLbl name="node0">
+    <dgm:scene3d>
+      <a:camera prst="orthographicFront"/>
+      <a:lightRig rig="threePt" dir="t"/>
+    </dgm:scene3d>
+    <dgm:sp3d/>
+    <dgm:txPr/>
+    <dgm:style>
+      <a:lnRef idx="2">
+        <a:scrgbClr r="0" g="0" b="0"/>
+      </a:lnRef>
+      <a:fillRef idx="1">
+        <a:scrgbClr r="0" g="0" b="0"/>
+      </a:fillRef>
+      <a:effectRef idx="0">
+        <a:scrgbClr r="0" g="0" b="0"/>
+      </a:effectRef>
+      <a:fontRef idx="minor">
+        <a:schemeClr val="lt1"/>
+      </a:fontRef>
+    </dgm:style>
+  </dgm:styleLbl>
+  <dgm:styleLbl name="lnNode1">
+    <dgm:scene3d>
+      <a:camera prst="orthographicFront"/>
+      <a:lightRig rig="threePt" dir="t"/>
+    </dgm:scene3d>
+    <dgm:sp3d/>
+    <dgm:txPr/>
+    <dgm:style>
+      <a:lnRef idx="2">
+        <a:scrgbClr r="0" g="0" b="0"/>
+      </a:lnRef>
+      <a:fillRef idx="1">
+        <a:scrgbClr r="0" g="0" b="0"/>
+      </a:fillRef>
+      <a:effectRef idx="0">
+        <a:scrgbClr r="0" g="0" b="0"/>
+      </a:effectRef>
+      <a:fontRef idx="minor">
+        <a:schemeClr val="lt1"/>
+      </a:fontRef>
+    </dgm:style>
+  </dgm:styleLbl>
+  <dgm:styleLbl name="vennNode1">
+    <dgm:scene3d>
+      <a:camera prst="orthographicFront"/>
+      <a:lightRig rig="threePt" dir="t"/>
+    </dgm:scene3d>
+    <dgm:sp3d/>
+    <dgm:txPr/>
+    <dgm:style>
+      <a:lnRef idx="2">
+        <a:scrgbClr r="0" g="0" b="0"/>
+      </a:lnRef>
+      <a:fillRef idx="1">
+        <a:scrgbClr r="0" g="0" b="0"/>
+      </a:fillRef>
+      <a:effectRef idx="0">
+        <a:scrgbClr r="0" g="0" b="0"/>
+      </a:effectRef>
+      <a:fontRef idx="minor">
+        <a:schemeClr val="tx1"/>
+      </a:fontRef>
+    </dgm:style>
+  </dgm:styleLbl>
+  <dgm:styleLbl name="alignNode1">
+    <dgm:scene3d>
+      <a:camera prst="orthographicFront"/>
+      <a:lightRig rig="threePt" dir="t"/>
+    </dgm:scene3d>
+    <dgm:sp3d/>
+    <dgm:txPr/>
+    <dgm:style>
+      <a:lnRef idx="2">
+        <a:scrgbClr r="0" g="0" b="0"/>
+      </a:lnRef>
+      <a:fillRef idx="1">
+        <a:scrgbClr r="0" g="0" b="0"/>
+      </a:fillRef>
+      <a:effectRef idx="0">
+        <a:scrgbClr r="0" g="0" b="0"/>
+      </a:effectRef>
+      <a:fontRef idx="minor">
+        <a:schemeClr val="lt1"/>
+      </a:fontRef>
+    </dgm:style>
+  </dgm:styleLbl>
+  <dgm:styleLbl name="node1">
+    <dgm:scene3d>
+      <a:camera prst="orthographicFront"/>
+      <a:lightRig rig="threePt" dir="t"/>
+    </dgm:scene3d>
+    <dgm:sp3d/>
+    <dgm:txPr/>
+    <dgm:style>
+      <a:lnRef idx="2">
+        <a:scrgbClr r="0" g="0" b="0"/>
+      </a:lnRef>
+      <a:fillRef idx="1">
+        <a:scrgbClr r="0" g="0" b="0"/>
+      </a:fillRef>
+      <a:effectRef idx="0">
+        <a:scrgbClr r="0" g="0" b="0"/>
+      </a:effectRef>
+      <a:fontRef idx="minor">
+        <a:schemeClr val="lt1"/>
+      </a:fontRef>
+    </dgm:style>
+  </dgm:styleLbl>
+  <dgm:styleLbl name="node2">
+    <dgm:scene3d>
+      <a:camera prst="orthographicFront"/>
+      <a:lightRig rig="threePt" dir="t"/>
+    </dgm:scene3d>
+    <dgm:sp3d/>
+    <dgm:txPr/>
+    <dgm:style>
+      <a:lnRef idx="2">
+        <a:scrgbClr r="0" g="0" b="0"/>
+      </a:lnRef>
+      <a:fillRef idx="1">
+        <a:scrgbClr r="0" g="0" b="0"/>
+      </a:fillRef>
+      <a:effectRef idx="0">
+        <a:scrgbClr r="0" g="0" b="0"/>
+      </a:effectRef>
+      <a:fontRef idx="minor">
+        <a:schemeClr val="lt1"/>
+      </a:fontRef>
+    </dgm:style>
+  </dgm:styleLbl>
+  <dgm:styleLbl name="node3">
+    <dgm:scene3d>
+      <a:camera prst="orthographicFront"/>
+      <a:lightRig rig="threePt" dir="t"/>
+    </dgm:scene3d>
+    <dgm:sp3d/>
+    <dgm:txPr/>
+    <dgm:style>
+      <a:lnRef idx="2">
+        <a:scrgbClr r="0" g="0" b="0"/>
+      </a:lnRef>
+      <a:fillRef idx="1">
+        <a:scrgbClr r="0" g="0" b="0"/>
+      </a:fillRef>
+      <a:effectRef idx="0">
+        <a:scrgbClr r="0" g="0" b="0"/>
+      </a:effectRef>
+      <a:fontRef idx="minor">
+        <a:schemeClr val="lt1"/>
+      </a:fontRef>
+    </dgm:style>
+  </dgm:styleLbl>
+  <dgm:styleLbl name="node4">
+    <dgm:scene3d>
+      <a:camera prst="orthographicFront"/>
+      <a:lightRig rig="threePt" dir="t"/>
+    </dgm:scene3d>
+    <dgm:sp3d/>
+    <dgm:txPr/>
+    <dgm:style>
+      <a:lnRef idx="2">
+        <a:scrgbClr r="0" g="0" b="0"/>
+      </a:lnRef>
+      <a:fillRef idx="1">
+        <a:scrgbClr r="0" g="0" b="0"/>
+      </a:fillRef>
+      <a:effectRef idx="0">
+        <a:scrgbClr r="0" g="0" b="0"/>
+      </a:effectRef>
+      <a:fontRef idx="minor">
+        <a:schemeClr val="lt1"/>
+      </a:fontRef>
+    </dgm:style>
+  </dgm:styleLbl>
+  <dgm:styleLbl name="fgImgPlace1">
+    <dgm:scene3d>
+      <a:camera prst="orthographicFront"/>
+      <a:lightRig rig="threePt" dir="t"/>
+    </dgm:scene3d>
+    <dgm:sp3d/>
+    <dgm:txPr/>
+    <dgm:style>
+      <a:lnRef idx="2">
+        <a:scrgbClr r="0" g="0" b="0"/>
+      </a:lnRef>
+      <a:fillRef idx="1">
+        <a:scrgbClr r="0" g="0" b="0"/>
+      </a:fillRef>
+      <a:effectRef idx="0">
+        <a:scrgbClr r="0" g="0" b="0"/>
+      </a:effectRef>
+      <a:fontRef idx="minor"/>
+    </dgm:style>
+  </dgm:styleLbl>
+  <dgm:styleLbl name="alignImgPlace1">
+    <dgm:scene3d>
+      <a:camera prst="orthographicFront"/>
+      <a:lightRig rig="threePt" dir="t"/>
+    </dgm:scene3d>
+    <dgm:sp3d/>
+    <dgm:txPr/>
+    <dgm:style>
+      <a:lnRef idx="2">
+        <a:scrgbClr r="0" g="0" b="0"/>
+      </a:lnRef>
+      <a:fillRef idx="1">
+        <a:scrgbClr r="0" g="0" b="0"/>
+      </a:fillRef>
+      <a:effectRef idx="0">
+        <a:scrgbClr r="0" g="0" b="0"/>
+      </a:effectRef>
+      <a:fontRef idx="minor"/>
+    </dgm:style>
+  </dgm:styleLbl>
+  <dgm:styleLbl name="bgImgPlace1">
+    <dgm:scene3d>
+      <a:camera prst="orthographicFront"/>
+      <a:lightRig rig="threePt" dir="t"/>
+    </dgm:scene3d>
+    <dgm:sp3d/>
+    <dgm:txPr/>
+    <dgm:style>
+      <a:lnRef idx="2">
+        <a:scrgbClr r="0" g="0" b="0"/>
+      </a:lnRef>
+      <a:fillRef idx="1">
+        <a:scrgbClr r="0" g="0" b="0"/>
+      </a:fillRef>
+      <a:effectRef idx="0">
+        <a:scrgbClr r="0" g="0" b="0"/>
+      </a:effectRef>
+      <a:fontRef idx="minor"/>
+    </dgm:style>
+  </dgm:styleLbl>
+  <dgm:styleLbl name="sibTrans2D1">
+    <dgm:scene3d>
+      <a:camera prst="orthographicFront"/>
+      <a:lightRig rig="threePt" dir="t"/>
+    </dgm:scene3d>
+    <dgm:sp3d/>
+    <dgm:txPr/>
+    <dgm:style>
+      <a:lnRef idx="0">
+        <a:scrgbClr r="0" g="0" b="0"/>
+      </a:lnRef>
+      <a:fillRef idx="1">
+        <a:scrgbClr r="0" g="0" b="0"/>
+      </a:fillRef>
+      <a:effectRef idx="0">
+        <a:scrgbClr r="0" g="0" b="0"/>
+      </a:effectRef>
+      <a:fontRef idx="minor">
+        <a:schemeClr val="lt1"/>
+      </a:fontRef>
+    </dgm:style>
+  </dgm:styleLbl>
+  <dgm:styleLbl name="fgSibTrans2D1">
+    <dgm:scene3d>
+      <a:camera prst="orthographicFront"/>
+      <a:lightRig rig="threePt" dir="t"/>
+    </dgm:scene3d>
+    <dgm:sp3d/>
+    <dgm:txPr/>
+    <dgm:style>
+      <a:lnRef idx="0">
+        <a:scrgbClr r="0" g="0" b="0"/>
+      </a:lnRef>
+      <a:fillRef idx="1">
+        <a:scrgbClr r="0" g="0" b="0"/>
+      </a:fillRef>
+      <a:effectRef idx="0">
+        <a:scrgbClr r="0" g="0" b="0"/>
+      </a:effectRef>
+      <a:fontRef idx="minor">
+        <a:schemeClr val="lt1"/>
+      </a:fontRef>
+    </dgm:style>
+  </dgm:styleLbl>
+  <dgm:styleLbl name="bgSibTrans2D1">
+    <dgm:scene3d>
+      <a:camera prst="orthographicFront"/>
+      <a:lightRig rig="threePt" dir="t"/>
+    </dgm:scene3d>
+    <dgm:sp3d/>
+    <dgm:txPr/>
+    <dgm:style>
+      <a:lnRef idx="0">
+        <a:scrgbClr r="0" g="0" b="0"/>
+      </a:lnRef>
+      <a:fillRef idx="1">
+        <a:scrgbClr r="0" g="0" b="0"/>
+      </a:fillRef>
+      <a:effectRef idx="0">
+        <a:scrgbClr r="0" g="0" b="0"/>
+      </a:effectRef>
+      <a:fontRef idx="minor">
+        <a:schemeClr val="lt1"/>
+      </a:fontRef>
+    </dgm:style>
+  </dgm:styleLbl>
+  <dgm:styleLbl name="sibTrans1D1">
+    <dgm:scene3d>
+      <a:camera prst="orthographicFront"/>
+      <a:lightRig rig="threePt" dir="t"/>
+    </dgm:scene3d>
+    <dgm:sp3d/>
+    <dgm:txPr/>
+    <dgm:style>
+      <a:lnRef idx="1">
+        <a:scrgbClr r="0" g="0" b="0"/>
+      </a:lnRef>
+      <a:fillRef idx="0">
+        <a:scrgbClr r="0" g="0" b="0"/>
+      </a:fillRef>
+      <a:effectRef idx="0">
+        <a:scrgbClr r="0" g="0" b="0"/>
+      </a:effectRef>
+      <a:fontRef idx="minor"/>
+    </dgm:style>
+  </dgm:styleLbl>
+  <dgm:styleLbl name="callout">
+    <dgm:scene3d>
+      <a:camera prst="orthographicFront"/>
+      <a:lightRig rig="threePt" dir="t"/>
+    </dgm:scene3d>
+    <dgm:sp3d/>
+    <dgm:txPr/>
+    <dgm:style>
+      <a:lnRef idx="2">
+        <a:scrgbClr r="0" g="0" b="0"/>
+      </a:lnRef>
+      <a:fillRef idx="1">
+        <a:scrgbClr r="0" g="0" b="0"/>
+      </a:fillRef>
+      <a:effectRef idx="0">
+        <a:scrgbClr r="0" g="0" b="0"/>
+      </a:effectRef>
+      <a:fontRef idx="minor"/>
+    </dgm:style>
+  </dgm:styleLbl>
+  <dgm:styleLbl name="asst0">
+    <dgm:scene3d>
+      <a:camera prst="orthographicFront"/>
+      <a:lightRig rig="threePt" dir="t"/>
+    </dgm:scene3d>
+    <dgm:sp3d/>
+    <dgm:txPr/>
+    <dgm:style>
+      <a:lnRef idx="2">
+        <a:scrgbClr r="0" g="0" b="0"/>
+      </a:lnRef>
+      <a:fillRef idx="1">
+        <a:scrgbClr r="0" g="0" b="0"/>
+      </a:fillRef>
+      <a:effectRef idx="0">
+        <a:scrgbClr r="0" g="0" b="0"/>
+      </a:effectRef>
+      <a:fontRef idx="minor">
+        <a:schemeClr val="lt1"/>
+      </a:fontRef>
+    </dgm:style>
+  </dgm:styleLbl>
+  <dgm:styleLbl name="asst1">
+    <dgm:scene3d>
+      <a:camera prst="orthographicFront"/>
+      <a:lightRig rig="threePt" dir="t"/>
+    </dgm:scene3d>
+    <dgm:sp3d/>
+    <dgm:txPr/>
+    <dgm:style>
+      <a:lnRef idx="2">
+        <a:scrgbClr r="0" g="0" b="0"/>
+      </a:lnRef>
+      <a:fillRef idx="1">
+        <a:scrgbClr r="0" g="0" b="0"/>
+      </a:fillRef>
+      <a:effectRef idx="0">
+        <a:scrgbClr r="0" g="0" b="0"/>
+      </a:effectRef>
+      <a:fontRef idx="minor">
+        <a:schemeClr val="lt1"/>
+      </a:fontRef>
+    </dgm:style>
+  </dgm:styleLbl>
+  <dgm:styleLbl name="asst2">
+    <dgm:scene3d>
+      <a:camera prst="orthographicFront"/>
+      <a:lightRig rig="threePt" dir="t"/>
+    </dgm:scene3d>
+    <dgm:sp3d/>
+    <dgm:txPr/>
+    <dgm:style>
+      <a:lnRef idx="2">
+        <a:scrgbClr r="0" g="0" b="0"/>
+      </a:lnRef>
+      <a:fillRef idx="1">
+        <a:scrgbClr r="0" g="0" b="0"/>
+      </a:fillRef>
+      <a:effectRef idx="0">
+        <a:scrgbClr r="0" g="0" b="0"/>
+      </a:effectRef>
+      <a:fontRef idx="minor">
+        <a:schemeClr val="lt1"/>
+      </a:fontRef>
+    </dgm:style>
+  </dgm:styleLbl>
+  <dgm:styleLbl name="asst3">
+    <dgm:scene3d>
+      <a:camera prst="orthographicFront"/>
+      <a:lightRig rig="threePt" dir="t"/>
+    </dgm:scene3d>
+    <dgm:sp3d/>
+    <dgm:txPr/>
+    <dgm:style>
+      <a:lnRef idx="2">
+        <a:scrgbClr r="0" g="0" b="0"/>
+      </a:lnRef>
+      <a:fillRef idx="1">
+        <a:scrgbClr r="0" g="0" b="0"/>
+      </a:fillRef>
+      <a:effectRef idx="0">
+        <a:scrgbClr r="0" g="0" b="0"/>
+      </a:effectRef>
+      <a:fontRef idx="minor">
+        <a:schemeClr val="lt1"/>
+      </a:fontRef>
+    </dgm:style>
+  </dgm:styleLbl>
+  <dgm:styleLbl name="asst4">
+    <dgm:scene3d>
+      <a:camera prst="orthographicFront"/>
+      <a:lightRig rig="threePt" dir="t"/>
+    </dgm:scene3d>
+    <dgm:sp3d/>
+    <dgm:txPr/>
+    <dgm:style>
+      <a:lnRef idx="2">
+        <a:scrgbClr r="0" g="0" b="0"/>
+      </a:lnRef>
+      <a:fillRef idx="1">
+        <a:scrgbClr r="0" g="0" b="0"/>
+      </a:fillRef>
+      <a:effectRef idx="0">
+        <a:scrgbClr r="0" g="0" b="0"/>
+      </a:effectRef>
+      <a:fontRef idx="minor">
+        <a:schemeClr val="lt1"/>
+      </a:fontRef>
+    </dgm:style>
+  </dgm:styleLbl>
+  <dgm:styleLbl name="parChTrans2D1">
+    <dgm:scene3d>
+      <a:camera prst="orthographicFront"/>
+      <a:lightRig rig="threePt" dir="t"/>
+    </dgm:scene3d>
+    <dgm:sp3d/>
+    <dgm:txPr/>
+    <dgm:style>
+      <a:lnRef idx="2">
+        <a:scrgbClr r="0" g="0" b="0"/>
+      </a:lnRef>
+      <a:fillRef idx="1">
+        <a:scrgbClr r="0" g="0" b="0"/>
+      </a:fillRef>
+      <a:effectRef idx="0">
+        <a:scrgbClr r="0" g="0" b="0"/>
+      </a:effectRef>
+      <a:fontRef idx="minor">
+        <a:schemeClr val="lt1"/>
+      </a:fontRef>
+    </dgm:style>
+  </dgm:styleLbl>
+  <dgm:styleLbl name="parChTrans2D2">
+    <dgm:scene3d>
+      <a:camera prst="orthographicFront"/>
+      <a:lightRig rig="threePt" dir="t"/>
+    </dgm:scene3d>
+    <dgm:sp3d/>
+    <dgm:txPr/>
+    <dgm:style>
+      <a:lnRef idx="2">
+        <a:scrgbClr r="0" g="0" b="0"/>
+      </a:lnRef>
+      <a:fillRef idx="1">
+        <a:scrgbClr r="0" g="0" b="0"/>
+      </a:fillRef>
+      <a:effectRef idx="0">
+        <a:scrgbClr r="0" g="0" b="0"/>
+      </a:effectRef>
+      <a:fontRef idx="minor">
+        <a:schemeClr val="lt1"/>
+      </a:fontRef>
+    </dgm:style>
+  </dgm:styleLbl>
+  <dgm:styleLbl name="parChTrans2D3">
+    <dgm:scene3d>
+      <a:camera prst="orthographicFront"/>
+      <a:lightRig rig="threePt" dir="t"/>
+    </dgm:scene3d>
+    <dgm:sp3d/>
+    <dgm:txPr/>
+    <dgm:style>
+      <a:lnRef idx="2">
+        <a:scrgbClr r="0" g="0" b="0"/>
+      </a:lnRef>
+      <a:fillRef idx="1">
+        <a:scrgbClr r="0" g="0" b="0"/>
+      </a:fillRef>
+      <a:effectRef idx="0">
+        <a:scrgbClr r="0" g="0" b="0"/>
+      </a:effectRef>
+      <a:fontRef idx="minor">
+        <a:schemeClr val="lt1"/>
+      </a:fontRef>
+    </dgm:style>
+  </dgm:styleLbl>
+  <dgm:styleLbl name="parChTrans2D4">
+    <dgm:scene3d>
+      <a:camera prst="orthographicFront"/>
+      <a:lightRig rig="threePt" dir="t"/>
+    </dgm:scene3d>
+    <dgm:sp3d/>
+    <dgm:txPr/>
+    <dgm:style>
+      <a:lnRef idx="2">
+        <a:scrgbClr r="0" g="0" b="0"/>
+      </a:lnRef>
+      <a:fillRef idx="1">
+        <a:scrgbClr r="0" g="0" b="0"/>
+      </a:fillRef>
+      <a:effectRef idx="0">
+        <a:scrgbClr r="0" g="0" b="0"/>
+      </a:effectRef>
+      <a:fontRef idx="minor">
+        <a:schemeClr val="lt1"/>
+      </a:fontRef>
+    </dgm:style>
+  </dgm:styleLbl>
+  <dgm:styleLbl name="parChTrans1D1">
+    <dgm:scene3d>
+      <a:camera prst="orthographicFront"/>
+      <a:lightRig rig="threePt" dir="t"/>
+    </dgm:scene3d>
+    <dgm:sp3d/>
+    <dgm:txPr/>
+    <dgm:style>
+      <a:lnRef idx="2">
+        <a:scrgbClr r="0" g="0" b="0"/>
+      </a:lnRef>
+      <a:fillRef idx="0">
+        <a:scrgbClr r="0" g="0" b="0"/>
+      </a:fillRef>
+      <a:effectRef idx="0">
+        <a:scrgbClr r="0" g="0" b="0"/>
+      </a:effectRef>
+      <a:fontRef idx="minor"/>
+    </dgm:style>
+  </dgm:styleLbl>
+  <dgm:styleLbl name="parChTrans1D2">
+    <dgm:scene3d>
+      <a:camera prst="orthographicFront"/>
+      <a:lightRig rig="threePt" dir="t"/>
+    </dgm:scene3d>
+    <dgm:sp3d/>
+    <dgm:txPr/>
+    <dgm:style>
+      <a:lnRef idx="2">
+        <a:scrgbClr r="0" g="0" b="0"/>
+      </a:lnRef>
+      <a:fillRef idx="0">
+        <a:scrgbClr r="0" g="0" b="0"/>
+      </a:fillRef>
+      <a:effectRef idx="0">
+        <a:scrgbClr r="0" g="0" b="0"/>
+      </a:effectRef>
+      <a:fontRef idx="minor"/>
+    </dgm:style>
+  </dgm:styleLbl>
+  <dgm:styleLbl name="parChTrans1D3">
+    <dgm:scene3d>
+      <a:camera prst="orthographicFront"/>
+      <a:lightRig rig="threePt" dir="t"/>
+    </dgm:scene3d>
+    <dgm:sp3d/>
+    <dgm:txPr/>
+    <dgm:style>
+      <a:lnRef idx="2">
+        <a:scrgbClr r="0" g="0" b="0"/>
+      </a:lnRef>
+      <a:fillRef idx="0">
+        <a:scrgbClr r="0" g="0" b="0"/>
+      </a:fillRef>
+      <a:effectRef idx="0">
+        <a:scrgbClr r="0" g="0" b="0"/>
+      </a:effectRef>
+      <a:fontRef idx="minor"/>
+    </dgm:style>
+  </dgm:styleLbl>
+  <dgm:styleLbl name="parChTrans1D4">
+    <dgm:scene3d>
+      <a:camera prst="orthographicFront"/>
+      <a:lightRig rig="threePt" dir="t"/>
+    </dgm:scene3d>
+    <dgm:sp3d/>
+    <dgm:txPr/>
+    <dgm:style>
+      <a:lnRef idx="2">
+        <a:scrgbClr r="0" g="0" b="0"/>
+      </a:lnRef>
+      <a:fillRef idx="0">
+        <a:scrgbClr r="0" g="0" b="0"/>
+      </a:fillRef>
+      <a:effectRef idx="0">
+        <a:scrgbClr r="0" g="0" b="0"/>
+      </a:effectRef>
+      <a:fontRef idx="minor"/>
+    </dgm:style>
+  </dgm:styleLbl>
+  <dgm:styleLbl name="fgAcc1">
+    <dgm:scene3d>
+      <a:camera prst="orthographicFront"/>
+      <a:lightRig rig="threePt" dir="t"/>
+    </dgm:scene3d>
+    <dgm:sp3d/>
+    <dgm:txPr/>
+    <dgm:style>
+      <a:lnRef idx="2">
+        <a:scrgbClr r="0" g="0" b="0"/>
+      </a:lnRef>
+      <a:fillRef idx="1">
+        <a:scrgbClr r="0" g="0" b="0"/>
+      </a:fillRef>
+      <a:effectRef idx="0">
+        <a:scrgbClr r="0" g="0" b="0"/>
+      </a:effectRef>
+      <a:fontRef idx="minor"/>
+    </dgm:style>
+  </dgm:styleLbl>
+  <dgm:styleLbl name="conFgAcc1">
+    <dgm:scene3d>
+      <a:camera prst="orthographicFront"/>
+      <a:lightRig rig="threePt" dir="t"/>
+    </dgm:scene3d>
+    <dgm:sp3d/>
+    <dgm:txPr/>
+    <dgm:style>
+      <a:lnRef idx="2">
+        <a:scrgbClr r="0" g="0" b="0"/>
+      </a:lnRef>
+      <a:fillRef idx="1">
+        <a:scrgbClr r="0" g="0" b="0"/>
+      </a:fillRef>
+      <a:effectRef idx="0">
+        <a:scrgbClr r="0" g="0" b="0"/>
+      </a:effectRef>
+      <a:fontRef idx="minor"/>
+    </dgm:style>
+  </dgm:styleLbl>
+  <dgm:styleLbl name="alignAcc1">
+    <dgm:scene3d>
+      <a:camera prst="orthographicFront"/>
+      <a:lightRig rig="threePt" dir="t"/>
+    </dgm:scene3d>
+    <dgm:sp3d/>
+    <dgm:txPr/>
+    <dgm:style>
+      <a:lnRef idx="2">
+        <a:scrgbClr r="0" g="0" b="0"/>
+      </a:lnRef>
+      <a:fillRef idx="1">
+        <a:scrgbClr r="0" g="0" b="0"/>
+      </a:fillRef>
+      <a:effectRef idx="0">
+        <a:scrgbClr r="0" g="0" b="0"/>
+      </a:effectRef>
+      <a:fontRef idx="minor"/>
+    </dgm:style>
+  </dgm:styleLbl>
+  <dgm:styleLbl name="trAlignAcc1">
+    <dgm:scene3d>
+      <a:camera prst="orthographicFront"/>
+      <a:lightRig rig="threePt" dir="t"/>
+    </dgm:scene3d>
+    <dgm:sp3d/>
+    <dgm:txPr/>
+    <dgm:style>
+      <a:lnRef idx="1">
+        <a:scrgbClr r="0" g="0" b="0"/>
+      </a:lnRef>
+      <a:fillRef idx="1">
+        <a:scrgbClr r="0" g="0" b="0"/>
+      </a:fillRef>
+      <a:effectRef idx="0">
+        <a:scrgbClr r="0" g="0" b="0"/>
+      </a:effectRef>
+      <a:fontRef idx="minor"/>
+    </dgm:style>
+  </dgm:styleLbl>
+  <dgm:styleLbl name="bgAcc1">
+    <dgm:scene3d>
+      <a:camera prst="orthographicFront"/>
+      <a:lightRig rig="threePt" dir="t"/>
+    </dgm:scene3d>
+    <dgm:sp3d/>
+    <dgm:txPr/>
+    <dgm:style>
+      <a:lnRef idx="2">
+        <a:scrgbClr r="0" g="0" b="0"/>
+      </a:lnRef>
+      <a:fillRef idx="1">
+        <a:scrgbClr r="0" g="0" b="0"/>
+      </a:fillRef>
+      <a:effectRef idx="0">
+        <a:scrgbClr r="0" g="0" b="0"/>
+      </a:effectRef>
+      <a:fontRef idx="minor"/>
+    </dgm:style>
+  </dgm:styleLbl>
+  <dgm:styleLbl name="solidFgAcc1">
+    <dgm:scene3d>
+      <a:camera prst="orthographicFront"/>
+      <a:lightRig rig="threePt" dir="t"/>
+    </dgm:scene3d>
+    <dgm:sp3d/>
+    <dgm:txPr/>
+    <dgm:style>
+      <a:lnRef idx="2">
+        <a:scrgbClr r="0" g="0" b="0"/>
+      </a:lnRef>
+      <a:fillRef idx="1">
+        <a:scrgbClr r="0" g="0" b="0"/>
+      </a:fillRef>
+      <a:effectRef idx="0">
+        <a:scrgbClr r="0" g="0" b="0"/>
+      </a:effectRef>
+      <a:fontRef idx="minor"/>
+    </dgm:style>
+  </dgm:styleLbl>
+  <dgm:styleLbl name="solidAlignAcc1">
+    <dgm:scene3d>
+      <a:camera prst="orthographicFront"/>
+      <a:lightRig rig="threePt" dir="t"/>
+    </dgm:scene3d>
+    <dgm:sp3d/>
+    <dgm:txPr/>
+    <dgm:style>
+      <a:lnRef idx="2">
+        <a:scrgbClr r="0" g="0" b="0"/>
+      </a:lnRef>
+      <a:fillRef idx="1">
+        <a:scrgbClr r="0" g="0" b="0"/>
+      </a:fillRef>
+      <a:effectRef idx="0">
+        <a:scrgbClr r="0" g="0" b="0"/>
+      </a:effectRef>
+      <a:fontRef idx="minor"/>
+    </dgm:style>
+  </dgm:styleLbl>
+  <dgm:styleLbl name="solidBgAcc1">
+    <dgm:scene3d>
+      <a:camera prst="orthographicFront"/>
+      <a:lightRig rig="threePt" dir="t"/>
+    </dgm:scene3d>
+    <dgm:sp3d/>
+    <dgm:txPr/>
+    <dgm:style>
+      <a:lnRef idx="2">
+        <a:scrgbClr r="0" g="0" b="0"/>
+      </a:lnRef>
+      <a:fillRef idx="1">
+        <a:scrgbClr r="0" g="0" b="0"/>
+      </a:fillRef>
+      <a:effectRef idx="0">
+        <a:scrgbClr r="0" g="0" b="0"/>
+      </a:effectRef>
+      <a:fontRef idx="minor"/>
+    </dgm:style>
+  </dgm:styleLbl>
+  <dgm:styleLbl name="fgAccFollowNode1">
+    <dgm:scene3d>
+      <a:camera prst="orthographicFront"/>
+      <a:lightRig rig="threePt" dir="t"/>
+    </dgm:scene3d>
+    <dgm:sp3d/>
+    <dgm:txPr/>
+    <dgm:style>
+      <a:lnRef idx="2">
+        <a:scrgbClr r="0" g="0" b="0"/>
+      </a:lnRef>
+      <a:fillRef idx="1">
+        <a:scrgbClr r="0" g="0" b="0"/>
+      </a:fillRef>
+      <a:effectRef idx="0">
+        <a:scrgbClr r="0" g="0" b="0"/>
+      </a:effectRef>
+      <a:fontRef idx="minor"/>
+    </dgm:style>
+  </dgm:styleLbl>
+  <dgm:styleLbl name="alignAccFollowNode1">
+    <dgm:scene3d>
+      <a:camera prst="orthographicFront"/>
+      <a:lightRig rig="threePt" dir="t"/>
+    </dgm:scene3d>
+    <dgm:sp3d/>
+    <dgm:txPr/>
+    <dgm:style>
+      <a:lnRef idx="2">
+        <a:scrgbClr r="0" g="0" b="0"/>
+      </a:lnRef>
+      <a:fillRef idx="1">
+        <a:scrgbClr r="0" g="0" b="0"/>
+      </a:fillRef>
+      <a:effectRef idx="0">
+        <a:scrgbClr r="0" g="0" b="0"/>
+      </a:effectRef>
+      <a:fontRef idx="minor"/>
+    </dgm:style>
+  </dgm:styleLbl>
+  <dgm:styleLbl name="bgAccFollowNode1">
+    <dgm:scene3d>
+      <a:camera prst="orthographicFront"/>
+      <a:lightRig rig="threePt" dir="t"/>
+    </dgm:scene3d>
+    <dgm:sp3d/>
+    <dgm:txPr/>
+    <dgm:style>
+      <a:lnRef idx="2">
+        <a:scrgbClr r="0" g="0" b="0"/>
+      </a:lnRef>
+      <a:fillRef idx="1">
+        <a:scrgbClr r="0" g="0" b="0"/>
+      </a:fillRef>
+      <a:effectRef idx="0">
+        <a:scrgbClr r="0" g="0" b="0"/>
+      </a:effectRef>
+      <a:fontRef idx="minor"/>
+    </dgm:style>
+  </dgm:styleLbl>
+  <dgm:styleLbl name="fgAcc0">
+    <dgm:scene3d>
+      <a:camera prst="orthographicFront"/>
+      <a:lightRig rig="threePt" dir="t"/>
+    </dgm:scene3d>
+    <dgm:sp3d/>
+    <dgm:txPr/>
+    <dgm:style>
+      <a:lnRef idx="2">
+        <a:scrgbClr r="0" g="0" b="0"/>
+      </a:lnRef>
+      <a:fillRef idx="1">
+        <a:scrgbClr r="0" g="0" b="0"/>
+      </a:fillRef>
+      <a:effectRef idx="0">
+        <a:scrgbClr r="0" g="0" b="0"/>
+      </a:effectRef>
+      <a:fontRef idx="minor"/>
+    </dgm:style>
+  </dgm:styleLbl>
+  <dgm:styleLbl name="fgAcc2">
+    <dgm:scene3d>
+      <a:camera prst="orthographicFront"/>
+      <a:lightRig rig="threePt" dir="t"/>
+    </dgm:scene3d>
+    <dgm:sp3d/>
+    <dgm:txPr/>
+    <dgm:style>
+      <a:lnRef idx="2">
+        <a:scrgbClr r="0" g="0" b="0"/>
+      </a:lnRef>
+      <a:fillRef idx="1">
+        <a:scrgbClr r="0" g="0" b="0"/>
+      </a:fillRef>
+      <a:effectRef idx="0">
+        <a:scrgbClr r="0" g="0" b="0"/>
+      </a:effectRef>
+      <a:fontRef idx="minor"/>
+    </dgm:style>
+  </dgm:styleLbl>
+  <dgm:styleLbl name="fgAcc3">
+    <dgm:scene3d>
+      <a:camera prst="orthographicFront"/>
+      <a:lightRig rig="threePt" dir="t"/>
+    </dgm:scene3d>
+    <dgm:sp3d/>
+    <dgm:txPr/>
+    <dgm:style>
+      <a:lnRef idx="2">
+        <a:scrgbClr r="0" g="0" b="0"/>
+      </a:lnRef>
+      <a:fillRef idx="1">
+        <a:scrgbClr r="0" g="0" b="0"/>
+      </a:fillRef>
+      <a:effectRef idx="0">
+        <a:scrgbClr r="0" g="0" b="0"/>
+      </a:effectRef>
+      <a:fontRef idx="minor"/>
+    </dgm:style>
+  </dgm:styleLbl>
+  <dgm:styleLbl name="fgAcc4">
+    <dgm:scene3d>
+      <a:camera prst="orthographicFront"/>
+      <a:lightRig rig="threePt" dir="t"/>
+    </dgm:scene3d>
+    <dgm:sp3d/>
+    <dgm:txPr/>
+    <dgm:style>
+      <a:lnRef idx="2">
+        <a:scrgbClr r="0" g="0" b="0"/>
+      </a:lnRef>
+      <a:fillRef idx="1">
+        <a:scrgbClr r="0" g="0" b="0"/>
+      </a:fillRef>
+      <a:effectRef idx="0">
+        <a:scrgbClr r="0" g="0" b="0"/>
+      </a:effectRef>
+      <a:fontRef idx="minor"/>
+    </dgm:style>
+  </dgm:styleLbl>
+  <dgm:styleLbl name="bgShp">
+    <dgm:scene3d>
+      <a:camera prst="orthographicFront"/>
+      <a:lightRig rig="threePt" dir="t"/>
+    </dgm:scene3d>
+    <dgm:sp3d/>
+    <dgm:txPr/>
+    <dgm:style>
+      <a:lnRef idx="0">
+        <a:scrgbClr r="0" g="0" b="0"/>
+      </a:lnRef>
+      <a:fillRef idx="1">
+        <a:scrgbClr r="0" g="0" b="0"/>
+      </a:fillRef>
+      <a:effectRef idx="0">
+        <a:scrgbClr r="0" g="0" b="0"/>
+      </a:effectRef>
+      <a:fontRef idx="minor"/>
+    </dgm:style>
+  </dgm:styleLbl>
+  <dgm:styleLbl name="dkBgShp">
+    <dgm:scene3d>
+      <a:camera prst="orthographicFront"/>
+      <a:lightRig rig="threePt" dir="t"/>
+    </dgm:scene3d>
+    <dgm:sp3d/>
+    <dgm:txPr/>
+    <dgm:style>
+      <a:lnRef idx="0">
+        <a:scrgbClr r="0" g="0" b="0"/>
+      </a:lnRef>
+      <a:fillRef idx="1">
+        <a:scrgbClr r="0" g="0" b="0"/>
+      </a:fillRef>
+      <a:effectRef idx="0">
+        <a:scrgbClr r="0" g="0" b="0"/>
+      </a:effectRef>
+      <a:fontRef idx="minor"/>
+    </dgm:style>
+  </dgm:styleLbl>
+  <dgm:styleLbl name="trBgShp">
+    <dgm:scene3d>
+      <a:camera prst="orthographicFront"/>
+      <a:lightRig rig="threePt" dir="t"/>
+    </dgm:scene3d>
+    <dgm:sp3d/>
+    <dgm:txPr/>
+    <dgm:style>
+      <a:lnRef idx="0">
+        <a:scrgbClr r="0" g="0" b="0"/>
+      </a:lnRef>
+      <a:fillRef idx="1">
+        <a:scrgbClr r="0" g="0" b="0"/>
+      </a:fillRef>
+      <a:effectRef idx="0">
+        <a:scrgbClr r="0" g="0" b="0"/>
+      </a:effectRef>
+      <a:fontRef idx="minor"/>
+    </dgm:style>
+  </dgm:styleLbl>
+  <dgm:styleLbl name="fgShp">
+    <dgm:scene3d>
+      <a:camera prst="orthographicFront"/>
+      <a:lightRig rig="threePt" dir="t"/>
+    </dgm:scene3d>
+    <dgm:sp3d/>
+    <dgm:txPr/>
+    <dgm:style>
+      <a:lnRef idx="2">
+        <a:scrgbClr r="0" g="0" b="0"/>
+      </a:lnRef>
+      <a:fillRef idx="1">
+        <a:scrgbClr r="0" g="0" b="0"/>
+      </a:fillRef>
+      <a:effectRef idx="0">
+        <a:scrgbClr r="0" g="0" b="0"/>
+      </a:effectRef>
+      <a:fontRef idx="minor"/>
+    </dgm:style>
+  </dgm:styleLbl>
+  <dgm:styleLbl name="revTx">
+    <dgm:scene3d>
+      <a:camera prst="orthographicFront"/>
+      <a:lightRig rig="threePt" dir="t"/>
+    </dgm:scene3d>
+    <dgm:sp3d/>
+    <dgm:txPr/>
+    <dgm:style>
+      <a:lnRef idx="0">
+        <a:scrgbClr r="0" g="0" b="0"/>
+      </a:lnRef>
+      <a:fillRef idx="0">
+        <a:scrgbClr r="0" g="0" b="0"/>
+      </a:fillRef>
+      <a:effectRef idx="0">
+        <a:scrgbClr r="0" g="0" b="0"/>
+      </a:effectRef>
+      <a:fontRef idx="minor"/>
+    </dgm:style>
+  </dgm:styleLbl>
+</dgm:styleDef>
+</file>
+
+<file path=ppt/diagrams/quickStyle4.xml><?xml version="1.0" encoding="utf-8"?>
 <dgm:styleDef xmlns:dgm="http://schemas.openxmlformats.org/drawingml/2006/diagram" xmlns:a="http://schemas.openxmlformats.org/drawingml/2006/main" uniqueId="urn:microsoft.com/office/officeart/2005/8/quickstyle/simple1">
   <dgm:title val=""/>
   <dgm:desc val=""/>
@@ -11748,6 +15386,371 @@
     <p:extLst>
       <p:ext uri="{BB962C8B-B14F-4D97-AF65-F5344CB8AC3E}">
         <p14:creationId xmlns:p14="http://schemas.microsoft.com/office/powerpoint/2010/main" val="3620573226"/>
+      </p:ext>
+    </p:extLst>
+  </p:cSld>
+  <p:clrMapOvr>
+    <a:masterClrMapping/>
+  </p:clrMapOvr>
+</p:notes>
+</file>
+
+<file path=ppt/notesSlides/notesSlide5.xml><?xml version="1.0" encoding="utf-8"?>
+<p:notes xmlns:a="http://schemas.openxmlformats.org/drawingml/2006/main" xmlns:r="http://schemas.openxmlformats.org/officeDocument/2006/relationships" xmlns:p="http://schemas.openxmlformats.org/presentationml/2006/main">
+  <p:cSld>
+    <p:spTree>
+      <p:nvGrpSpPr>
+        <p:cNvPr id="1" name=""/>
+        <p:cNvGrpSpPr/>
+        <p:nvPr/>
+      </p:nvGrpSpPr>
+      <p:grpSpPr>
+        <a:xfrm>
+          <a:off x="0" y="0"/>
+          <a:ext cx="0" cy="0"/>
+          <a:chOff x="0" y="0"/>
+          <a:chExt cx="0" cy="0"/>
+        </a:xfrm>
+      </p:grpSpPr>
+      <p:sp>
+        <p:nvSpPr>
+          <p:cNvPr id="2" name="Slide Image Placeholder 1"/>
+          <p:cNvSpPr>
+            <a:spLocks noGrp="1" noRot="1" noChangeAspect="1"/>
+          </p:cNvSpPr>
+          <p:nvPr>
+            <p:ph type="sldImg"/>
+          </p:nvPr>
+        </p:nvSpPr>
+        <p:spPr/>
+      </p:sp>
+      <p:sp>
+        <p:nvSpPr>
+          <p:cNvPr id="3" name="Notes Placeholder 2"/>
+          <p:cNvSpPr>
+            <a:spLocks noGrp="1"/>
+          </p:cNvSpPr>
+          <p:nvPr>
+            <p:ph type="body" idx="1"/>
+          </p:nvPr>
+        </p:nvSpPr>
+        <p:spPr/>
+        <p:txBody>
+          <a:bodyPr/>
+          <a:lstStyle/>
+          <a:p>
+            <a:pPr marL="171450" indent="-171450">
+              <a:buFont typeface="Arial" panose="020B0604020202020204" pitchFamily="34" charset="0"/>
+              <a:buChar char="•"/>
+            </a:pPr>
+            <a:r>
+              <a:rPr lang="en-US" dirty="0"/>
+              <a:t>Indent Unordered item 1</a:t>
+            </a:r>
+          </a:p>
+          <a:p>
+            <a:pPr marL="628650" lvl="1" indent="-171450">
+              <a:buFont typeface="Arial" panose="020B0604020202020204" pitchFamily="34" charset="0"/>
+              <a:buChar char="•"/>
+            </a:pPr>
+            <a:r>
+              <a:rPr lang="en-US" dirty="0"/>
+              <a:t>Indent Unordered item 2</a:t>
+            </a:r>
+          </a:p>
+          <a:p>
+            <a:pPr marL="1085850" lvl="2" indent="-171450">
+              <a:buFont typeface="Arial" panose="020B0604020202020204" pitchFamily="34" charset="0"/>
+              <a:buChar char="•"/>
+            </a:pPr>
+            <a:r>
+              <a:rPr lang="en-US"/>
+              <a:t>Indent Unordered </a:t>
+            </a:r>
+            <a:r>
+              <a:rPr lang="en-US" dirty="0"/>
+              <a:t>item 3</a:t>
+            </a:r>
+          </a:p>
+        </p:txBody>
+      </p:sp>
+      <p:sp>
+        <p:nvSpPr>
+          <p:cNvPr id="4" name="Slide Number Placeholder 3"/>
+          <p:cNvSpPr>
+            <a:spLocks noGrp="1"/>
+          </p:cNvSpPr>
+          <p:nvPr>
+            <p:ph type="sldNum" sz="quarter" idx="5"/>
+          </p:nvPr>
+        </p:nvSpPr>
+        <p:spPr/>
+        <p:txBody>
+          <a:bodyPr/>
+          <a:lstStyle/>
+          <a:p>
+            <a:fld id="{9AD1542E-6E93-4F65-BF96-AEF4ABDF0E84}" type="slidenum">
+              <a:rPr lang="en-US" smtClean="0"/>
+              <a:t>6</a:t>
+            </a:fld>
+            <a:endParaRPr lang="en-US"/>
+          </a:p>
+        </p:txBody>
+      </p:sp>
+    </p:spTree>
+    <p:extLst>
+      <p:ext uri="{BB962C8B-B14F-4D97-AF65-F5344CB8AC3E}">
+        <p14:creationId xmlns:p14="http://schemas.microsoft.com/office/powerpoint/2010/main" val="1694765902"/>
+      </p:ext>
+    </p:extLst>
+  </p:cSld>
+  <p:clrMapOvr>
+    <a:masterClrMapping/>
+  </p:clrMapOvr>
+</p:notes>
+</file>
+
+<file path=ppt/notesSlides/notesSlide6.xml><?xml version="1.0" encoding="utf-8"?>
+<p:notes xmlns:a="http://schemas.openxmlformats.org/drawingml/2006/main" xmlns:r="http://schemas.openxmlformats.org/officeDocument/2006/relationships" xmlns:p="http://schemas.openxmlformats.org/presentationml/2006/main">
+  <p:cSld>
+    <p:spTree>
+      <p:nvGrpSpPr>
+        <p:cNvPr id="1" name=""/>
+        <p:cNvGrpSpPr/>
+        <p:nvPr/>
+      </p:nvGrpSpPr>
+      <p:grpSpPr>
+        <a:xfrm>
+          <a:off x="0" y="0"/>
+          <a:ext cx="0" cy="0"/>
+          <a:chOff x="0" y="0"/>
+          <a:chExt cx="0" cy="0"/>
+        </a:xfrm>
+      </p:grpSpPr>
+      <p:sp>
+        <p:nvSpPr>
+          <p:cNvPr id="2" name="Slide Image Placeholder 1"/>
+          <p:cNvSpPr>
+            <a:spLocks noGrp="1" noRot="1" noChangeAspect="1"/>
+          </p:cNvSpPr>
+          <p:nvPr>
+            <p:ph type="sldImg"/>
+          </p:nvPr>
+        </p:nvSpPr>
+        <p:spPr/>
+      </p:sp>
+      <p:sp>
+        <p:nvSpPr>
+          <p:cNvPr id="3" name="Notes Placeholder 2"/>
+          <p:cNvSpPr>
+            <a:spLocks noGrp="1"/>
+          </p:cNvSpPr>
+          <p:nvPr>
+            <p:ph type="body" idx="1"/>
+          </p:nvPr>
+        </p:nvSpPr>
+        <p:spPr/>
+        <p:txBody>
+          <a:bodyPr/>
+          <a:lstStyle/>
+          <a:p>
+            <a:pPr marL="228600" indent="-228600">
+              <a:buFont typeface="+mj-lt"/>
+              <a:buAutoNum type="arabicPeriod"/>
+            </a:pPr>
+            <a:r>
+              <a:rPr lang="en-US" dirty="0"/>
+              <a:t>Ordered one</a:t>
+            </a:r>
+          </a:p>
+          <a:p>
+            <a:pPr marL="228600" indent="-228600">
+              <a:buFont typeface="+mj-lt"/>
+              <a:buAutoNum type="arabicPeriod"/>
+            </a:pPr>
+            <a:r>
+              <a:rPr lang="en-US" dirty="0"/>
+              <a:t>Ordered two</a:t>
+            </a:r>
+          </a:p>
+          <a:p>
+            <a:pPr marL="228600" indent="-228600">
+              <a:buFont typeface="+mj-lt"/>
+              <a:buAutoNum type="arabicPeriod"/>
+            </a:pPr>
+            <a:r>
+              <a:rPr lang="en-US" dirty="0"/>
+              <a:t>Ordered three</a:t>
+            </a:r>
+          </a:p>
+        </p:txBody>
+      </p:sp>
+      <p:sp>
+        <p:nvSpPr>
+          <p:cNvPr id="4" name="Slide Number Placeholder 3"/>
+          <p:cNvSpPr>
+            <a:spLocks noGrp="1"/>
+          </p:cNvSpPr>
+          <p:nvPr>
+            <p:ph type="sldNum" sz="quarter" idx="5"/>
+          </p:nvPr>
+        </p:nvSpPr>
+        <p:spPr/>
+        <p:txBody>
+          <a:bodyPr/>
+          <a:lstStyle/>
+          <a:p>
+            <a:fld id="{9AD1542E-6E93-4F65-BF96-AEF4ABDF0E84}" type="slidenum">
+              <a:rPr lang="en-US" smtClean="0"/>
+              <a:t>7</a:t>
+            </a:fld>
+            <a:endParaRPr lang="en-US"/>
+          </a:p>
+        </p:txBody>
+      </p:sp>
+    </p:spTree>
+    <p:extLst>
+      <p:ext uri="{BB962C8B-B14F-4D97-AF65-F5344CB8AC3E}">
+        <p14:creationId xmlns:p14="http://schemas.microsoft.com/office/powerpoint/2010/main" val="1089356095"/>
+      </p:ext>
+    </p:extLst>
+  </p:cSld>
+  <p:clrMapOvr>
+    <a:masterClrMapping/>
+  </p:clrMapOvr>
+</p:notes>
+</file>
+
+<file path=ppt/notesSlides/notesSlide7.xml><?xml version="1.0" encoding="utf-8"?>
+<p:notes xmlns:a="http://schemas.openxmlformats.org/drawingml/2006/main" xmlns:r="http://schemas.openxmlformats.org/officeDocument/2006/relationships" xmlns:p="http://schemas.openxmlformats.org/presentationml/2006/main">
+  <p:cSld>
+    <p:spTree>
+      <p:nvGrpSpPr>
+        <p:cNvPr id="1" name=""/>
+        <p:cNvGrpSpPr/>
+        <p:nvPr/>
+      </p:nvGrpSpPr>
+      <p:grpSpPr>
+        <a:xfrm>
+          <a:off x="0" y="0"/>
+          <a:ext cx="0" cy="0"/>
+          <a:chOff x="0" y="0"/>
+          <a:chExt cx="0" cy="0"/>
+        </a:xfrm>
+      </p:grpSpPr>
+      <p:sp>
+        <p:nvSpPr>
+          <p:cNvPr id="2" name="Slide Image Placeholder 1"/>
+          <p:cNvSpPr>
+            <a:spLocks noGrp="1" noRot="1" noChangeAspect="1"/>
+          </p:cNvSpPr>
+          <p:nvPr>
+            <p:ph type="sldImg"/>
+          </p:nvPr>
+        </p:nvSpPr>
+        <p:spPr/>
+      </p:sp>
+      <p:sp>
+        <p:nvSpPr>
+          <p:cNvPr id="3" name="Notes Placeholder 2"/>
+          <p:cNvSpPr>
+            <a:spLocks noGrp="1"/>
+          </p:cNvSpPr>
+          <p:nvPr>
+            <p:ph type="body" idx="1"/>
+          </p:nvPr>
+        </p:nvSpPr>
+        <p:spPr/>
+        <p:txBody>
+          <a:bodyPr/>
+          <a:lstStyle/>
+          <a:p>
+            <a:pPr marL="228600" indent="-228600">
+              <a:buFont typeface="+mj-lt"/>
+              <a:buAutoNum type="arabicPeriod"/>
+            </a:pPr>
+            <a:r>
+              <a:rPr lang="en-US" dirty="0"/>
+              <a:t>Indent Ordered One</a:t>
+            </a:r>
+          </a:p>
+          <a:p>
+            <a:pPr marL="685800" lvl="1" indent="-228600">
+              <a:buFont typeface="+mj-lt"/>
+              <a:buAutoNum type="arabicPeriod"/>
+            </a:pPr>
+            <a:r>
+              <a:rPr lang="en-US" dirty="0"/>
+              <a:t>Indent Ordered One </a:t>
+            </a:r>
+            <a:r>
+              <a:rPr lang="en-US" dirty="0" err="1"/>
+              <a:t>One</a:t>
+            </a:r>
+            <a:endParaRPr lang="en-US" dirty="0"/>
+          </a:p>
+          <a:p>
+            <a:pPr marL="1143000" lvl="2" indent="-228600">
+              <a:buFont typeface="+mj-lt"/>
+              <a:buAutoNum type="arabicPeriod"/>
+            </a:pPr>
+            <a:r>
+              <a:rPr lang="en-US" dirty="0"/>
+              <a:t>Indent Order One </a:t>
+            </a:r>
+            <a:r>
+              <a:rPr lang="en-US" dirty="0" err="1"/>
+              <a:t>One</a:t>
+            </a:r>
+            <a:r>
+              <a:rPr lang="en-US" dirty="0"/>
+              <a:t> </a:t>
+            </a:r>
+            <a:r>
+              <a:rPr lang="en-US" dirty="0" err="1"/>
+              <a:t>One</a:t>
+            </a:r>
+            <a:endParaRPr lang="en-US" dirty="0"/>
+          </a:p>
+          <a:p>
+            <a:pPr marL="228600" lvl="0" indent="-228600">
+              <a:buFont typeface="+mj-lt"/>
+              <a:buAutoNum type="arabicPeriod"/>
+            </a:pPr>
+            <a:r>
+              <a:rPr lang="en-US" dirty="0"/>
+              <a:t>Indent Ordered Three</a:t>
+            </a:r>
+          </a:p>
+        </p:txBody>
+      </p:sp>
+      <p:sp>
+        <p:nvSpPr>
+          <p:cNvPr id="4" name="Slide Number Placeholder 3"/>
+          <p:cNvSpPr>
+            <a:spLocks noGrp="1"/>
+          </p:cNvSpPr>
+          <p:nvPr>
+            <p:ph type="sldNum" sz="quarter" idx="5"/>
+          </p:nvPr>
+        </p:nvSpPr>
+        <p:spPr/>
+        <p:txBody>
+          <a:bodyPr/>
+          <a:lstStyle/>
+          <a:p>
+            <a:fld id="{9AD1542E-6E93-4F65-BF96-AEF4ABDF0E84}" type="slidenum">
+              <a:rPr lang="en-US" smtClean="0"/>
+              <a:t>8</a:t>
+            </a:fld>
+            <a:endParaRPr lang="en-US"/>
+          </a:p>
+        </p:txBody>
+      </p:sp>
+    </p:spTree>
+    <p:extLst>
+      <p:ext uri="{BB962C8B-B14F-4D97-AF65-F5344CB8AC3E}">
+        <p14:creationId xmlns:p14="http://schemas.microsoft.com/office/powerpoint/2010/main" val="1487665530"/>
       </p:ext>
     </p:extLst>
   </p:cSld>
@@ -16165,6 +20168,250 @@
 </p:sld>
 </file>
 
+<file path=ppt/slides/slide6.xml><?xml version="1.0" encoding="utf-8"?>
+<p:sld xmlns:a="http://schemas.openxmlformats.org/drawingml/2006/main" xmlns:r="http://schemas.openxmlformats.org/officeDocument/2006/relationships" xmlns:p="http://schemas.openxmlformats.org/presentationml/2006/main">
+  <p:cSld>
+    <p:spTree>
+      <p:nvGrpSpPr>
+        <p:cNvPr id="1" name=""/>
+        <p:cNvGrpSpPr/>
+        <p:nvPr/>
+      </p:nvGrpSpPr>
+      <p:grpSpPr>
+        <a:xfrm>
+          <a:off x="0" y="0"/>
+          <a:ext cx="0" cy="0"/>
+          <a:chOff x="0" y="0"/>
+          <a:chExt cx="0" cy="0"/>
+        </a:xfrm>
+      </p:grpSpPr>
+      <p:sp>
+        <p:nvSpPr>
+          <p:cNvPr id="2" name="Title 1">
+            <a:extLst>
+              <a:ext uri="{FF2B5EF4-FFF2-40B4-BE49-F238E27FC236}">
+                <a16:creationId xmlns:a16="http://schemas.microsoft.com/office/drawing/2014/main" id="{5E562972-3449-42D1-8185-B4BEFD52AB44}"/>
+              </a:ext>
+            </a:extLst>
+          </p:cNvPr>
+          <p:cNvSpPr>
+            <a:spLocks noGrp="1"/>
+          </p:cNvSpPr>
+          <p:nvPr>
+            <p:ph type="title"/>
+          </p:nvPr>
+        </p:nvSpPr>
+        <p:spPr/>
+        <p:txBody>
+          <a:bodyPr/>
+          <a:lstStyle/>
+          <a:p>
+            <a:r>
+              <a:rPr lang="en-US" dirty="0"/>
+              <a:t>Title Lorem Ipsum Dolor Sit Amet</a:t>
+            </a:r>
+          </a:p>
+        </p:txBody>
+      </p:sp>
+      <p:graphicFrame>
+        <p:nvGraphicFramePr>
+          <p:cNvPr id="4" name="Content Placeholder 2" descr="timeline">
+            <a:extLst>
+              <a:ext uri="{FF2B5EF4-FFF2-40B4-BE49-F238E27FC236}">
+                <a16:creationId xmlns:a16="http://schemas.microsoft.com/office/drawing/2014/main" id="{FF3F0D82-0AA6-45C3-8367-955CBFA02ED6}"/>
+              </a:ext>
+            </a:extLst>
+          </p:cNvPr>
+          <p:cNvGraphicFramePr>
+            <a:graphicFrameLocks noGrp="1"/>
+          </p:cNvGraphicFramePr>
+          <p:nvPr>
+            <p:ph idx="1"/>
+          </p:nvPr>
+        </p:nvGraphicFramePr>
+        <p:xfrm>
+          <a:off x="581025" y="2341563"/>
+          <a:ext cx="11029950" cy="3633787"/>
+        </p:xfrm>
+        <a:graphic>
+          <a:graphicData uri="http://schemas.openxmlformats.org/drawingml/2006/diagram">
+            <dgm:relIds xmlns:dgm="http://schemas.openxmlformats.org/drawingml/2006/diagram" xmlns:r="http://schemas.openxmlformats.org/officeDocument/2006/relationships" r:dm="rId3" r:lo="rId4" r:qs="rId5" r:cs="rId6"/>
+          </a:graphicData>
+        </a:graphic>
+      </p:graphicFrame>
+    </p:spTree>
+    <p:extLst>
+      <p:ext uri="{BB962C8B-B14F-4D97-AF65-F5344CB8AC3E}">
+        <p14:creationId xmlns:p14="http://schemas.microsoft.com/office/powerpoint/2010/main" val="2086110603"/>
+      </p:ext>
+    </p:extLst>
+  </p:cSld>
+  <p:clrMapOvr>
+    <a:masterClrMapping/>
+  </p:clrMapOvr>
+</p:sld>
+</file>
+
+<file path=ppt/slides/slide7.xml><?xml version="1.0" encoding="utf-8"?>
+<p:sld xmlns:a="http://schemas.openxmlformats.org/drawingml/2006/main" xmlns:r="http://schemas.openxmlformats.org/officeDocument/2006/relationships" xmlns:p="http://schemas.openxmlformats.org/presentationml/2006/main">
+  <p:cSld>
+    <p:spTree>
+      <p:nvGrpSpPr>
+        <p:cNvPr id="1" name=""/>
+        <p:cNvGrpSpPr/>
+        <p:nvPr/>
+      </p:nvGrpSpPr>
+      <p:grpSpPr>
+        <a:xfrm>
+          <a:off x="0" y="0"/>
+          <a:ext cx="0" cy="0"/>
+          <a:chOff x="0" y="0"/>
+          <a:chExt cx="0" cy="0"/>
+        </a:xfrm>
+      </p:grpSpPr>
+      <p:sp>
+        <p:nvSpPr>
+          <p:cNvPr id="2" name="Title 1">
+            <a:extLst>
+              <a:ext uri="{FF2B5EF4-FFF2-40B4-BE49-F238E27FC236}">
+                <a16:creationId xmlns:a16="http://schemas.microsoft.com/office/drawing/2014/main" id="{E0FD81EE-4135-4109-BC39-51FA191B5234}"/>
+              </a:ext>
+            </a:extLst>
+          </p:cNvPr>
+          <p:cNvSpPr>
+            <a:spLocks noGrp="1"/>
+          </p:cNvSpPr>
+          <p:nvPr>
+            <p:ph type="title"/>
+          </p:nvPr>
+        </p:nvSpPr>
+        <p:spPr/>
+        <p:txBody>
+          <a:bodyPr/>
+          <a:lstStyle/>
+          <a:p>
+            <a:endParaRPr lang="en-US"/>
+          </a:p>
+        </p:txBody>
+      </p:sp>
+      <p:sp>
+        <p:nvSpPr>
+          <p:cNvPr id="3" name="Content Placeholder 2">
+            <a:extLst>
+              <a:ext uri="{FF2B5EF4-FFF2-40B4-BE49-F238E27FC236}">
+                <a16:creationId xmlns:a16="http://schemas.microsoft.com/office/drawing/2014/main" id="{26E29102-1124-4FCC-882E-ED06CEDED18F}"/>
+              </a:ext>
+            </a:extLst>
+          </p:cNvPr>
+          <p:cNvSpPr>
+            <a:spLocks noGrp="1"/>
+          </p:cNvSpPr>
+          <p:nvPr>
+            <p:ph idx="1"/>
+          </p:nvPr>
+        </p:nvSpPr>
+        <p:spPr/>
+        <p:txBody>
+          <a:bodyPr/>
+          <a:lstStyle/>
+          <a:p>
+            <a:endParaRPr lang="en-US"/>
+          </a:p>
+        </p:txBody>
+      </p:sp>
+    </p:spTree>
+    <p:extLst>
+      <p:ext uri="{BB962C8B-B14F-4D97-AF65-F5344CB8AC3E}">
+        <p14:creationId xmlns:p14="http://schemas.microsoft.com/office/powerpoint/2010/main" val="1812482139"/>
+      </p:ext>
+    </p:extLst>
+  </p:cSld>
+  <p:clrMapOvr>
+    <a:masterClrMapping/>
+  </p:clrMapOvr>
+</p:sld>
+</file>
+
+<file path=ppt/slides/slide8.xml><?xml version="1.0" encoding="utf-8"?>
+<p:sld xmlns:a="http://schemas.openxmlformats.org/drawingml/2006/main" xmlns:r="http://schemas.openxmlformats.org/officeDocument/2006/relationships" xmlns:p="http://schemas.openxmlformats.org/presentationml/2006/main">
+  <p:cSld>
+    <p:spTree>
+      <p:nvGrpSpPr>
+        <p:cNvPr id="1" name=""/>
+        <p:cNvGrpSpPr/>
+        <p:nvPr/>
+      </p:nvGrpSpPr>
+      <p:grpSpPr>
+        <a:xfrm>
+          <a:off x="0" y="0"/>
+          <a:ext cx="0" cy="0"/>
+          <a:chOff x="0" y="0"/>
+          <a:chExt cx="0" cy="0"/>
+        </a:xfrm>
+      </p:grpSpPr>
+      <p:sp>
+        <p:nvSpPr>
+          <p:cNvPr id="2" name="Title 1">
+            <a:extLst>
+              <a:ext uri="{FF2B5EF4-FFF2-40B4-BE49-F238E27FC236}">
+                <a16:creationId xmlns:a16="http://schemas.microsoft.com/office/drawing/2014/main" id="{7441B23A-6411-472D-9D6C-4F64B5D8674D}"/>
+              </a:ext>
+            </a:extLst>
+          </p:cNvPr>
+          <p:cNvSpPr>
+            <a:spLocks noGrp="1"/>
+          </p:cNvSpPr>
+          <p:nvPr>
+            <p:ph type="title"/>
+          </p:nvPr>
+        </p:nvSpPr>
+        <p:spPr/>
+        <p:txBody>
+          <a:bodyPr/>
+          <a:lstStyle/>
+          <a:p>
+            <a:endParaRPr lang="en-US"/>
+          </a:p>
+        </p:txBody>
+      </p:sp>
+      <p:sp>
+        <p:nvSpPr>
+          <p:cNvPr id="3" name="Content Placeholder 2">
+            <a:extLst>
+              <a:ext uri="{FF2B5EF4-FFF2-40B4-BE49-F238E27FC236}">
+                <a16:creationId xmlns:a16="http://schemas.microsoft.com/office/drawing/2014/main" id="{16B1B98C-11A7-4EDE-B2B3-C1730C9E1612}"/>
+              </a:ext>
+            </a:extLst>
+          </p:cNvPr>
+          <p:cNvSpPr>
+            <a:spLocks noGrp="1"/>
+          </p:cNvSpPr>
+          <p:nvPr>
+            <p:ph idx="1"/>
+          </p:nvPr>
+        </p:nvSpPr>
+        <p:spPr/>
+        <p:txBody>
+          <a:bodyPr/>
+          <a:lstStyle/>
+          <a:p>
+            <a:endParaRPr lang="en-US"/>
+          </a:p>
+        </p:txBody>
+      </p:sp>
+    </p:spTree>
+    <p:extLst>
+      <p:ext uri="{BB962C8B-B14F-4D97-AF65-F5344CB8AC3E}">
+        <p14:creationId xmlns:p14="http://schemas.microsoft.com/office/powerpoint/2010/main" val="588321172"/>
+      </p:ext>
+    </p:extLst>
+  </p:cSld>
+  <p:clrMapOvr>
+    <a:masterClrMapping/>
+  </p:clrMapOvr>
+</p:sld>
+</file>
+
 <file path=ppt/theme/theme1.xml><?xml version="1.0" encoding="utf-8"?>
 <a:theme xmlns:a="http://schemas.openxmlformats.org/drawingml/2006/main" name="DividendVTI">
   <a:themeElements>
@@ -16951,21 +21198,21 @@
 </file>
 
 <file path=customXml/item2.xml><?xml version="1.0" encoding="utf-8"?>
+<p:properties xmlns:p="http://schemas.microsoft.com/office/2006/metadata/properties" xmlns:xsi="http://www.w3.org/2001/XMLSchema-instance" xmlns:pc="http://schemas.microsoft.com/office/infopath/2007/PartnerControls">
+  <documentManagement>
+    <Status xmlns="71af3243-3dd4-4a8d-8c0d-dd76da1f02a5">Not started</Status>
+    <MediaServiceKeyPoints xmlns="71af3243-3dd4-4a8d-8c0d-dd76da1f02a5" xsi:nil="true"/>
+  </documentManagement>
+</p:properties>
+</file>
+
+<file path=customXml/item3.xml><?xml version="1.0" encoding="utf-8"?>
 <?mso-contentType ?>
 <FormTemplates xmlns="http://schemas.microsoft.com/sharepoint/v3/contenttype/forms">
   <Display>DocumentLibraryForm</Display>
   <Edit>DocumentLibraryForm</Edit>
   <New>DocumentLibraryForm</New>
 </FormTemplates>
-</file>
-
-<file path=customXml/item3.xml><?xml version="1.0" encoding="utf-8"?>
-<p:properties xmlns:p="http://schemas.microsoft.com/office/2006/metadata/properties" xmlns:xsi="http://www.w3.org/2001/XMLSchema-instance" xmlns:pc="http://schemas.microsoft.com/office/infopath/2007/PartnerControls">
-  <documentManagement>
-    <Status xmlns="71af3243-3dd4-4a8d-8c0d-dd76da1f02a5">Not started</Status>
-    <MediaServiceKeyPoints xmlns="71af3243-3dd4-4a8d-8c0d-dd76da1f02a5" xsi:nil="true"/>
-  </documentManagement>
-</p:properties>
 </file>
 
 <file path=customXml/itemProps1.xml><?xml version="1.0" encoding="utf-8"?>
@@ -16988,14 +21235,6 @@
 </file>
 
 <file path=customXml/itemProps2.xml><?xml version="1.0" encoding="utf-8"?>
-<ds:datastoreItem xmlns:ds="http://schemas.openxmlformats.org/officeDocument/2006/customXml" ds:itemID="{927BD4C1-B6B1-4715-ABF9-E660A51A4EA0}">
-  <ds:schemaRefs>
-    <ds:schemaRef ds:uri="http://schemas.microsoft.com/sharepoint/v3/contenttype/forms"/>
-  </ds:schemaRefs>
-</ds:datastoreItem>
-</file>
-
-<file path=customXml/itemProps3.xml><?xml version="1.0" encoding="utf-8"?>
 <ds:datastoreItem xmlns:ds="http://schemas.openxmlformats.org/officeDocument/2006/customXml" ds:itemID="{8D289AE2-D2AE-49D1-AFAC-3A79F6794255}">
   <ds:schemaRefs>
     <ds:schemaRef ds:uri="http://schemas.microsoft.com/office/2006/metadata/properties"/>
@@ -17003,4 +21242,12 @@
     <ds:schemaRef ds:uri="71af3243-3dd4-4a8d-8c0d-dd76da1f02a5"/>
   </ds:schemaRefs>
 </ds:datastoreItem>
+</file>
+
+<file path=customXml/itemProps3.xml><?xml version="1.0" encoding="utf-8"?>
+<ds:datastoreItem xmlns:ds="http://schemas.openxmlformats.org/officeDocument/2006/customXml" ds:itemID="{927BD4C1-B6B1-4715-ABF9-E660A51A4EA0}">
+  <ds:schemaRefs>
+    <ds:schemaRef ds:uri="http://schemas.microsoft.com/sharepoint/v3/contenttype/forms"/>
+  </ds:schemaRefs>
+</ds:datastoreItem>
 </file>
</xml_diff>

<commit_message>
added test for parsing and html generation of list item for ordered and unordered lists including embedded lists
</commit_message>
<xml_diff>
--- a/PowerPointParser/PowerPointParserTests/TestData/TestDeckParagraph.pptx
+++ b/PowerPointParser/PowerPointParserTests/TestData/TestDeckParagraph.pptx
@@ -5,7 +5,7 @@
     <p:sldMasterId id="2147483712" r:id="rId4"/>
   </p:sldMasterIdLst>
   <p:notesMasterIdLst>
-    <p:notesMasterId r:id="rId13"/>
+    <p:notesMasterId r:id="rId15"/>
   </p:notesMasterIdLst>
   <p:sldIdLst>
     <p:sldId id="257" r:id="rId5"/>
@@ -16,6 +16,8 @@
     <p:sldId id="262" r:id="rId10"/>
     <p:sldId id="263" r:id="rId11"/>
     <p:sldId id="264" r:id="rId12"/>
+    <p:sldId id="265" r:id="rId13"/>
+    <p:sldId id="266" r:id="rId14"/>
   </p:sldIdLst>
   <p:sldSz cx="12192000" cy="6858000"/>
   <p:notesSz cx="6858000" cy="9144000"/>
@@ -120,6 +122,32 @@
     </p:ext>
   </p:extLst>
 </p:presentation>
+</file>
+
+<file path=ppt/commentAuthors.xml><?xml version="1.0" encoding="utf-8"?>
+<p:cmAuthorLst xmlns:a="http://schemas.openxmlformats.org/drawingml/2006/main" xmlns:r="http://schemas.openxmlformats.org/officeDocument/2006/relationships" xmlns:p="http://schemas.openxmlformats.org/presentationml/2006/main">
+  <p:cmAuthor id="1" name="Patrick Alburtus" initials="PA" lastIdx="1" clrIdx="0">
+    <p:extLst>
+      <p:ext uri="{19B8F6BF-5375-455C-9EA6-DF929625EA0E}">
+        <p15:presenceInfo xmlns:p15="http://schemas.microsoft.com/office/powerpoint/2012/main" userId="1a8365884826b86e" providerId="Windows Live"/>
+      </p:ext>
+    </p:extLst>
+  </p:cmAuthor>
+</p:cmAuthorLst>
+</file>
+
+<file path=ppt/comments/comment1.xml><?xml version="1.0" encoding="utf-8"?>
+<p:cmLst xmlns:a="http://schemas.openxmlformats.org/drawingml/2006/main" xmlns:r="http://schemas.openxmlformats.org/officeDocument/2006/relationships" xmlns:p="http://schemas.openxmlformats.org/presentationml/2006/main">
+  <p:cm authorId="1" dt="2022-03-11T09:47:43.801" idx="1">
+    <p:pos x="10" y="10"/>
+    <p:text>here is a comment</p:text>
+    <p:extLst>
+      <p:ext uri="{C676402C-5697-4E1C-873F-D02D1690AC5C}">
+        <p15:threadingInfo xmlns:p15="http://schemas.microsoft.com/office/powerpoint/2012/main" timeZoneBias="300"/>
+      </p:ext>
+    </p:extLst>
+  </p:cm>
+</p:cmLst>
 </file>
 
 <file path=ppt/diagrams/colors1.xml><?xml version="1.0" encoding="utf-8"?>
@@ -15464,12 +15492,8 @@
               <a:buChar char="•"/>
             </a:pPr>
             <a:r>
-              <a:rPr lang="en-US"/>
-              <a:t>Indent Unordered </a:t>
-            </a:r>
-            <a:r>
               <a:rPr lang="en-US" dirty="0"/>
-              <a:t>item 3</a:t>
+              <a:t>Indent Unordered item 3</a:t>
             </a:r>
           </a:p>
         </p:txBody>
@@ -15751,6 +15775,180 @@
     <p:extLst>
       <p:ext uri="{BB962C8B-B14F-4D97-AF65-F5344CB8AC3E}">
         <p14:creationId xmlns:p14="http://schemas.microsoft.com/office/powerpoint/2010/main" val="1487665530"/>
+      </p:ext>
+    </p:extLst>
+  </p:cSld>
+  <p:clrMapOvr>
+    <a:masterClrMapping/>
+  </p:clrMapOvr>
+</p:notes>
+</file>
+
+<file path=ppt/notesSlides/notesSlide8.xml><?xml version="1.0" encoding="utf-8"?>
+<p:notes xmlns:a="http://schemas.openxmlformats.org/drawingml/2006/main" xmlns:r="http://schemas.openxmlformats.org/officeDocument/2006/relationships" xmlns:p="http://schemas.openxmlformats.org/presentationml/2006/main">
+  <p:cSld>
+    <p:spTree>
+      <p:nvGrpSpPr>
+        <p:cNvPr id="1" name=""/>
+        <p:cNvGrpSpPr/>
+        <p:nvPr/>
+      </p:nvGrpSpPr>
+      <p:grpSpPr>
+        <a:xfrm>
+          <a:off x="0" y="0"/>
+          <a:ext cx="0" cy="0"/>
+          <a:chOff x="0" y="0"/>
+          <a:chExt cx="0" cy="0"/>
+        </a:xfrm>
+      </p:grpSpPr>
+      <p:sp>
+        <p:nvSpPr>
+          <p:cNvPr id="2" name="Slide Image Placeholder 1"/>
+          <p:cNvSpPr>
+            <a:spLocks noGrp="1" noRot="1" noChangeAspect="1"/>
+          </p:cNvSpPr>
+          <p:nvPr>
+            <p:ph type="sldImg"/>
+          </p:nvPr>
+        </p:nvSpPr>
+        <p:spPr/>
+      </p:sp>
+      <p:sp>
+        <p:nvSpPr>
+          <p:cNvPr id="3" name="Notes Placeholder 2"/>
+          <p:cNvSpPr>
+            <a:spLocks noGrp="1"/>
+          </p:cNvSpPr>
+          <p:nvPr>
+            <p:ph type="body" idx="1"/>
+          </p:nvPr>
+        </p:nvSpPr>
+        <p:spPr/>
+        <p:txBody>
+          <a:bodyPr/>
+          <a:lstStyle/>
+          <a:p>
+            <a:r>
+              <a:rPr lang="en-US" dirty="0"/>
+              <a:t>Here a link: https://www.google.com/</a:t>
+            </a:r>
+          </a:p>
+        </p:txBody>
+      </p:sp>
+      <p:sp>
+        <p:nvSpPr>
+          <p:cNvPr id="4" name="Slide Number Placeholder 3"/>
+          <p:cNvSpPr>
+            <a:spLocks noGrp="1"/>
+          </p:cNvSpPr>
+          <p:nvPr>
+            <p:ph type="sldNum" sz="quarter" idx="5"/>
+          </p:nvPr>
+        </p:nvSpPr>
+        <p:spPr/>
+        <p:txBody>
+          <a:bodyPr/>
+          <a:lstStyle/>
+          <a:p>
+            <a:fld id="{9AD1542E-6E93-4F65-BF96-AEF4ABDF0E84}" type="slidenum">
+              <a:rPr lang="en-US" smtClean="0"/>
+              <a:t>9</a:t>
+            </a:fld>
+            <a:endParaRPr lang="en-US"/>
+          </a:p>
+        </p:txBody>
+      </p:sp>
+    </p:spTree>
+    <p:extLst>
+      <p:ext uri="{BB962C8B-B14F-4D97-AF65-F5344CB8AC3E}">
+        <p14:creationId xmlns:p14="http://schemas.microsoft.com/office/powerpoint/2010/main" val="751278072"/>
+      </p:ext>
+    </p:extLst>
+  </p:cSld>
+  <p:clrMapOvr>
+    <a:masterClrMapping/>
+  </p:clrMapOvr>
+</p:notes>
+</file>
+
+<file path=ppt/notesSlides/notesSlide9.xml><?xml version="1.0" encoding="utf-8"?>
+<p:notes xmlns:a="http://schemas.openxmlformats.org/drawingml/2006/main" xmlns:r="http://schemas.openxmlformats.org/officeDocument/2006/relationships" xmlns:p="http://schemas.openxmlformats.org/presentationml/2006/main">
+  <p:cSld>
+    <p:spTree>
+      <p:nvGrpSpPr>
+        <p:cNvPr id="1" name=""/>
+        <p:cNvGrpSpPr/>
+        <p:nvPr/>
+      </p:nvGrpSpPr>
+      <p:grpSpPr>
+        <a:xfrm>
+          <a:off x="0" y="0"/>
+          <a:ext cx="0" cy="0"/>
+          <a:chOff x="0" y="0"/>
+          <a:chExt cx="0" cy="0"/>
+        </a:xfrm>
+      </p:grpSpPr>
+      <p:sp>
+        <p:nvSpPr>
+          <p:cNvPr id="2" name="Slide Image Placeholder 1"/>
+          <p:cNvSpPr>
+            <a:spLocks noGrp="1" noRot="1" noChangeAspect="1"/>
+          </p:cNvSpPr>
+          <p:nvPr>
+            <p:ph type="sldImg"/>
+          </p:nvPr>
+        </p:nvSpPr>
+        <p:spPr/>
+      </p:sp>
+      <p:sp>
+        <p:nvSpPr>
+          <p:cNvPr id="3" name="Notes Placeholder 2"/>
+          <p:cNvSpPr>
+            <a:spLocks noGrp="1"/>
+          </p:cNvSpPr>
+          <p:nvPr>
+            <p:ph type="body" idx="1"/>
+          </p:nvPr>
+        </p:nvSpPr>
+        <p:spPr/>
+        <p:txBody>
+          <a:bodyPr/>
+          <a:lstStyle/>
+          <a:p>
+            <a:r>
+              <a:rPr lang="en-US" dirty="0"/>
+              <a:t>This note has a comment</a:t>
+            </a:r>
+          </a:p>
+        </p:txBody>
+      </p:sp>
+      <p:sp>
+        <p:nvSpPr>
+          <p:cNvPr id="4" name="Slide Number Placeholder 3"/>
+          <p:cNvSpPr>
+            <a:spLocks noGrp="1"/>
+          </p:cNvSpPr>
+          <p:nvPr>
+            <p:ph type="sldNum" sz="quarter" idx="5"/>
+          </p:nvPr>
+        </p:nvSpPr>
+        <p:spPr/>
+        <p:txBody>
+          <a:bodyPr/>
+          <a:lstStyle/>
+          <a:p>
+            <a:fld id="{9AD1542E-6E93-4F65-BF96-AEF4ABDF0E84}" type="slidenum">
+              <a:rPr lang="en-US" smtClean="0"/>
+              <a:t>10</a:t>
+            </a:fld>
+            <a:endParaRPr lang="en-US"/>
+          </a:p>
+        </p:txBody>
+      </p:sp>
+    </p:spTree>
+    <p:extLst>
+      <p:ext uri="{BB962C8B-B14F-4D97-AF65-F5344CB8AC3E}">
+        <p14:creationId xmlns:p14="http://schemas.microsoft.com/office/powerpoint/2010/main" val="1888362743"/>
       </p:ext>
     </p:extLst>
   </p:cSld>
@@ -19831,6 +20029,86 @@
 </p:sld>
 </file>
 
+<file path=ppt/slides/slide10.xml><?xml version="1.0" encoding="utf-8"?>
+<p:sld xmlns:a="http://schemas.openxmlformats.org/drawingml/2006/main" xmlns:r="http://schemas.openxmlformats.org/officeDocument/2006/relationships" xmlns:p="http://schemas.openxmlformats.org/presentationml/2006/main">
+  <p:cSld>
+    <p:spTree>
+      <p:nvGrpSpPr>
+        <p:cNvPr id="1" name=""/>
+        <p:cNvGrpSpPr/>
+        <p:nvPr/>
+      </p:nvGrpSpPr>
+      <p:grpSpPr>
+        <a:xfrm>
+          <a:off x="0" y="0"/>
+          <a:ext cx="0" cy="0"/>
+          <a:chOff x="0" y="0"/>
+          <a:chExt cx="0" cy="0"/>
+        </a:xfrm>
+      </p:grpSpPr>
+      <p:sp>
+        <p:nvSpPr>
+          <p:cNvPr id="2" name="Title 1">
+            <a:extLst>
+              <a:ext uri="{FF2B5EF4-FFF2-40B4-BE49-F238E27FC236}">
+                <a16:creationId xmlns:a16="http://schemas.microsoft.com/office/drawing/2014/main" id="{4E354CBC-4126-4FD5-A87A-2DC8A9857A84}"/>
+              </a:ext>
+            </a:extLst>
+          </p:cNvPr>
+          <p:cNvSpPr>
+            <a:spLocks noGrp="1"/>
+          </p:cNvSpPr>
+          <p:nvPr>
+            <p:ph type="title"/>
+          </p:nvPr>
+        </p:nvSpPr>
+        <p:spPr/>
+        <p:txBody>
+          <a:bodyPr/>
+          <a:lstStyle/>
+          <a:p>
+            <a:endParaRPr lang="en-US"/>
+          </a:p>
+        </p:txBody>
+      </p:sp>
+      <p:sp>
+        <p:nvSpPr>
+          <p:cNvPr id="3" name="Content Placeholder 2">
+            <a:extLst>
+              <a:ext uri="{FF2B5EF4-FFF2-40B4-BE49-F238E27FC236}">
+                <a16:creationId xmlns:a16="http://schemas.microsoft.com/office/drawing/2014/main" id="{9857B1C4-428A-4A46-B803-B3AB21E131ED}"/>
+              </a:ext>
+            </a:extLst>
+          </p:cNvPr>
+          <p:cNvSpPr>
+            <a:spLocks noGrp="1"/>
+          </p:cNvSpPr>
+          <p:nvPr>
+            <p:ph idx="1"/>
+          </p:nvPr>
+        </p:nvSpPr>
+        <p:spPr/>
+        <p:txBody>
+          <a:bodyPr/>
+          <a:lstStyle/>
+          <a:p>
+            <a:endParaRPr lang="en-US"/>
+          </a:p>
+        </p:txBody>
+      </p:sp>
+    </p:spTree>
+    <p:extLst>
+      <p:ext uri="{BB962C8B-B14F-4D97-AF65-F5344CB8AC3E}">
+        <p14:creationId xmlns:p14="http://schemas.microsoft.com/office/powerpoint/2010/main" val="4266767003"/>
+      </p:ext>
+    </p:extLst>
+  </p:cSld>
+  <p:clrMapOvr>
+    <a:masterClrMapping/>
+  </p:clrMapOvr>
+</p:sld>
+</file>
+
 <file path=ppt/slides/slide2.xml><?xml version="1.0" encoding="utf-8"?>
 <p:sld xmlns:a="http://schemas.openxmlformats.org/drawingml/2006/main" xmlns:r="http://schemas.openxmlformats.org/officeDocument/2006/relationships" xmlns:p="http://schemas.openxmlformats.org/presentationml/2006/main">
   <p:cSld>
@@ -20403,6 +20681,86 @@
     <p:extLst>
       <p:ext uri="{BB962C8B-B14F-4D97-AF65-F5344CB8AC3E}">
         <p14:creationId xmlns:p14="http://schemas.microsoft.com/office/powerpoint/2010/main" val="588321172"/>
+      </p:ext>
+    </p:extLst>
+  </p:cSld>
+  <p:clrMapOvr>
+    <a:masterClrMapping/>
+  </p:clrMapOvr>
+</p:sld>
+</file>
+
+<file path=ppt/slides/slide9.xml><?xml version="1.0" encoding="utf-8"?>
+<p:sld xmlns:a="http://schemas.openxmlformats.org/drawingml/2006/main" xmlns:r="http://schemas.openxmlformats.org/officeDocument/2006/relationships" xmlns:p="http://schemas.openxmlformats.org/presentationml/2006/main">
+  <p:cSld>
+    <p:spTree>
+      <p:nvGrpSpPr>
+        <p:cNvPr id="1" name=""/>
+        <p:cNvGrpSpPr/>
+        <p:nvPr/>
+      </p:nvGrpSpPr>
+      <p:grpSpPr>
+        <a:xfrm>
+          <a:off x="0" y="0"/>
+          <a:ext cx="0" cy="0"/>
+          <a:chOff x="0" y="0"/>
+          <a:chExt cx="0" cy="0"/>
+        </a:xfrm>
+      </p:grpSpPr>
+      <p:sp>
+        <p:nvSpPr>
+          <p:cNvPr id="2" name="Title 1">
+            <a:extLst>
+              <a:ext uri="{FF2B5EF4-FFF2-40B4-BE49-F238E27FC236}">
+                <a16:creationId xmlns:a16="http://schemas.microsoft.com/office/drawing/2014/main" id="{3C44356D-2B06-43E6-843B-75262B4278C6}"/>
+              </a:ext>
+            </a:extLst>
+          </p:cNvPr>
+          <p:cNvSpPr>
+            <a:spLocks noGrp="1"/>
+          </p:cNvSpPr>
+          <p:nvPr>
+            <p:ph type="title"/>
+          </p:nvPr>
+        </p:nvSpPr>
+        <p:spPr/>
+        <p:txBody>
+          <a:bodyPr/>
+          <a:lstStyle/>
+          <a:p>
+            <a:endParaRPr lang="en-US"/>
+          </a:p>
+        </p:txBody>
+      </p:sp>
+      <p:sp>
+        <p:nvSpPr>
+          <p:cNvPr id="3" name="Content Placeholder 2">
+            <a:extLst>
+              <a:ext uri="{FF2B5EF4-FFF2-40B4-BE49-F238E27FC236}">
+                <a16:creationId xmlns:a16="http://schemas.microsoft.com/office/drawing/2014/main" id="{6802A713-AD22-4C1A-ACC8-535C3425B83C}"/>
+              </a:ext>
+            </a:extLst>
+          </p:cNvPr>
+          <p:cNvSpPr>
+            <a:spLocks noGrp="1"/>
+          </p:cNvSpPr>
+          <p:nvPr>
+            <p:ph idx="1"/>
+          </p:nvPr>
+        </p:nvSpPr>
+        <p:spPr/>
+        <p:txBody>
+          <a:bodyPr/>
+          <a:lstStyle/>
+          <a:p>
+            <a:endParaRPr lang="en-US"/>
+          </a:p>
+        </p:txBody>
+      </p:sp>
+    </p:spTree>
+    <p:extLst>
+      <p:ext uri="{BB962C8B-B14F-4D97-AF65-F5344CB8AC3E}">
+        <p14:creationId xmlns:p14="http://schemas.microsoft.com/office/powerpoint/2010/main" val="3027217934"/>
       </p:ext>
     </p:extLst>
   </p:cSld>

</xml_diff>

<commit_message>
refactored reduntant code in tests
</commit_message>
<xml_diff>
--- a/PowerPointParser/PowerPointParserTests/TestData/TestDeckParagraph.pptx
+++ b/PowerPointParser/PowerPointParserTests/TestData/TestDeckParagraph.pptx
@@ -14772,7 +14772,7 @@
           <a:p>
             <a:fld id="{8F8C2FDF-9BD9-435F-AA5F-52208C4702FB}" type="datetimeFigureOut">
               <a:rPr lang="en-US" smtClean="0"/>
-              <a:t>3/10/2022</a:t>
+              <a:t>3/11/2022</a:t>
             </a:fld>
             <a:endParaRPr lang="en-US"/>
           </a:p>
@@ -15915,10 +15915,65 @@
           <a:bodyPr/>
           <a:lstStyle/>
           <a:p>
+            <a:pPr marL="171450" indent="-171450">
+              <a:buFont typeface="Arial" panose="020B0604020202020204" pitchFamily="34" charset="0"/>
+              <a:buChar char="•"/>
+            </a:pPr>
             <a:r>
               <a:rPr lang="en-US" dirty="0"/>
-              <a:t>This note has a comment</a:t>
+              <a:t>Un</a:t>
             </a:r>
+          </a:p>
+          <a:p>
+            <a:pPr marL="171450" indent="-171450">
+              <a:buFont typeface="Arial" panose="020B0604020202020204" pitchFamily="34" charset="0"/>
+              <a:buChar char="•"/>
+            </a:pPr>
+            <a:r>
+              <a:rPr lang="en-US" dirty="0"/>
+              <a:t>Order</a:t>
+            </a:r>
+          </a:p>
+          <a:p>
+            <a:pPr marL="171450" indent="-171450">
+              <a:buFont typeface="Arial" panose="020B0604020202020204" pitchFamily="34" charset="0"/>
+              <a:buChar char="•"/>
+            </a:pPr>
+            <a:r>
+              <a:rPr lang="en-US" dirty="0"/>
+              <a:t>List</a:t>
+            </a:r>
+          </a:p>
+          <a:p>
+            <a:pPr marL="228600" indent="-228600">
+              <a:buFont typeface="+mj-lt"/>
+              <a:buAutoNum type="arabicPeriod"/>
+            </a:pPr>
+            <a:r>
+              <a:rPr lang="en-US" dirty="0"/>
+              <a:t>Followed </a:t>
+            </a:r>
+          </a:p>
+          <a:p>
+            <a:pPr marL="228600" indent="-228600">
+              <a:buFont typeface="+mj-lt"/>
+              <a:buAutoNum type="arabicPeriod"/>
+            </a:pPr>
+            <a:r>
+              <a:rPr lang="en-US"/>
+              <a:t>by </a:t>
+            </a:r>
+          </a:p>
+          <a:p>
+            <a:pPr marL="228600" indent="-228600">
+              <a:buFont typeface="+mj-lt"/>
+              <a:buAutoNum type="arabicPeriod"/>
+            </a:pPr>
+            <a:r>
+              <a:rPr lang="en-US"/>
+              <a:t>Ordered</a:t>
+            </a:r>
+            <a:endParaRPr lang="en-US" dirty="0"/>
           </a:p>
         </p:txBody>
       </p:sp>
@@ -16196,7 +16251,7 @@
           <a:p>
             <a:fld id="{ED291B17-9318-49DB-B28B-6E5994AE9581}" type="datetime1">
               <a:rPr lang="en-US" smtClean="0"/>
-              <a:t>3/10/2022</a:t>
+              <a:t>3/11/2022</a:t>
             </a:fld>
             <a:endParaRPr lang="en-US" dirty="0"/>
           </a:p>
@@ -16399,7 +16454,7 @@
           <a:p>
             <a:fld id="{2CED4963-E985-44C4-B8C4-FDD613B7C2F8}" type="datetime1">
               <a:rPr lang="en-US" smtClean="0"/>
-              <a:t>3/10/2022</a:t>
+              <a:t>3/11/2022</a:t>
             </a:fld>
             <a:endParaRPr lang="en-US" dirty="0"/>
           </a:p>
@@ -16761,7 +16816,7 @@
           <a:p>
             <a:fld id="{ED291B17-9318-49DB-B28B-6E5994AE9581}" type="datetime1">
               <a:rPr lang="en-US" smtClean="0"/>
-              <a:t>3/10/2022</a:t>
+              <a:t>3/11/2022</a:t>
             </a:fld>
             <a:endParaRPr lang="en-US" dirty="0"/>
           </a:p>
@@ -16959,7 +17014,7 @@
           <a:p>
             <a:fld id="{78DD82B9-B8EE-4375-B6FF-88FA6ABB15D9}" type="datetime1">
               <a:rPr lang="en-US" smtClean="0"/>
-              <a:t>3/10/2022</a:t>
+              <a:t>3/11/2022</a:t>
             </a:fld>
             <a:endParaRPr lang="en-US" dirty="0"/>
           </a:p>
@@ -17271,7 +17326,7 @@
           <a:p>
             <a:fld id="{B2497495-0637-405E-AE64-5CC7506D51F5}" type="datetime1">
               <a:rPr lang="en-US" smtClean="0"/>
-              <a:t>3/10/2022</a:t>
+              <a:t>3/11/2022</a:t>
             </a:fld>
             <a:endParaRPr lang="en-US" dirty="0"/>
           </a:p>
@@ -17524,7 +17579,7 @@
           <a:p>
             <a:fld id="{7BFFD690-9426-415D-8B65-26881E07B2D4}" type="datetime1">
               <a:rPr lang="en-US" smtClean="0"/>
-              <a:t>3/10/2022</a:t>
+              <a:t>3/11/2022</a:t>
             </a:fld>
             <a:endParaRPr lang="en-US" dirty="0"/>
           </a:p>
@@ -17946,7 +18001,7 @@
           <a:p>
             <a:fld id="{04C4989A-474C-40DE-95B9-011C28B71673}" type="datetime1">
               <a:rPr lang="en-US" smtClean="0"/>
-              <a:t>3/10/2022</a:t>
+              <a:t>3/11/2022</a:t>
             </a:fld>
             <a:endParaRPr lang="en-US" dirty="0"/>
           </a:p>
@@ -18069,7 +18124,7 @@
           <a:p>
             <a:fld id="{5DB4ED54-5B5E-4A04-93D3-5772E3CE3818}" type="datetime1">
               <a:rPr lang="en-US" smtClean="0"/>
-              <a:t>3/10/2022</a:t>
+              <a:t>3/11/2022</a:t>
             </a:fld>
             <a:endParaRPr lang="en-US" dirty="0"/>
           </a:p>
@@ -18164,7 +18219,7 @@
           <a:p>
             <a:fld id="{4EDE50D6-574B-40AF-946F-D52A04ADE379}" type="datetime1">
               <a:rPr lang="en-US" smtClean="0"/>
-              <a:t>3/10/2022</a:t>
+              <a:t>3/11/2022</a:t>
             </a:fld>
             <a:endParaRPr lang="en-US" dirty="0"/>
           </a:p>
@@ -18541,7 +18596,7 @@
           <a:p>
             <a:fld id="{D82884F1-FFEA-405F-9602-3DCA865EDA4E}" type="datetime1">
               <a:rPr lang="en-US" smtClean="0"/>
-              <a:t>3/10/2022</a:t>
+              <a:t>3/11/2022</a:t>
             </a:fld>
             <a:endParaRPr lang="en-US" dirty="0"/>
           </a:p>
@@ -18834,7 +18889,7 @@
           <a:p>
             <a:fld id="{7E18DB4A-8810-4A10-AD5C-D5E2C667F5B3}" type="datetime1">
               <a:rPr lang="en-US" smtClean="0"/>
-              <a:t>3/10/2022</a:t>
+              <a:t>3/11/2022</a:t>
             </a:fld>
             <a:endParaRPr lang="en-US" dirty="0"/>
           </a:p>
@@ -19049,7 +19104,7 @@
           <a:p>
             <a:fld id="{ED291B17-9318-49DB-B28B-6E5994AE9581}" type="datetime1">
               <a:rPr lang="en-US" smtClean="0"/>
-              <a:t>3/10/2022</a:t>
+              <a:t>3/11/2022</a:t>
             </a:fld>
             <a:endParaRPr lang="en-US" dirty="0"/>
           </a:p>
@@ -21335,6 +21390,15 @@
 </file>
 
 <file path=customXml/item1.xml><?xml version="1.0" encoding="utf-8"?>
+<p:properties xmlns:p="http://schemas.microsoft.com/office/2006/metadata/properties" xmlns:xsi="http://www.w3.org/2001/XMLSchema-instance" xmlns:pc="http://schemas.microsoft.com/office/infopath/2007/PartnerControls">
+  <documentManagement>
+    <Status xmlns="71af3243-3dd4-4a8d-8c0d-dd76da1f02a5">Not started</Status>
+    <MediaServiceKeyPoints xmlns="71af3243-3dd4-4a8d-8c0d-dd76da1f02a5" xsi:nil="true"/>
+  </documentManagement>
+</p:properties>
+</file>
+
+<file path=customXml/item2.xml><?xml version="1.0" encoding="utf-8"?>
 <ct:contentTypeSchema xmlns:ct="http://schemas.microsoft.com/office/2006/metadata/contentType" xmlns:ma="http://schemas.microsoft.com/office/2006/metadata/properties/metaAttributes" ct:_="" ma:_="" ma:contentTypeName="Document" ma:contentTypeID="0x01010079F111ED35F8CC479449609E8A0923A6" ma:contentTypeVersion="12" ma:contentTypeDescription="Create a new document." ma:contentTypeScope="" ma:versionID="a410dd7f93c95333ffa1b60ed6adedd1">
   <xsd:schema xmlns:xsd="http://www.w3.org/2001/XMLSchema" xmlns:xs="http://www.w3.org/2001/XMLSchema" xmlns:p="http://schemas.microsoft.com/office/2006/metadata/properties" xmlns:ns2="71af3243-3dd4-4a8d-8c0d-dd76da1f02a5" xmlns:ns3="16c05727-aa75-4e4a-9b5f-8a80a1165891" targetNamespace="http://schemas.microsoft.com/office/2006/metadata/properties" ma:root="true" ma:fieldsID="a936d9baba76aa3866493feff160faab" ns2:_="" ns3:_="">
     <xsd:import namespace="71af3243-3dd4-4a8d-8c0d-dd76da1f02a5"/>
@@ -21555,15 +21619,6 @@
 </ct:contentTypeSchema>
 </file>
 
-<file path=customXml/item2.xml><?xml version="1.0" encoding="utf-8"?>
-<p:properties xmlns:p="http://schemas.microsoft.com/office/2006/metadata/properties" xmlns:xsi="http://www.w3.org/2001/XMLSchema-instance" xmlns:pc="http://schemas.microsoft.com/office/infopath/2007/PartnerControls">
-  <documentManagement>
-    <Status xmlns="71af3243-3dd4-4a8d-8c0d-dd76da1f02a5">Not started</Status>
-    <MediaServiceKeyPoints xmlns="71af3243-3dd4-4a8d-8c0d-dd76da1f02a5" xsi:nil="true"/>
-  </documentManagement>
-</p:properties>
-</file>
-
 <file path=customXml/item3.xml><?xml version="1.0" encoding="utf-8"?>
 <?mso-contentType ?>
 <FormTemplates xmlns="http://schemas.microsoft.com/sharepoint/v3/contenttype/forms">
@@ -21574,6 +21629,16 @@
 </file>
 
 <file path=customXml/itemProps1.xml><?xml version="1.0" encoding="utf-8"?>
+<ds:datastoreItem xmlns:ds="http://schemas.openxmlformats.org/officeDocument/2006/customXml" ds:itemID="{8D289AE2-D2AE-49D1-AFAC-3A79F6794255}">
+  <ds:schemaRefs>
+    <ds:schemaRef ds:uri="http://schemas.microsoft.com/office/2006/metadata/properties"/>
+    <ds:schemaRef ds:uri="http://schemas.microsoft.com/office/infopath/2007/PartnerControls"/>
+    <ds:schemaRef ds:uri="71af3243-3dd4-4a8d-8c0d-dd76da1f02a5"/>
+  </ds:schemaRefs>
+</ds:datastoreItem>
+</file>
+
+<file path=customXml/itemProps2.xml><?xml version="1.0" encoding="utf-8"?>
 <ds:datastoreItem xmlns:ds="http://schemas.openxmlformats.org/officeDocument/2006/customXml" ds:itemID="{41E7CA09-9778-4414-AE97-8064B12DA30E}">
   <ds:schemaRefs>
     <ds:schemaRef ds:uri="http://schemas.microsoft.com/office/2006/metadata/contentType"/>
@@ -21592,16 +21657,6 @@
 </ds:datastoreItem>
 </file>
 
-<file path=customXml/itemProps2.xml><?xml version="1.0" encoding="utf-8"?>
-<ds:datastoreItem xmlns:ds="http://schemas.openxmlformats.org/officeDocument/2006/customXml" ds:itemID="{8D289AE2-D2AE-49D1-AFAC-3A79F6794255}">
-  <ds:schemaRefs>
-    <ds:schemaRef ds:uri="http://schemas.microsoft.com/office/2006/metadata/properties"/>
-    <ds:schemaRef ds:uri="http://schemas.microsoft.com/office/infopath/2007/PartnerControls"/>
-    <ds:schemaRef ds:uri="71af3243-3dd4-4a8d-8c0d-dd76da1f02a5"/>
-  </ds:schemaRefs>
-</ds:datastoreItem>
-</file>
-
 <file path=customXml/itemProps3.xml><?xml version="1.0" encoding="utf-8"?>
 <ds:datastoreItem xmlns:ds="http://schemas.openxmlformats.org/officeDocument/2006/customXml" ds:itemID="{927BD4C1-B6B1-4715-ABF9-E660A51A4EA0}">
   <ds:schemaRefs>

</xml_diff>

<commit_message>
added hyperlink comment to slide, powerpoint does not allow actual hyperlinks in speaker notes so it is identical to a paragraph
</commit_message>
<xml_diff>
--- a/PowerPointParser/PowerPointParserTests/TestData/TestDeckParagraph.pptx
+++ b/PowerPointParser/PowerPointParserTests/TestData/TestDeckParagraph.pptx
@@ -15960,7 +15960,7 @@
               <a:buAutoNum type="arabicPeriod"/>
             </a:pPr>
             <a:r>
-              <a:rPr lang="en-US"/>
+              <a:rPr lang="en-US" dirty="0"/>
               <a:t>by </a:t>
             </a:r>
           </a:p>
@@ -15970,10 +15970,9 @@
               <a:buAutoNum type="arabicPeriod"/>
             </a:pPr>
             <a:r>
-              <a:rPr lang="en-US"/>
+              <a:rPr lang="en-US" dirty="0"/>
               <a:t>Ordered</a:t>
             </a:r>
-            <a:endParaRPr lang="en-US" dirty="0"/>
           </a:p>
         </p:txBody>
       </p:sp>

</xml_diff>